<commit_message>
Additional updates, almost done
</commit_message>
<xml_diff>
--- a/Posts/001-Running-MLNET-Models-in-ASPNETCore/images/Images-MLNET-ASPNETCore.pptx
+++ b/Posts/001-Running-MLNET-Models-in-ASPNETCore/images/Images-MLNET-ASPNETCore.pptx
@@ -110,6 +110,11 @@
       </a:defRPr>
     </a:lvl9pPr>
   </p:defaultTextStyle>
+  <p:extLst>
+    <p:ext uri="{EFAFB233-063F-42B5-8137-9DF3F51BA10A}">
+      <p15:sldGuideLst xmlns:p15="http://schemas.microsoft.com/office/powerpoint/2012/main"/>
+    </p:ext>
+  </p:extLst>
 </p:presentation>
 </file>
 
@@ -195,7 +200,7 @@
           <a:p>
             <a:fld id="{987D3736-6848-4E72-A07D-01D2C61671EB}" type="datetimeFigureOut">
               <a:rPr lang="en-US" smtClean="0"/>
-              <a:t>3/23/2019</a:t>
+              <a:t>3/24/2019</a:t>
             </a:fld>
             <a:endParaRPr lang="en-US"/>
           </a:p>
@@ -1065,7 +1070,7 @@
           <a:p>
             <a:fld id="{4951555E-76A1-4958-B01D-D647BA763313}" type="datetimeFigureOut">
               <a:rPr lang="en-US" smtClean="0"/>
-              <a:t>3/23/2019</a:t>
+              <a:t>3/24/2019</a:t>
             </a:fld>
             <a:endParaRPr lang="en-US"/>
           </a:p>
@@ -1263,7 +1268,7 @@
           <a:p>
             <a:fld id="{4951555E-76A1-4958-B01D-D647BA763313}" type="datetimeFigureOut">
               <a:rPr lang="en-US" smtClean="0"/>
-              <a:t>3/23/2019</a:t>
+              <a:t>3/24/2019</a:t>
             </a:fld>
             <a:endParaRPr lang="en-US"/>
           </a:p>
@@ -1471,7 +1476,7 @@
           <a:p>
             <a:fld id="{4951555E-76A1-4958-B01D-D647BA763313}" type="datetimeFigureOut">
               <a:rPr lang="en-US" smtClean="0"/>
-              <a:t>3/23/2019</a:t>
+              <a:t>3/24/2019</a:t>
             </a:fld>
             <a:endParaRPr lang="en-US"/>
           </a:p>
@@ -1669,7 +1674,7 @@
           <a:p>
             <a:fld id="{4951555E-76A1-4958-B01D-D647BA763313}" type="datetimeFigureOut">
               <a:rPr lang="en-US" smtClean="0"/>
-              <a:t>3/23/2019</a:t>
+              <a:t>3/24/2019</a:t>
             </a:fld>
             <a:endParaRPr lang="en-US"/>
           </a:p>
@@ -1944,7 +1949,7 @@
           <a:p>
             <a:fld id="{4951555E-76A1-4958-B01D-D647BA763313}" type="datetimeFigureOut">
               <a:rPr lang="en-US" smtClean="0"/>
-              <a:t>3/23/2019</a:t>
+              <a:t>3/24/2019</a:t>
             </a:fld>
             <a:endParaRPr lang="en-US"/>
           </a:p>
@@ -2209,7 +2214,7 @@
           <a:p>
             <a:fld id="{4951555E-76A1-4958-B01D-D647BA763313}" type="datetimeFigureOut">
               <a:rPr lang="en-US" smtClean="0"/>
-              <a:t>3/23/2019</a:t>
+              <a:t>3/24/2019</a:t>
             </a:fld>
             <a:endParaRPr lang="en-US"/>
           </a:p>
@@ -2621,7 +2626,7 @@
           <a:p>
             <a:fld id="{4951555E-76A1-4958-B01D-D647BA763313}" type="datetimeFigureOut">
               <a:rPr lang="en-US" smtClean="0"/>
-              <a:t>3/23/2019</a:t>
+              <a:t>3/24/2019</a:t>
             </a:fld>
             <a:endParaRPr lang="en-US"/>
           </a:p>
@@ -2762,7 +2767,7 @@
           <a:p>
             <a:fld id="{4951555E-76A1-4958-B01D-D647BA763313}" type="datetimeFigureOut">
               <a:rPr lang="en-US" smtClean="0"/>
-              <a:t>3/23/2019</a:t>
+              <a:t>3/24/2019</a:t>
             </a:fld>
             <a:endParaRPr lang="en-US"/>
           </a:p>
@@ -2875,7 +2880,7 @@
           <a:p>
             <a:fld id="{4951555E-76A1-4958-B01D-D647BA763313}" type="datetimeFigureOut">
               <a:rPr lang="en-US" smtClean="0"/>
-              <a:t>3/23/2019</a:t>
+              <a:t>3/24/2019</a:t>
             </a:fld>
             <a:endParaRPr lang="en-US"/>
           </a:p>
@@ -3186,7 +3191,7 @@
           <a:p>
             <a:fld id="{4951555E-76A1-4958-B01D-D647BA763313}" type="datetimeFigureOut">
               <a:rPr lang="en-US" smtClean="0"/>
-              <a:t>3/23/2019</a:t>
+              <a:t>3/24/2019</a:t>
             </a:fld>
             <a:endParaRPr lang="en-US"/>
           </a:p>
@@ -3474,7 +3479,7 @@
           <a:p>
             <a:fld id="{4951555E-76A1-4958-B01D-D647BA763313}" type="datetimeFigureOut">
               <a:rPr lang="en-US" smtClean="0"/>
-              <a:t>3/23/2019</a:t>
+              <a:t>3/24/2019</a:t>
             </a:fld>
             <a:endParaRPr lang="en-US"/>
           </a:p>
@@ -3715,7 +3720,7 @@
           <a:p>
             <a:fld id="{4951555E-76A1-4958-B01D-D647BA763313}" type="datetimeFigureOut">
               <a:rPr lang="en-US" smtClean="0"/>
-              <a:t>3/23/2019</a:t>
+              <a:t>3/24/2019</a:t>
             </a:fld>
             <a:endParaRPr lang="en-US"/>
           </a:p>
@@ -6698,8 +6703,8 @@
         </p:nvSpPr>
         <p:spPr>
           <a:xfrm>
-            <a:off x="390432" y="358486"/>
-            <a:ext cx="9212925" cy="6230785"/>
+            <a:off x="390430" y="368584"/>
+            <a:ext cx="9212925" cy="4852498"/>
           </a:xfrm>
           <a:prstGeom prst="rect">
             <a:avLst/>
@@ -6752,7 +6757,7 @@
               <a:tabLst/>
               <a:defRPr/>
             </a:pPr>
-            <a:endParaRPr kumimoji="0" lang="en-US" sz="1800" b="0" i="0" u="none" strike="noStrike" kern="1200" cap="none" spc="0" normalizeH="0" baseline="0" noProof="0">
+            <a:endParaRPr kumimoji="0" lang="en-US" sz="1600" b="0" i="0" u="none" strike="noStrike" kern="1200" cap="none" spc="0" normalizeH="0" baseline="0" noProof="0">
               <a:ln>
                 <a:noFill/>
               </a:ln>
@@ -6762,9 +6767,8 @@
               <a:effectLst/>
               <a:uLnTx/>
               <a:uFillTx/>
-              <a:latin typeface="Calibri" panose="020F0502020204030204"/>
-              <a:ea typeface="+mn-ea"/>
-              <a:cs typeface="+mn-cs"/>
+              <a:latin typeface="Segoe UI" panose="020B0502040204020203" pitchFamily="34" charset="0"/>
+              <a:cs typeface="Segoe UI" panose="020B0502040204020203" pitchFamily="34" charset="0"/>
             </a:endParaRPr>
           </a:p>
         </p:txBody>
@@ -6783,7 +6787,7 @@
         </p:nvSpPr>
         <p:spPr>
           <a:xfrm>
-            <a:off x="1340793" y="1349761"/>
+            <a:off x="881224" y="1709836"/>
             <a:ext cx="1759875" cy="707626"/>
           </a:xfrm>
           <a:prstGeom prst="rect">
@@ -6834,7 +6838,7 @@
               <a:defRPr/>
             </a:pPr>
             <a:r>
-              <a:rPr kumimoji="0" lang="en-US" sz="1800" b="0" i="0" u="none" strike="noStrike" kern="1200" cap="none" spc="0" normalizeH="0" baseline="0" noProof="0" dirty="0">
+              <a:rPr kumimoji="0" lang="en-US" sz="1600" b="0" i="0" u="none" strike="noStrike" kern="1200" cap="none" spc="0" normalizeH="0" baseline="0" noProof="0" dirty="0">
                 <a:ln>
                   <a:noFill/>
                 </a:ln>
@@ -6844,66 +6848,27 @@
                 <a:effectLst/>
                 <a:uLnTx/>
                 <a:uFillTx/>
-                <a:latin typeface="Calibri" panose="020F0502020204030204"/>
-                <a:ea typeface="+mn-ea"/>
-                <a:cs typeface="+mn-cs"/>
+                <a:latin typeface="Segoe UI" panose="020B0502040204020203" pitchFamily="34" charset="0"/>
+                <a:cs typeface="Segoe UI" panose="020B0502040204020203" pitchFamily="34" charset="0"/>
               </a:rPr>
-              <a:t>MLContext</a:t>
-            </a:r>
-          </a:p>
-          <a:p>
-            <a:pPr marL="0" marR="0" lvl="0" indent="0" algn="ctr" defTabSz="914400" rtl="0" eaLnBrk="1" fontAlgn="auto" latinLnBrk="0" hangingPunct="1">
-              <a:lnSpc>
-                <a:spcPct val="100000"/>
-              </a:lnSpc>
-              <a:spcBef>
-                <a:spcPts val="0"/>
-              </a:spcBef>
-              <a:spcAft>
-                <a:spcPts val="0"/>
-              </a:spcAft>
-              <a:buClrTx/>
-              <a:buSzTx/>
-              <a:buFontTx/>
-              <a:buNone/>
-              <a:tabLst/>
+              <a:t>_mlContext</a:t>
+            </a:r>
+          </a:p>
+          <a:p>
+            <a:pPr lvl="0" algn="ctr">
               <a:defRPr/>
             </a:pPr>
             <a:r>
-              <a:rPr kumimoji="0" lang="en-US" sz="1800" b="0" i="0" u="none" strike="noStrike" kern="1200" cap="none" spc="0" normalizeH="0" baseline="0" noProof="0" dirty="0">
-                <a:ln>
-                  <a:noFill/>
-                </a:ln>
+              <a:rPr lang="en-US" sz="1400" dirty="0">
                 <a:solidFill>
                   <a:prstClr val="black"/>
                 </a:solidFill>
-                <a:effectLst/>
-                <a:uLnTx/>
-                <a:uFillTx/>
-                <a:latin typeface="Calibri" panose="020F0502020204030204"/>
-                <a:ea typeface="+mn-ea"/>
-                <a:cs typeface="+mn-cs"/>
+                <a:latin typeface="Segoe UI" panose="020B0502040204020203" pitchFamily="34" charset="0"/>
+                <a:cs typeface="Segoe UI" panose="020B0502040204020203" pitchFamily="34" charset="0"/>
               </a:rPr>
-              <a:t>_</a:t>
-            </a:r>
-            <a:r>
-              <a:rPr kumimoji="0" lang="en-US" sz="1800" b="0" i="0" u="none" strike="noStrike" kern="1200" cap="none" spc="0" normalizeH="0" baseline="0" noProof="0" dirty="0" err="1">
-                <a:ln>
-                  <a:noFill/>
-                </a:ln>
-                <a:solidFill>
-                  <a:prstClr val="black"/>
-                </a:solidFill>
-                <a:effectLst/>
-                <a:uLnTx/>
-                <a:uFillTx/>
-                <a:latin typeface="Calibri" panose="020F0502020204030204"/>
-                <a:ea typeface="+mn-ea"/>
-                <a:cs typeface="+mn-cs"/>
-              </a:rPr>
-              <a:t>mlModel</a:t>
-            </a:r>
-            <a:endParaRPr kumimoji="0" lang="en-US" sz="1800" b="0" i="0" u="none" strike="noStrike" kern="1200" cap="none" spc="0" normalizeH="0" baseline="0" noProof="0" dirty="0">
+              <a:t>(MLContext)</a:t>
+            </a:r>
+            <a:endParaRPr kumimoji="0" lang="en-US" sz="1400" b="0" i="0" u="none" strike="noStrike" kern="1200" cap="none" spc="0" normalizeH="0" baseline="0" noProof="0" dirty="0">
               <a:ln>
                 <a:noFill/>
               </a:ln>
@@ -6913,9 +6878,8 @@
               <a:effectLst/>
               <a:uLnTx/>
               <a:uFillTx/>
-              <a:latin typeface="Calibri" panose="020F0502020204030204"/>
-              <a:ea typeface="+mn-ea"/>
-              <a:cs typeface="+mn-cs"/>
+              <a:latin typeface="Segoe UI" panose="020B0502040204020203" pitchFamily="34" charset="0"/>
+              <a:cs typeface="Segoe UI" panose="020B0502040204020203" pitchFamily="34" charset="0"/>
             </a:endParaRPr>
           </a:p>
         </p:txBody>
@@ -6934,7 +6898,7 @@
         </p:nvSpPr>
         <p:spPr>
           <a:xfrm>
-            <a:off x="3787608" y="2730711"/>
+            <a:off x="3546817" y="1709836"/>
             <a:ext cx="1759875" cy="707626"/>
           </a:xfrm>
           <a:prstGeom prst="rect">
@@ -6985,7 +6949,7 @@
               <a:defRPr/>
             </a:pPr>
             <a:r>
-              <a:rPr kumimoji="0" lang="en-US" sz="1800" b="0" i="0" u="none" strike="noStrike" kern="1200" cap="none" spc="0" normalizeH="0" baseline="0" noProof="0" dirty="0">
+              <a:rPr kumimoji="0" lang="en-US" sz="1600" b="0" i="0" u="none" strike="noStrike" kern="1200" cap="none" spc="0" normalizeH="0" baseline="0" noProof="0" dirty="0">
                 <a:ln>
                   <a:noFill/>
                 </a:ln>
@@ -6995,66 +6959,27 @@
                 <a:effectLst/>
                 <a:uLnTx/>
                 <a:uFillTx/>
-                <a:latin typeface="Calibri" panose="020F0502020204030204"/>
-                <a:ea typeface="+mn-ea"/>
-                <a:cs typeface="+mn-cs"/>
+                <a:latin typeface="Segoe UI" panose="020B0502040204020203" pitchFamily="34" charset="0"/>
+                <a:cs typeface="Segoe UI" panose="020B0502040204020203" pitchFamily="34" charset="0"/>
               </a:rPr>
-              <a:t>ITransformer</a:t>
-            </a:r>
-          </a:p>
-          <a:p>
-            <a:pPr marL="0" marR="0" lvl="0" indent="0" algn="ctr" defTabSz="914400" rtl="0" eaLnBrk="1" fontAlgn="auto" latinLnBrk="0" hangingPunct="1">
-              <a:lnSpc>
-                <a:spcPct val="100000"/>
-              </a:lnSpc>
-              <a:spcBef>
-                <a:spcPts val="0"/>
-              </a:spcBef>
-              <a:spcAft>
-                <a:spcPts val="0"/>
-              </a:spcAft>
-              <a:buClrTx/>
-              <a:buSzTx/>
-              <a:buFontTx/>
-              <a:buNone/>
-              <a:tabLst/>
+              <a:t>MLModel</a:t>
+            </a:r>
+          </a:p>
+          <a:p>
+            <a:pPr lvl="0" algn="ctr">
               <a:defRPr/>
             </a:pPr>
             <a:r>
-              <a:rPr kumimoji="0" lang="en-US" sz="1800" b="0" i="0" u="none" strike="noStrike" kern="1200" cap="none" spc="0" normalizeH="0" baseline="0" noProof="0" dirty="0">
-                <a:ln>
-                  <a:noFill/>
-                </a:ln>
+              <a:rPr lang="en-US" sz="1400" dirty="0">
                 <a:solidFill>
                   <a:prstClr val="black"/>
                 </a:solidFill>
-                <a:effectLst/>
-                <a:uLnTx/>
-                <a:uFillTx/>
-                <a:latin typeface="Calibri" panose="020F0502020204030204"/>
-                <a:ea typeface="+mn-ea"/>
-                <a:cs typeface="+mn-cs"/>
+                <a:latin typeface="Segoe UI" panose="020B0502040204020203" pitchFamily="34" charset="0"/>
+                <a:cs typeface="Segoe UI" panose="020B0502040204020203" pitchFamily="34" charset="0"/>
               </a:rPr>
-              <a:t>_</a:t>
-            </a:r>
-            <a:r>
-              <a:rPr kumimoji="0" lang="en-US" sz="1800" b="0" i="0" u="none" strike="noStrike" kern="1200" cap="none" spc="0" normalizeH="0" baseline="0" noProof="0" dirty="0" err="1">
-                <a:ln>
-                  <a:noFill/>
-                </a:ln>
-                <a:solidFill>
-                  <a:prstClr val="black"/>
-                </a:solidFill>
-                <a:effectLst/>
-                <a:uLnTx/>
-                <a:uFillTx/>
-                <a:latin typeface="Calibri" panose="020F0502020204030204"/>
-                <a:ea typeface="+mn-ea"/>
-                <a:cs typeface="+mn-cs"/>
-              </a:rPr>
-              <a:t>mlModel</a:t>
-            </a:r>
-            <a:endParaRPr kumimoji="0" lang="en-US" sz="1800" b="0" i="0" u="none" strike="noStrike" kern="1200" cap="none" spc="0" normalizeH="0" baseline="0" noProof="0" dirty="0">
+              <a:t>(ITransformer)</a:t>
+            </a:r>
+            <a:endParaRPr kumimoji="0" lang="en-US" sz="1600" b="0" i="0" u="none" strike="noStrike" kern="1200" cap="none" spc="0" normalizeH="0" baseline="0" noProof="0" dirty="0">
               <a:ln>
                 <a:noFill/>
               </a:ln>
@@ -7064,9 +6989,8 @@
               <a:effectLst/>
               <a:uLnTx/>
               <a:uFillTx/>
-              <a:latin typeface="Calibri" panose="020F0502020204030204"/>
-              <a:ea typeface="+mn-ea"/>
-              <a:cs typeface="+mn-cs"/>
+              <a:latin typeface="Segoe UI" panose="020B0502040204020203" pitchFamily="34" charset="0"/>
+              <a:cs typeface="Segoe UI" panose="020B0502040204020203" pitchFamily="34" charset="0"/>
             </a:endParaRPr>
           </a:p>
         </p:txBody>
@@ -7085,7 +7009,7 @@
         </p:nvSpPr>
         <p:spPr>
           <a:xfrm>
-            <a:off x="6731779" y="4380932"/>
+            <a:off x="6698090" y="2860707"/>
             <a:ext cx="1413984" cy="400814"/>
           </a:xfrm>
           <a:prstGeom prst="rect">
@@ -7136,7 +7060,7 @@
               <a:defRPr/>
             </a:pPr>
             <a:r>
-              <a:rPr kumimoji="0" lang="en-US" sz="1400" b="0" i="0" u="none" strike="noStrike" kern="1200" cap="none" spc="0" normalizeH="0" baseline="0" noProof="0" dirty="0">
+              <a:rPr kumimoji="0" lang="en-US" sz="1200" b="0" i="0" u="none" strike="noStrike" kern="1200" cap="none" spc="0" normalizeH="0" baseline="0" noProof="0" dirty="0">
                 <a:ln>
                   <a:noFill/>
                 </a:ln>
@@ -7146,45 +7070,226 @@
                 <a:effectLst/>
                 <a:uLnTx/>
                 <a:uFillTx/>
-                <a:latin typeface="Calibri" panose="020F0502020204030204"/>
-                <a:ea typeface="+mn-ea"/>
-                <a:cs typeface="+mn-cs"/>
+                <a:latin typeface="Segoe UI" panose="020B0502040204020203" pitchFamily="34" charset="0"/>
+                <a:cs typeface="Segoe UI" panose="020B0502040204020203" pitchFamily="34" charset="0"/>
               </a:rPr>
               <a:t>PredictionEngine</a:t>
             </a:r>
           </a:p>
         </p:txBody>
       </p:sp>
+      <p:sp>
+        <p:nvSpPr>
+          <p:cNvPr id="19" name="Rectangle 18">
+            <a:extLst>
+              <a:ext uri="{FF2B5EF4-FFF2-40B4-BE49-F238E27FC236}">
+                <a16:creationId xmlns:a16="http://schemas.microsoft.com/office/drawing/2014/main" id="{A1A6727E-042D-477B-BACC-85756112F16B}"/>
+              </a:ext>
+            </a:extLst>
+          </p:cNvPr>
+          <p:cNvSpPr/>
+          <p:nvPr/>
+        </p:nvSpPr>
+        <p:spPr>
+          <a:xfrm>
+            <a:off x="4449217" y="3649090"/>
+            <a:ext cx="1993250" cy="1015663"/>
+          </a:xfrm>
+          <a:prstGeom prst="rect">
+            <a:avLst/>
+          </a:prstGeom>
+        </p:spPr>
+        <p:txBody>
+          <a:bodyPr wrap="square">
+            <a:spAutoFit/>
+          </a:bodyPr>
+          <a:lstStyle/>
+          <a:p>
+            <a:pPr marL="0" marR="0" lvl="0" indent="0" algn="l" defTabSz="914400" rtl="0" eaLnBrk="1" fontAlgn="auto" latinLnBrk="0" hangingPunct="1">
+              <a:lnSpc>
+                <a:spcPct val="100000"/>
+              </a:lnSpc>
+              <a:spcBef>
+                <a:spcPts val="0"/>
+              </a:spcBef>
+              <a:spcAft>
+                <a:spcPts val="0"/>
+              </a:spcAft>
+              <a:buClrTx/>
+              <a:buSzTx/>
+              <a:buFontTx/>
+              <a:buNone/>
+              <a:tabLst/>
+              <a:defRPr/>
+            </a:pPr>
+            <a:r>
+              <a:rPr kumimoji="0" lang="en-US" sz="1200" b="1" i="0" u="none" strike="noStrike" kern="1200" cap="none" spc="0" normalizeH="0" baseline="0" noProof="0" dirty="0">
+                <a:ln>
+                  <a:noFill/>
+                </a:ln>
+                <a:solidFill>
+                  <a:prstClr val="black"/>
+                </a:solidFill>
+                <a:effectLst/>
+                <a:uLnTx/>
+                <a:uFillTx/>
+                <a:latin typeface="Segoe UI" panose="020B0502040204020203" pitchFamily="34" charset="0"/>
+                <a:cs typeface="Segoe UI" panose="020B0502040204020203" pitchFamily="34" charset="0"/>
+              </a:rPr>
+              <a:t>‘n’ PredictionEngine objects in a pool.</a:t>
+            </a:r>
+          </a:p>
+          <a:p>
+            <a:pPr marL="0" marR="0" lvl="0" indent="0" algn="l" defTabSz="914400" rtl="0" eaLnBrk="1" fontAlgn="auto" latinLnBrk="0" hangingPunct="1">
+              <a:lnSpc>
+                <a:spcPct val="100000"/>
+              </a:lnSpc>
+              <a:spcBef>
+                <a:spcPts val="0"/>
+              </a:spcBef>
+              <a:spcAft>
+                <a:spcPts val="0"/>
+              </a:spcAft>
+              <a:buClrTx/>
+              <a:buSzTx/>
+              <a:buFontTx/>
+              <a:buNone/>
+              <a:tabLst/>
+              <a:defRPr/>
+            </a:pPr>
+            <a:r>
+              <a:rPr kumimoji="0" lang="en-US" sz="1200" b="0" i="0" u="none" strike="noStrike" kern="1200" cap="none" spc="0" normalizeH="0" baseline="0" noProof="0" dirty="0">
+                <a:ln>
+                  <a:noFill/>
+                </a:ln>
+                <a:solidFill>
+                  <a:prstClr val="black"/>
+                </a:solidFill>
+                <a:effectLst/>
+                <a:uLnTx/>
+                <a:uFillTx/>
+                <a:latin typeface="Segoe UI" panose="020B0502040204020203" pitchFamily="34" charset="0"/>
+                <a:cs typeface="Segoe UI" panose="020B0502040204020203" pitchFamily="34" charset="0"/>
+              </a:rPr>
+              <a:t>Solves problem: </a:t>
+            </a:r>
+          </a:p>
+          <a:p>
+            <a:pPr marL="0" marR="0" lvl="0" indent="0" algn="l" defTabSz="914400" rtl="0" eaLnBrk="1" fontAlgn="auto" latinLnBrk="0" hangingPunct="1">
+              <a:lnSpc>
+                <a:spcPct val="100000"/>
+              </a:lnSpc>
+              <a:spcBef>
+                <a:spcPts val="0"/>
+              </a:spcBef>
+              <a:spcAft>
+                <a:spcPts val="0"/>
+              </a:spcAft>
+              <a:buClrTx/>
+              <a:buSzTx/>
+              <a:buFontTx/>
+              <a:buNone/>
+              <a:tabLst/>
+              <a:defRPr/>
+            </a:pPr>
+            <a:r>
+              <a:rPr lang="en-US" sz="1200" dirty="0">
+                <a:solidFill>
+                  <a:prstClr val="black"/>
+                </a:solidFill>
+                <a:latin typeface="Segoe UI" panose="020B0502040204020203" pitchFamily="34" charset="0"/>
+                <a:cs typeface="Segoe UI" panose="020B0502040204020203" pitchFamily="34" charset="0"/>
+              </a:rPr>
+              <a:t>“</a:t>
+            </a:r>
+            <a:r>
+              <a:rPr kumimoji="0" lang="en-US" sz="1200" b="0" i="1" u="none" strike="noStrike" kern="1200" cap="none" spc="0" normalizeH="0" baseline="0" noProof="0" dirty="0">
+                <a:ln>
+                  <a:noFill/>
+                </a:ln>
+                <a:solidFill>
+                  <a:prstClr val="black"/>
+                </a:solidFill>
+                <a:effectLst/>
+                <a:uLnTx/>
+                <a:uFillTx/>
+                <a:latin typeface="Segoe UI" panose="020B0502040204020203" pitchFamily="34" charset="0"/>
+                <a:cs typeface="Segoe UI" panose="020B0502040204020203" pitchFamily="34" charset="0"/>
+              </a:rPr>
+              <a:t>Not Thread safe while ‘expensive</a:t>
+            </a:r>
+            <a:r>
+              <a:rPr lang="en-US" sz="1200" i="1" dirty="0">
+                <a:solidFill>
+                  <a:prstClr val="black"/>
+                </a:solidFill>
+                <a:latin typeface="Segoe UI" panose="020B0502040204020203" pitchFamily="34" charset="0"/>
+                <a:cs typeface="Segoe UI" panose="020B0502040204020203" pitchFamily="34" charset="0"/>
+              </a:rPr>
+              <a:t>’</a:t>
+            </a:r>
+            <a:r>
+              <a:rPr kumimoji="0" lang="en-US" sz="1200" b="0" i="1" u="none" strike="noStrike" kern="1200" cap="none" spc="0" normalizeH="0" baseline="0" noProof="0" dirty="0">
+                <a:ln>
+                  <a:noFill/>
+                </a:ln>
+                <a:solidFill>
+                  <a:prstClr val="black"/>
+                </a:solidFill>
+                <a:effectLst/>
+                <a:uLnTx/>
+                <a:uFillTx/>
+                <a:latin typeface="Segoe UI" panose="020B0502040204020203" pitchFamily="34" charset="0"/>
+                <a:cs typeface="Segoe UI" panose="020B0502040204020203" pitchFamily="34" charset="0"/>
+              </a:rPr>
+              <a:t> to create</a:t>
+            </a:r>
+            <a:r>
+              <a:rPr kumimoji="0" lang="en-US" sz="1200" b="0" i="0" u="none" strike="noStrike" kern="1200" cap="none" spc="0" normalizeH="0" baseline="0" noProof="0" dirty="0">
+                <a:ln>
+                  <a:noFill/>
+                </a:ln>
+                <a:solidFill>
+                  <a:prstClr val="black"/>
+                </a:solidFill>
+                <a:effectLst/>
+                <a:uLnTx/>
+                <a:uFillTx/>
+                <a:latin typeface="Segoe UI" panose="020B0502040204020203" pitchFamily="34" charset="0"/>
+                <a:cs typeface="Segoe UI" panose="020B0502040204020203" pitchFamily="34" charset="0"/>
+              </a:rPr>
+              <a:t>”.</a:t>
+            </a:r>
+          </a:p>
+        </p:txBody>
+      </p:sp>
       <p:cxnSp>
         <p:nvCxnSpPr>
-          <p:cNvPr id="9" name="Straight Arrow Connector 8">
-            <a:extLst>
-              <a:ext uri="{FF2B5EF4-FFF2-40B4-BE49-F238E27FC236}">
-                <a16:creationId xmlns:a16="http://schemas.microsoft.com/office/drawing/2014/main" id="{F21DC019-E666-486F-B565-8D7E11AF1E42}"/>
+          <p:cNvPr id="21" name="Straight Connector 20">
+            <a:extLst>
+              <a:ext uri="{FF2B5EF4-FFF2-40B4-BE49-F238E27FC236}">
+                <a16:creationId xmlns:a16="http://schemas.microsoft.com/office/drawing/2014/main" id="{AFB28DA7-B846-48C8-BC04-6FD6FDF3C58D}"/>
               </a:ext>
             </a:extLst>
           </p:cNvPr>
           <p:cNvCxnSpPr>
             <a:cxnSpLocks/>
-            <a:stCxn id="5" idx="0"/>
-            <a:endCxn id="4" idx="3"/>
           </p:cNvCxnSpPr>
           <p:nvPr/>
         </p:nvCxnSpPr>
         <p:spPr>
-          <a:xfrm flipH="1" flipV="1">
-            <a:off x="3100668" y="1703574"/>
-            <a:ext cx="1566878" cy="1027137"/>
-          </a:xfrm>
-          <a:prstGeom prst="straightConnector1">
+          <a:xfrm>
+            <a:off x="9604664" y="3063861"/>
+            <a:ext cx="413342" cy="0"/>
+          </a:xfrm>
+          <a:prstGeom prst="line">
             <a:avLst/>
           </a:prstGeom>
-          <a:ln>
+          <a:ln w="12700">
             <a:solidFill>
               <a:schemeClr val="tx1"/>
             </a:solidFill>
-            <a:prstDash val="lgDash"/>
-            <a:tailEnd type="arrow"/>
+            <a:tailEnd type="oval"/>
           </a:ln>
         </p:spPr>
         <p:style>
@@ -7204,10 +7309,10 @@
       </p:cxnSp>
       <p:sp>
         <p:nvSpPr>
-          <p:cNvPr id="15" name="Rectangle 14">
-            <a:extLst>
-              <a:ext uri="{FF2B5EF4-FFF2-40B4-BE49-F238E27FC236}">
-                <a16:creationId xmlns:a16="http://schemas.microsoft.com/office/drawing/2014/main" id="{39EA0E19-72F4-47B4-BB5B-55871A88B5AD}"/>
+          <p:cNvPr id="22" name="Rectangle 21">
+            <a:extLst>
+              <a:ext uri="{FF2B5EF4-FFF2-40B4-BE49-F238E27FC236}">
+                <a16:creationId xmlns:a16="http://schemas.microsoft.com/office/drawing/2014/main" id="{C02DC5CB-6C20-4D89-AB04-3F25B65BDCA3}"/>
               </a:ext>
             </a:extLst>
           </p:cNvPr>
@@ -7216,15 +7321,15 @@
         </p:nvSpPr>
         <p:spPr>
           <a:xfrm>
-            <a:off x="3884107" y="2023085"/>
-            <a:ext cx="720069" cy="276999"/>
+            <a:off x="9993633" y="2894584"/>
+            <a:ext cx="889090" cy="307777"/>
           </a:xfrm>
           <a:prstGeom prst="rect">
             <a:avLst/>
           </a:prstGeom>
         </p:spPr>
         <p:txBody>
-          <a:bodyPr wrap="none">
+          <a:bodyPr wrap="square">
             <a:spAutoFit/>
           </a:bodyPr>
           <a:lstStyle/>
@@ -7247,7 +7352,7 @@
               <a:defRPr/>
             </a:pPr>
             <a:r>
-              <a:rPr kumimoji="0" lang="en-US" sz="1200" b="0" i="0" u="none" strike="noStrike" kern="1200" cap="none" spc="0" normalizeH="0" baseline="0" noProof="0" dirty="0">
+              <a:rPr kumimoji="0" lang="en-US" sz="1400" b="0" i="0" u="none" strike="noStrike" kern="1200" cap="none" spc="0" normalizeH="0" baseline="0" noProof="0" dirty="0">
                 <a:ln>
                   <a:noFill/>
                 </a:ln>
@@ -7257,21 +7362,20 @@
                 <a:effectLst/>
                 <a:uLnTx/>
                 <a:uFillTx/>
-                <a:latin typeface="Calibri" panose="020F0502020204030204"/>
-                <a:ea typeface="+mn-ea"/>
-                <a:cs typeface="+mn-cs"/>
+                <a:latin typeface="Segoe UI" panose="020B0502040204020203" pitchFamily="34" charset="0"/>
+                <a:cs typeface="Segoe UI" panose="020B0502040204020203" pitchFamily="34" charset="0"/>
               </a:rPr>
-              <a:t>depends</a:t>
-            </a:r>
-          </a:p>
-        </p:txBody>
-      </p:sp>
-      <p:sp>
-        <p:nvSpPr>
-          <p:cNvPr id="17" name="Rectangle 16">
-            <a:extLst>
-              <a:ext uri="{FF2B5EF4-FFF2-40B4-BE49-F238E27FC236}">
-                <a16:creationId xmlns:a16="http://schemas.microsoft.com/office/drawing/2014/main" id="{FAC44FC0-61EE-4BA3-AB02-B1459C18DA9D}"/>
+              <a:t>Predict()</a:t>
+            </a:r>
+          </a:p>
+        </p:txBody>
+      </p:sp>
+      <p:sp>
+        <p:nvSpPr>
+          <p:cNvPr id="28" name="Rectangle 27">
+            <a:extLst>
+              <a:ext uri="{FF2B5EF4-FFF2-40B4-BE49-F238E27FC236}">
+                <a16:creationId xmlns:a16="http://schemas.microsoft.com/office/drawing/2014/main" id="{6BB4E3A5-7B9D-4BEA-9C3E-D4221623ACD7}"/>
               </a:ext>
             </a:extLst>
           </p:cNvPr>
@@ -7280,8 +7384,141 @@
         </p:nvSpPr>
         <p:spPr>
           <a:xfrm>
-            <a:off x="1669136" y="2057387"/>
-            <a:ext cx="1103187" cy="338554"/>
+            <a:off x="3509611" y="2470768"/>
+            <a:ext cx="1797081" cy="830997"/>
+          </a:xfrm>
+          <a:prstGeom prst="rect">
+            <a:avLst/>
+          </a:prstGeom>
+        </p:spPr>
+        <p:txBody>
+          <a:bodyPr wrap="square">
+            <a:spAutoFit/>
+          </a:bodyPr>
+          <a:lstStyle/>
+          <a:p>
+            <a:pPr marR="0" lvl="0" algn="l" defTabSz="914400" rtl="0" eaLnBrk="1" fontAlgn="auto" latinLnBrk="0" hangingPunct="1">
+              <a:lnSpc>
+                <a:spcPct val="100000"/>
+              </a:lnSpc>
+              <a:spcBef>
+                <a:spcPts val="0"/>
+              </a:spcBef>
+              <a:spcAft>
+                <a:spcPts val="0"/>
+              </a:spcAft>
+              <a:buClrTx/>
+              <a:buSzTx/>
+              <a:tabLst/>
+              <a:defRPr/>
+            </a:pPr>
+            <a:r>
+              <a:rPr kumimoji="0" lang="en-US" sz="1200" b="0" i="1" u="none" strike="noStrike" kern="1200" cap="none" spc="0" normalizeH="0" baseline="0" noProof="0" dirty="0">
+                <a:ln>
+                  <a:noFill/>
+                </a:ln>
+                <a:solidFill>
+                  <a:prstClr val="black"/>
+                </a:solidFill>
+                <a:effectLst/>
+                <a:uLnTx/>
+                <a:uFillTx/>
+                <a:latin typeface="Segoe UI" panose="020B0502040204020203" pitchFamily="34" charset="0"/>
+                <a:cs typeface="Segoe UI" panose="020B0502040204020203" pitchFamily="34" charset="0"/>
+              </a:rPr>
+              <a:t>- “expensive” to create</a:t>
+            </a:r>
+          </a:p>
+          <a:p>
+            <a:pPr marR="0" lvl="0" algn="l" defTabSz="914400" rtl="0" eaLnBrk="1" fontAlgn="auto" latinLnBrk="0" hangingPunct="1">
+              <a:lnSpc>
+                <a:spcPct val="100000"/>
+              </a:lnSpc>
+              <a:spcBef>
+                <a:spcPts val="0"/>
+              </a:spcBef>
+              <a:spcAft>
+                <a:spcPts val="0"/>
+              </a:spcAft>
+              <a:buClrTx/>
+              <a:buSzTx/>
+              <a:tabLst/>
+              <a:defRPr/>
+            </a:pPr>
+            <a:r>
+              <a:rPr lang="en-US" sz="1200" i="1" dirty="0">
+                <a:solidFill>
+                  <a:prstClr val="black"/>
+                </a:solidFill>
+                <a:latin typeface="Segoe UI" panose="020B0502040204020203" pitchFamily="34" charset="0"/>
+                <a:cs typeface="Segoe UI" panose="020B0502040204020203" pitchFamily="34" charset="0"/>
+              </a:rPr>
+              <a:t>- Surfaced as property for ‘bulk predictions’</a:t>
+            </a:r>
+            <a:endParaRPr kumimoji="0" lang="en-US" sz="1200" b="0" i="1" u="none" strike="noStrike" kern="1200" cap="none" spc="0" normalizeH="0" baseline="0" noProof="0" dirty="0">
+              <a:ln>
+                <a:noFill/>
+              </a:ln>
+              <a:solidFill>
+                <a:prstClr val="black"/>
+              </a:solidFill>
+              <a:effectLst/>
+              <a:uLnTx/>
+              <a:uFillTx/>
+              <a:latin typeface="Segoe UI" panose="020B0502040204020203" pitchFamily="34" charset="0"/>
+              <a:cs typeface="Segoe UI" panose="020B0502040204020203" pitchFamily="34" charset="0"/>
+            </a:endParaRPr>
+          </a:p>
+          <a:p>
+            <a:pPr marL="285750" marR="0" lvl="0" indent="-285750" algn="l" defTabSz="914400" rtl="0" eaLnBrk="1" fontAlgn="auto" latinLnBrk="0" hangingPunct="1">
+              <a:lnSpc>
+                <a:spcPct val="100000"/>
+              </a:lnSpc>
+              <a:spcBef>
+                <a:spcPts val="0"/>
+              </a:spcBef>
+              <a:spcAft>
+                <a:spcPts val="0"/>
+              </a:spcAft>
+              <a:buClrTx/>
+              <a:buSzTx/>
+              <a:buFont typeface="Arial" panose="020B0604020202020204" pitchFamily="34" charset="0"/>
+              <a:buChar char="•"/>
+              <a:tabLst/>
+              <a:defRPr/>
+            </a:pPr>
+            <a:endParaRPr kumimoji="0" lang="en-US" sz="1200" b="0" i="1" u="none" strike="noStrike" kern="1200" cap="none" spc="0" normalizeH="0" baseline="0" noProof="0" dirty="0">
+              <a:ln>
+                <a:noFill/>
+              </a:ln>
+              <a:solidFill>
+                <a:prstClr val="black"/>
+              </a:solidFill>
+              <a:effectLst/>
+              <a:uLnTx/>
+              <a:uFillTx/>
+              <a:latin typeface="Segoe UI" panose="020B0502040204020203" pitchFamily="34" charset="0"/>
+              <a:cs typeface="Segoe UI" panose="020B0502040204020203" pitchFamily="34" charset="0"/>
+            </a:endParaRPr>
+          </a:p>
+        </p:txBody>
+      </p:sp>
+      <p:sp>
+        <p:nvSpPr>
+          <p:cNvPr id="7" name="Rectangle 6">
+            <a:extLst>
+              <a:ext uri="{FF2B5EF4-FFF2-40B4-BE49-F238E27FC236}">
+                <a16:creationId xmlns:a16="http://schemas.microsoft.com/office/drawing/2014/main" id="{CF043600-1AB5-4F5B-ABF1-007C1C010DDE}"/>
+              </a:ext>
+            </a:extLst>
+          </p:cNvPr>
+          <p:cNvSpPr/>
+          <p:nvPr/>
+        </p:nvSpPr>
+        <p:spPr>
+          <a:xfrm>
+            <a:off x="3437011" y="457397"/>
+            <a:ext cx="3265638" cy="830997"/>
           </a:xfrm>
           <a:prstGeom prst="rect">
             <a:avLst/>
@@ -7311,7 +7548,7 @@
               <a:defRPr/>
             </a:pPr>
             <a:r>
-              <a:rPr kumimoji="0" lang="en-US" sz="1600" b="0" i="0" u="none" strike="noStrike" kern="1200" cap="none" spc="0" normalizeH="0" baseline="0" noProof="0" dirty="0">
+              <a:rPr kumimoji="0" lang="en-US" sz="2400" b="1" i="0" u="none" strike="noStrike" kern="1200" cap="none" spc="0" normalizeH="0" baseline="0" noProof="0" dirty="0">
                 <a:ln>
                   <a:noFill/>
                 </a:ln>
@@ -7321,43 +7558,30 @@
                 <a:effectLst/>
                 <a:uLnTx/>
                 <a:uFillTx/>
-                <a:latin typeface="Segoe UI Light" panose="020B0502040204020203" pitchFamily="34" charset="0"/>
-                <a:ea typeface="+mn-ea"/>
-                <a:cs typeface="Segoe UI Light" panose="020B0502040204020203" pitchFamily="34" charset="0"/>
+                <a:latin typeface="Segoe UI" panose="020B0502040204020203" pitchFamily="34" charset="0"/>
+                <a:cs typeface="Segoe UI" panose="020B0502040204020203" pitchFamily="34" charset="0"/>
               </a:rPr>
-              <a:t>(Singleton)</a:t>
-            </a:r>
-          </a:p>
-        </p:txBody>
-      </p:sp>
-      <p:sp>
-        <p:nvSpPr>
-          <p:cNvPr id="18" name="Rectangle 17">
-            <a:extLst>
-              <a:ext uri="{FF2B5EF4-FFF2-40B4-BE49-F238E27FC236}">
-                <a16:creationId xmlns:a16="http://schemas.microsoft.com/office/drawing/2014/main" id="{F9C25AB3-BAF4-4A30-9E2A-483C3458FA6B}"/>
-              </a:ext>
-            </a:extLst>
-          </p:cNvPr>
-          <p:cNvSpPr/>
-          <p:nvPr/>
-        </p:nvSpPr>
-        <p:spPr>
-          <a:xfrm>
-            <a:off x="4115951" y="3436445"/>
-            <a:ext cx="1103187" cy="338554"/>
-          </a:xfrm>
-          <a:prstGeom prst="rect">
-            <a:avLst/>
-          </a:prstGeom>
-        </p:spPr>
-        <p:txBody>
-          <a:bodyPr wrap="none">
-            <a:spAutoFit/>
-          </a:bodyPr>
-          <a:lstStyle/>
-          <a:p>
-            <a:pPr marL="0" marR="0" lvl="0" indent="0" algn="l" defTabSz="914400" rtl="0" eaLnBrk="1" fontAlgn="auto" latinLnBrk="0" hangingPunct="1">
+              <a:t>MLModelEngine</a:t>
+            </a:r>
+            <a:r>
+              <a:rPr kumimoji="0" lang="en-US" sz="2400" b="0" i="0" u="none" strike="noStrike" kern="1200" cap="none" spc="0" normalizeH="0" baseline="0" noProof="0" dirty="0">
+                <a:ln>
+                  <a:noFill/>
+                </a:ln>
+                <a:solidFill>
+                  <a:prstClr val="black"/>
+                </a:solidFill>
+                <a:effectLst/>
+                <a:uLnTx/>
+                <a:uFillTx/>
+                <a:latin typeface="Segoe UI" panose="020B0502040204020203" pitchFamily="34" charset="0"/>
+                <a:cs typeface="Segoe UI" panose="020B0502040204020203" pitchFamily="34" charset="0"/>
+              </a:rPr>
+              <a:t> class</a:t>
+            </a:r>
+          </a:p>
+          <a:p>
+            <a:pPr marL="0" marR="0" lvl="0" indent="0" algn="ctr" defTabSz="914400" rtl="0" eaLnBrk="1" fontAlgn="auto" latinLnBrk="0" hangingPunct="1">
               <a:lnSpc>
                 <a:spcPct val="100000"/>
               </a:lnSpc>
@@ -7375,31 +7599,37 @@
               <a:defRPr/>
             </a:pPr>
             <a:r>
-              <a:rPr kumimoji="0" lang="en-US" sz="1600" b="0" i="0" u="none" strike="noStrike" kern="1200" cap="none" spc="0" normalizeH="0" baseline="0" noProof="0" dirty="0">
-                <a:ln>
-                  <a:noFill/>
-                </a:ln>
+              <a:rPr lang="en-US" sz="2400" dirty="0">
                 <a:solidFill>
                   <a:prstClr val="black"/>
                 </a:solidFill>
-                <a:effectLst/>
-                <a:uLnTx/>
-                <a:uFillTx/>
-                <a:latin typeface="Segoe UI Light" panose="020B0502040204020203" pitchFamily="34" charset="0"/>
-                <a:ea typeface="+mn-ea"/>
-                <a:cs typeface="Segoe UI Light" panose="020B0502040204020203" pitchFamily="34" charset="0"/>
+                <a:latin typeface="Segoe UI" panose="020B0502040204020203" pitchFamily="34" charset="0"/>
+                <a:cs typeface="Segoe UI" panose="020B0502040204020203" pitchFamily="34" charset="0"/>
               </a:rPr>
               <a:t>(Singleton)</a:t>
             </a:r>
-          </a:p>
-        </p:txBody>
-      </p:sp>
-      <p:sp>
-        <p:nvSpPr>
-          <p:cNvPr id="19" name="Rectangle 18">
-            <a:extLst>
-              <a:ext uri="{FF2B5EF4-FFF2-40B4-BE49-F238E27FC236}">
-                <a16:creationId xmlns:a16="http://schemas.microsoft.com/office/drawing/2014/main" id="{A1A6727E-042D-477B-BACC-85756112F16B}"/>
+            <a:endParaRPr kumimoji="0" lang="en-US" sz="2400" b="0" i="0" u="none" strike="noStrike" kern="1200" cap="none" spc="0" normalizeH="0" baseline="0" noProof="0" dirty="0">
+              <a:ln>
+                <a:noFill/>
+              </a:ln>
+              <a:solidFill>
+                <a:prstClr val="black"/>
+              </a:solidFill>
+              <a:effectLst/>
+              <a:uLnTx/>
+              <a:uFillTx/>
+              <a:latin typeface="Segoe UI" panose="020B0502040204020203" pitchFamily="34" charset="0"/>
+              <a:cs typeface="Segoe UI" panose="020B0502040204020203" pitchFamily="34" charset="0"/>
+            </a:endParaRPr>
+          </a:p>
+        </p:txBody>
+      </p:sp>
+      <p:sp>
+        <p:nvSpPr>
+          <p:cNvPr id="20" name="Rectangle 19">
+            <a:extLst>
+              <a:ext uri="{FF2B5EF4-FFF2-40B4-BE49-F238E27FC236}">
+                <a16:creationId xmlns:a16="http://schemas.microsoft.com/office/drawing/2014/main" id="{69925B40-AA61-4220-8656-DE8605B57A01}"/>
               </a:ext>
             </a:extLst>
           </p:cNvPr>
@@ -7408,361 +7638,8 @@
         </p:nvSpPr>
         <p:spPr>
           <a:xfrm>
-            <a:off x="4402004" y="5184718"/>
-            <a:ext cx="1993250" cy="954107"/>
-          </a:xfrm>
-          <a:prstGeom prst="rect">
-            <a:avLst/>
-          </a:prstGeom>
-        </p:spPr>
-        <p:txBody>
-          <a:bodyPr wrap="square">
-            <a:spAutoFit/>
-          </a:bodyPr>
-          <a:lstStyle/>
-          <a:p>
-            <a:pPr marL="0" marR="0" lvl="0" indent="0" algn="l" defTabSz="914400" rtl="0" eaLnBrk="1" fontAlgn="auto" latinLnBrk="0" hangingPunct="1">
-              <a:lnSpc>
-                <a:spcPct val="100000"/>
-              </a:lnSpc>
-              <a:spcBef>
-                <a:spcPts val="0"/>
-              </a:spcBef>
-              <a:spcAft>
-                <a:spcPts val="0"/>
-              </a:spcAft>
-              <a:buClrTx/>
-              <a:buSzTx/>
-              <a:buFontTx/>
-              <a:buNone/>
-              <a:tabLst/>
-              <a:defRPr/>
-            </a:pPr>
-            <a:r>
-              <a:rPr kumimoji="0" lang="en-US" sz="1400" b="0" i="0" u="none" strike="noStrike" kern="1200" cap="none" spc="0" normalizeH="0" baseline="0" noProof="0" dirty="0">
-                <a:ln>
-                  <a:noFill/>
-                </a:ln>
-                <a:solidFill>
-                  <a:prstClr val="black"/>
-                </a:solidFill>
-                <a:effectLst/>
-                <a:uLnTx/>
-                <a:uFillTx/>
-                <a:latin typeface="Segoe UI Light" panose="020B0502040204020203" pitchFamily="34" charset="0"/>
-                <a:ea typeface="+mn-ea"/>
-                <a:cs typeface="Segoe UI Light" panose="020B0502040204020203" pitchFamily="34" charset="0"/>
-              </a:rPr>
-              <a:t>‘n’ PredictionEngine objects in a pool.</a:t>
-            </a:r>
-          </a:p>
-          <a:p>
-            <a:pPr marL="0" marR="0" lvl="0" indent="0" algn="l" defTabSz="914400" rtl="0" eaLnBrk="1" fontAlgn="auto" latinLnBrk="0" hangingPunct="1">
-              <a:lnSpc>
-                <a:spcPct val="100000"/>
-              </a:lnSpc>
-              <a:spcBef>
-                <a:spcPts val="0"/>
-              </a:spcBef>
-              <a:spcAft>
-                <a:spcPts val="0"/>
-              </a:spcAft>
-              <a:buClrTx/>
-              <a:buSzTx/>
-              <a:buFontTx/>
-              <a:buNone/>
-              <a:tabLst/>
-              <a:defRPr/>
-            </a:pPr>
-            <a:r>
-              <a:rPr kumimoji="0" lang="en-US" sz="1400" b="0" i="0" u="none" strike="noStrike" kern="1200" cap="none" spc="0" normalizeH="0" baseline="0" noProof="0" dirty="0">
-                <a:ln>
-                  <a:noFill/>
-                </a:ln>
-                <a:solidFill>
-                  <a:prstClr val="black"/>
-                </a:solidFill>
-                <a:effectLst/>
-                <a:uLnTx/>
-                <a:uFillTx/>
-                <a:latin typeface="Segoe UI Light" panose="020B0502040204020203" pitchFamily="34" charset="0"/>
-                <a:ea typeface="+mn-ea"/>
-                <a:cs typeface="Segoe UI Light" panose="020B0502040204020203" pitchFamily="34" charset="0"/>
-              </a:rPr>
-              <a:t>Not Thread safe while “expensive” to create.</a:t>
-            </a:r>
-          </a:p>
-        </p:txBody>
-      </p:sp>
-      <p:cxnSp>
-        <p:nvCxnSpPr>
-          <p:cNvPr id="21" name="Straight Connector 20">
-            <a:extLst>
-              <a:ext uri="{FF2B5EF4-FFF2-40B4-BE49-F238E27FC236}">
-                <a16:creationId xmlns:a16="http://schemas.microsoft.com/office/drawing/2014/main" id="{AFB28DA7-B846-48C8-BC04-6FD6FDF3C58D}"/>
-              </a:ext>
-            </a:extLst>
-          </p:cNvPr>
-          <p:cNvCxnSpPr>
-            <a:cxnSpLocks/>
-          </p:cNvCxnSpPr>
-          <p:nvPr/>
-        </p:nvCxnSpPr>
-        <p:spPr>
-          <a:xfrm>
-            <a:off x="9609925" y="4584086"/>
-            <a:ext cx="413342" cy="0"/>
-          </a:xfrm>
-          <a:prstGeom prst="line">
-            <a:avLst/>
-          </a:prstGeom>
-          <a:ln w="12700">
-            <a:solidFill>
-              <a:schemeClr val="tx1"/>
-            </a:solidFill>
-            <a:tailEnd type="oval"/>
-          </a:ln>
-        </p:spPr>
-        <p:style>
-          <a:lnRef idx="1">
-            <a:schemeClr val="accent1"/>
-          </a:lnRef>
-          <a:fillRef idx="0">
-            <a:schemeClr val="accent1"/>
-          </a:fillRef>
-          <a:effectRef idx="0">
-            <a:schemeClr val="accent1"/>
-          </a:effectRef>
-          <a:fontRef idx="minor">
-            <a:schemeClr val="tx1"/>
-          </a:fontRef>
-        </p:style>
-      </p:cxnSp>
-      <p:sp>
-        <p:nvSpPr>
-          <p:cNvPr id="22" name="Rectangle 21">
-            <a:extLst>
-              <a:ext uri="{FF2B5EF4-FFF2-40B4-BE49-F238E27FC236}">
-                <a16:creationId xmlns:a16="http://schemas.microsoft.com/office/drawing/2014/main" id="{C02DC5CB-6C20-4D89-AB04-3F25B65BDCA3}"/>
-              </a:ext>
-            </a:extLst>
-          </p:cNvPr>
-          <p:cNvSpPr/>
-          <p:nvPr/>
-        </p:nvSpPr>
-        <p:spPr>
-          <a:xfrm>
-            <a:off x="10027322" y="4414809"/>
-            <a:ext cx="889090" cy="338554"/>
-          </a:xfrm>
-          <a:prstGeom prst="rect">
-            <a:avLst/>
-          </a:prstGeom>
-        </p:spPr>
-        <p:txBody>
-          <a:bodyPr wrap="square">
-            <a:spAutoFit/>
-          </a:bodyPr>
-          <a:lstStyle/>
-          <a:p>
-            <a:pPr marL="0" marR="0" lvl="0" indent="0" algn="l" defTabSz="914400" rtl="0" eaLnBrk="1" fontAlgn="auto" latinLnBrk="0" hangingPunct="1">
-              <a:lnSpc>
-                <a:spcPct val="100000"/>
-              </a:lnSpc>
-              <a:spcBef>
-                <a:spcPts val="0"/>
-              </a:spcBef>
-              <a:spcAft>
-                <a:spcPts val="0"/>
-              </a:spcAft>
-              <a:buClrTx/>
-              <a:buSzTx/>
-              <a:buFontTx/>
-              <a:buNone/>
-              <a:tabLst/>
-              <a:defRPr/>
-            </a:pPr>
-            <a:r>
-              <a:rPr kumimoji="0" lang="en-US" sz="1600" b="0" i="0" u="none" strike="noStrike" kern="1200" cap="none" spc="0" normalizeH="0" baseline="0" noProof="0" dirty="0">
-                <a:ln>
-                  <a:noFill/>
-                </a:ln>
-                <a:solidFill>
-                  <a:prstClr val="black"/>
-                </a:solidFill>
-                <a:effectLst/>
-                <a:uLnTx/>
-                <a:uFillTx/>
-                <a:latin typeface="Segoe UI Light" panose="020B0502040204020203" pitchFamily="34" charset="0"/>
-                <a:ea typeface="+mn-ea"/>
-                <a:cs typeface="Segoe UI Light" panose="020B0502040204020203" pitchFamily="34" charset="0"/>
-              </a:rPr>
-              <a:t>Predict()</a:t>
-            </a:r>
-          </a:p>
-        </p:txBody>
-      </p:sp>
-      <p:sp>
-        <p:nvSpPr>
-          <p:cNvPr id="28" name="Rectangle 27">
-            <a:extLst>
-              <a:ext uri="{FF2B5EF4-FFF2-40B4-BE49-F238E27FC236}">
-                <a16:creationId xmlns:a16="http://schemas.microsoft.com/office/drawing/2014/main" id="{6BB4E3A5-7B9D-4BEA-9C3E-D4221623ACD7}"/>
-              </a:ext>
-            </a:extLst>
-          </p:cNvPr>
-          <p:cNvSpPr/>
-          <p:nvPr/>
-        </p:nvSpPr>
-        <p:spPr>
-          <a:xfrm>
-            <a:off x="3687260" y="3693465"/>
-            <a:ext cx="1956177" cy="338554"/>
-          </a:xfrm>
-          <a:prstGeom prst="rect">
-            <a:avLst/>
-          </a:prstGeom>
-        </p:spPr>
-        <p:txBody>
-          <a:bodyPr wrap="none">
-            <a:spAutoFit/>
-          </a:bodyPr>
-          <a:lstStyle/>
-          <a:p>
-            <a:pPr marL="0" marR="0" lvl="0" indent="0" algn="l" defTabSz="914400" rtl="0" eaLnBrk="1" fontAlgn="auto" latinLnBrk="0" hangingPunct="1">
-              <a:lnSpc>
-                <a:spcPct val="100000"/>
-              </a:lnSpc>
-              <a:spcBef>
-                <a:spcPts val="0"/>
-              </a:spcBef>
-              <a:spcAft>
-                <a:spcPts val="0"/>
-              </a:spcAft>
-              <a:buClrTx/>
-              <a:buSzTx/>
-              <a:buFontTx/>
-              <a:buNone/>
-              <a:tabLst/>
-              <a:defRPr/>
-            </a:pPr>
-            <a:r>
-              <a:rPr kumimoji="0" lang="en-US" sz="1600" b="0" i="0" u="none" strike="noStrike" kern="1200" cap="none" spc="0" normalizeH="0" baseline="0" noProof="0" dirty="0">
-                <a:ln>
-                  <a:noFill/>
-                </a:ln>
-                <a:solidFill>
-                  <a:prstClr val="black"/>
-                </a:solidFill>
-                <a:effectLst/>
-                <a:uLnTx/>
-                <a:uFillTx/>
-                <a:latin typeface="Segoe UI Light" panose="020B0502040204020203" pitchFamily="34" charset="0"/>
-                <a:ea typeface="+mn-ea"/>
-                <a:cs typeface="Segoe UI Light" panose="020B0502040204020203" pitchFamily="34" charset="0"/>
-              </a:rPr>
-              <a:t>“expensive” to create</a:t>
-            </a:r>
-          </a:p>
-        </p:txBody>
-      </p:sp>
-      <p:sp>
-        <p:nvSpPr>
-          <p:cNvPr id="7" name="Rectangle 6">
-            <a:extLst>
-              <a:ext uri="{FF2B5EF4-FFF2-40B4-BE49-F238E27FC236}">
-                <a16:creationId xmlns:a16="http://schemas.microsoft.com/office/drawing/2014/main" id="{CF043600-1AB5-4F5B-ABF1-007C1C010DDE}"/>
-              </a:ext>
-            </a:extLst>
-          </p:cNvPr>
-          <p:cNvSpPr/>
-          <p:nvPr/>
-        </p:nvSpPr>
-        <p:spPr>
-          <a:xfrm>
-            <a:off x="612698" y="484792"/>
-            <a:ext cx="2441694" cy="400110"/>
-          </a:xfrm>
-          <a:prstGeom prst="rect">
-            <a:avLst/>
-          </a:prstGeom>
-        </p:spPr>
-        <p:txBody>
-          <a:bodyPr wrap="none">
-            <a:spAutoFit/>
-          </a:bodyPr>
-          <a:lstStyle/>
-          <a:p>
-            <a:pPr marL="0" marR="0" lvl="0" indent="0" algn="l" defTabSz="914400" rtl="0" eaLnBrk="1" fontAlgn="auto" latinLnBrk="0" hangingPunct="1">
-              <a:lnSpc>
-                <a:spcPct val="100000"/>
-              </a:lnSpc>
-              <a:spcBef>
-                <a:spcPts val="0"/>
-              </a:spcBef>
-              <a:spcAft>
-                <a:spcPts val="0"/>
-              </a:spcAft>
-              <a:buClrTx/>
-              <a:buSzTx/>
-              <a:buFontTx/>
-              <a:buNone/>
-              <a:tabLst/>
-              <a:defRPr/>
-            </a:pPr>
-            <a:r>
-              <a:rPr kumimoji="0" lang="en-US" sz="2000" b="0" i="0" u="none" strike="noStrike" kern="1200" cap="none" spc="0" normalizeH="0" baseline="0" noProof="0" dirty="0">
-                <a:ln>
-                  <a:noFill/>
-                </a:ln>
-                <a:solidFill>
-                  <a:prstClr val="black"/>
-                </a:solidFill>
-                <a:effectLst/>
-                <a:uLnTx/>
-                <a:uFillTx/>
-                <a:latin typeface="Calibri" panose="020F0502020204030204"/>
-                <a:ea typeface="+mn-ea"/>
-                <a:cs typeface="+mn-cs"/>
-              </a:rPr>
-              <a:t>MLModelEngine</a:t>
-            </a:r>
-            <a:r>
-              <a:rPr kumimoji="0" lang="en-US" sz="2000" b="0" i="0" u="none" strike="noStrike" kern="1200" cap="none" spc="0" normalizeH="0" baseline="0" noProof="0" dirty="0">
-                <a:ln>
-                  <a:noFill/>
-                </a:ln>
-                <a:solidFill>
-                  <a:prstClr val="black"/>
-                </a:solidFill>
-                <a:effectLst/>
-                <a:uLnTx/>
-                <a:uFillTx/>
-                <a:latin typeface="Segoe UI Light" panose="020B0502040204020203" pitchFamily="34" charset="0"/>
-                <a:ea typeface="+mn-ea"/>
-                <a:cs typeface="Segoe UI Light" panose="020B0502040204020203" pitchFamily="34" charset="0"/>
-              </a:rPr>
-              <a:t> class</a:t>
-            </a:r>
-          </a:p>
-        </p:txBody>
-      </p:sp>
-      <p:sp>
-        <p:nvSpPr>
-          <p:cNvPr id="20" name="Rectangle 19">
-            <a:extLst>
-              <a:ext uri="{FF2B5EF4-FFF2-40B4-BE49-F238E27FC236}">
-                <a16:creationId xmlns:a16="http://schemas.microsoft.com/office/drawing/2014/main" id="{69925B40-AA61-4220-8656-DE8605B57A01}"/>
-              </a:ext>
-            </a:extLst>
-          </p:cNvPr>
-          <p:cNvSpPr/>
-          <p:nvPr/>
-        </p:nvSpPr>
-        <p:spPr>
-          <a:xfrm>
-            <a:off x="6220533" y="3395627"/>
-            <a:ext cx="2191520" cy="2743198"/>
+            <a:off x="6186843" y="1701495"/>
+            <a:ext cx="2397569" cy="2917105"/>
           </a:xfrm>
           <a:prstGeom prst="rect">
             <a:avLst/>
@@ -7811,7 +7688,7 @@
               <a:tabLst/>
               <a:defRPr/>
             </a:pPr>
-            <a:endParaRPr kumimoji="0" lang="en-US" sz="1800" b="0" i="0" u="none" strike="noStrike" kern="1200" cap="none" spc="0" normalizeH="0" baseline="0" noProof="0">
+            <a:endParaRPr kumimoji="0" lang="en-US" sz="1600" b="0" i="0" u="none" strike="noStrike" kern="1200" cap="none" spc="0" normalizeH="0" baseline="0" noProof="0">
               <a:ln>
                 <a:noFill/>
               </a:ln>
@@ -7821,9 +7698,8 @@
               <a:effectLst/>
               <a:uLnTx/>
               <a:uFillTx/>
-              <a:latin typeface="Calibri" panose="020F0502020204030204"/>
-              <a:ea typeface="+mn-ea"/>
-              <a:cs typeface="+mn-cs"/>
+              <a:latin typeface="Segoe UI" panose="020B0502040204020203" pitchFamily="34" charset="0"/>
+              <a:cs typeface="Segoe UI" panose="020B0502040204020203" pitchFamily="34" charset="0"/>
             </a:endParaRPr>
           </a:p>
         </p:txBody>
@@ -7842,7 +7718,7 @@
         </p:nvSpPr>
         <p:spPr>
           <a:xfrm>
-            <a:off x="6731779" y="4840437"/>
+            <a:off x="6698090" y="3320212"/>
             <a:ext cx="1413984" cy="400814"/>
           </a:xfrm>
           <a:prstGeom prst="rect">
@@ -7893,7 +7769,7 @@
               <a:defRPr/>
             </a:pPr>
             <a:r>
-              <a:rPr kumimoji="0" lang="en-US" sz="1400" b="0" i="0" u="none" strike="noStrike" kern="1200" cap="none" spc="0" normalizeH="0" baseline="0" noProof="0" dirty="0">
+              <a:rPr kumimoji="0" lang="en-US" sz="1200" b="0" i="0" u="none" strike="noStrike" kern="1200" cap="none" spc="0" normalizeH="0" baseline="0" noProof="0" dirty="0">
                 <a:ln>
                   <a:noFill/>
                 </a:ln>
@@ -7903,9 +7779,8 @@
                 <a:effectLst/>
                 <a:uLnTx/>
                 <a:uFillTx/>
-                <a:latin typeface="Calibri" panose="020F0502020204030204"/>
-                <a:ea typeface="+mn-ea"/>
-                <a:cs typeface="+mn-cs"/>
+                <a:latin typeface="Segoe UI" panose="020B0502040204020203" pitchFamily="34" charset="0"/>
+                <a:cs typeface="Segoe UI" panose="020B0502040204020203" pitchFamily="34" charset="0"/>
               </a:rPr>
               <a:t>PredictionEngine</a:t>
             </a:r>
@@ -7926,7 +7801,7 @@
         </p:nvSpPr>
         <p:spPr>
           <a:xfrm>
-            <a:off x="6731779" y="3920193"/>
+            <a:off x="6698090" y="2399968"/>
             <a:ext cx="1413984" cy="400814"/>
           </a:xfrm>
           <a:prstGeom prst="rect">
@@ -7977,7 +7852,7 @@
               <a:defRPr/>
             </a:pPr>
             <a:r>
-              <a:rPr kumimoji="0" lang="en-US" sz="1400" b="0" i="0" u="none" strike="noStrike" kern="1200" cap="none" spc="0" normalizeH="0" baseline="0" noProof="0" dirty="0">
+              <a:rPr kumimoji="0" lang="en-US" sz="1200" b="0" i="0" u="none" strike="noStrike" kern="1200" cap="none" spc="0" normalizeH="0" baseline="0" noProof="0" dirty="0">
                 <a:ln>
                   <a:noFill/>
                 </a:ln>
@@ -7987,9 +7862,8 @@
                 <a:effectLst/>
                 <a:uLnTx/>
                 <a:uFillTx/>
-                <a:latin typeface="Calibri" panose="020F0502020204030204"/>
-                <a:ea typeface="+mn-ea"/>
-                <a:cs typeface="+mn-cs"/>
+                <a:latin typeface="Segoe UI" panose="020B0502040204020203" pitchFamily="34" charset="0"/>
+                <a:cs typeface="Segoe UI" panose="020B0502040204020203" pitchFamily="34" charset="0"/>
               </a:rPr>
               <a:t>PredictionEngine</a:t>
             </a:r>
@@ -8010,7 +7884,7 @@
         </p:nvSpPr>
         <p:spPr>
           <a:xfrm>
-            <a:off x="6731779" y="5302076"/>
+            <a:off x="6698090" y="3781851"/>
             <a:ext cx="1413984" cy="400814"/>
           </a:xfrm>
           <a:prstGeom prst="rect">
@@ -8061,7 +7935,7 @@
               <a:defRPr/>
             </a:pPr>
             <a:r>
-              <a:rPr kumimoji="0" lang="en-US" sz="1400" b="0" i="0" u="none" strike="noStrike" kern="1200" cap="none" spc="0" normalizeH="0" baseline="0" noProof="0" dirty="0">
+              <a:rPr kumimoji="0" lang="en-US" sz="1200" b="0" i="0" u="none" strike="noStrike" kern="1200" cap="none" spc="0" normalizeH="0" baseline="0" noProof="0" dirty="0">
                 <a:ln>
                   <a:noFill/>
                 </a:ln>
@@ -8071,9 +7945,8 @@
                 <a:effectLst/>
                 <a:uLnTx/>
                 <a:uFillTx/>
-                <a:latin typeface="Calibri" panose="020F0502020204030204"/>
-                <a:ea typeface="+mn-ea"/>
-                <a:cs typeface="+mn-cs"/>
+                <a:latin typeface="Segoe UI" panose="020B0502040204020203" pitchFamily="34" charset="0"/>
+                <a:cs typeface="Segoe UI" panose="020B0502040204020203" pitchFamily="34" charset="0"/>
               </a:rPr>
               <a:t>PredictionEngine</a:t>
             </a:r>
@@ -8094,8 +7967,8 @@
         </p:nvSpPr>
         <p:spPr>
           <a:xfrm>
-            <a:off x="7267089" y="5677147"/>
-            <a:ext cx="343364" cy="369332"/>
+            <a:off x="7233400" y="4156922"/>
+            <a:ext cx="335348" cy="338554"/>
           </a:xfrm>
           <a:prstGeom prst="rect">
             <a:avLst/>
@@ -8125,7 +7998,7 @@
               <a:defRPr/>
             </a:pPr>
             <a:r>
-              <a:rPr kumimoji="0" lang="en-US" sz="1800" b="0" i="0" u="none" strike="noStrike" kern="1200" cap="none" spc="0" normalizeH="0" baseline="0" noProof="0" dirty="0">
+              <a:rPr kumimoji="0" lang="en-US" sz="1600" b="0" i="0" u="none" strike="noStrike" kern="1200" cap="none" spc="0" normalizeH="0" baseline="0" noProof="0" dirty="0">
                 <a:ln>
                   <a:noFill/>
                 </a:ln>
@@ -8135,9 +8008,8 @@
                 <a:effectLst/>
                 <a:uLnTx/>
                 <a:uFillTx/>
-                <a:latin typeface="Calibri" panose="020F0502020204030204"/>
-                <a:ea typeface="+mn-ea"/>
-                <a:cs typeface="+mn-cs"/>
+                <a:latin typeface="Segoe UI" panose="020B0502040204020203" pitchFamily="34" charset="0"/>
+                <a:cs typeface="Segoe UI" panose="020B0502040204020203" pitchFamily="34" charset="0"/>
               </a:rPr>
               <a:t>…</a:t>
             </a:r>
@@ -8158,8 +8030,8 @@
         </p:nvSpPr>
         <p:spPr>
           <a:xfrm>
-            <a:off x="6316487" y="3421056"/>
-            <a:ext cx="1298945" cy="369332"/>
+            <a:off x="6212410" y="1709836"/>
+            <a:ext cx="2374624" cy="523220"/>
           </a:xfrm>
           <a:prstGeom prst="rect">
             <a:avLst/>
@@ -8189,7 +8061,7 @@
               <a:defRPr/>
             </a:pPr>
             <a:r>
-              <a:rPr kumimoji="0" lang="en-US" sz="1800" b="0" i="0" u="none" strike="noStrike" kern="1200" cap="none" spc="0" normalizeH="0" baseline="0" noProof="0" dirty="0">
+              <a:rPr kumimoji="0" lang="en-US" sz="1600" b="0" i="0" u="none" strike="noStrike" kern="1200" cap="none" spc="0" normalizeH="0" baseline="0" noProof="0" dirty="0">
                 <a:ln>
                   <a:noFill/>
                 </a:ln>
@@ -8199,30 +8071,27 @@
                 <a:effectLst/>
                 <a:uLnTx/>
                 <a:uFillTx/>
-                <a:latin typeface="Calibri" panose="020F0502020204030204"/>
-                <a:ea typeface="+mn-ea"/>
-                <a:cs typeface="+mn-cs"/>
+                <a:latin typeface="Segoe UI" panose="020B0502040204020203" pitchFamily="34" charset="0"/>
+                <a:cs typeface="Segoe UI" panose="020B0502040204020203" pitchFamily="34" charset="0"/>
               </a:rPr>
-              <a:t>_</a:t>
-            </a:r>
-            <a:r>
-              <a:rPr kumimoji="0" lang="en-US" sz="1800" b="0" i="0" u="none" strike="noStrike" kern="1200" cap="none" spc="0" normalizeH="0" baseline="0" noProof="0" dirty="0" err="1">
-                <a:ln>
-                  <a:noFill/>
-                </a:ln>
+              <a:t>_objectPool</a:t>
+            </a:r>
+          </a:p>
+          <a:p>
+            <a:pPr lvl="0">
+              <a:defRPr/>
+            </a:pPr>
+            <a:r>
+              <a:rPr lang="en-US" sz="1200" dirty="0">
                 <a:solidFill>
                   <a:prstClr val="black"/>
                 </a:solidFill>
-                <a:effectLst/>
-                <a:uLnTx/>
-                <a:uFillTx/>
-                <a:latin typeface="Calibri" panose="020F0502020204030204"/>
-                <a:ea typeface="+mn-ea"/>
-                <a:cs typeface="+mn-cs"/>
+                <a:latin typeface="Segoe UI" panose="020B0502040204020203" pitchFamily="34" charset="0"/>
+                <a:cs typeface="Segoe UI" panose="020B0502040204020203" pitchFamily="34" charset="0"/>
               </a:rPr>
-              <a:t>objectPool</a:t>
-            </a:r>
-            <a:endParaRPr kumimoji="0" lang="en-US" sz="1800" b="0" i="0" u="none" strike="noStrike" kern="1200" cap="none" spc="0" normalizeH="0" baseline="0" noProof="0" dirty="0">
+              <a:t>(ObjectPool&lt;PredictionEngine&gt;)</a:t>
+            </a:r>
+            <a:endParaRPr kumimoji="0" lang="en-US" sz="1200" b="0" i="0" u="none" strike="noStrike" kern="1200" cap="none" spc="0" normalizeH="0" baseline="0" noProof="0" dirty="0">
               <a:ln>
                 <a:noFill/>
               </a:ln>
@@ -8232,9 +8101,8 @@
               <a:effectLst/>
               <a:uLnTx/>
               <a:uFillTx/>
-              <a:latin typeface="Calibri" panose="020F0502020204030204"/>
-              <a:ea typeface="+mn-ea"/>
-              <a:cs typeface="+mn-cs"/>
+              <a:latin typeface="Segoe UI" panose="020B0502040204020203" pitchFamily="34" charset="0"/>
+              <a:cs typeface="Segoe UI" panose="020B0502040204020203" pitchFamily="34" charset="0"/>
             </a:endParaRPr>
           </a:p>
         </p:txBody>
@@ -8256,8 +8124,8 @@
         </p:nvCxnSpPr>
         <p:spPr>
           <a:xfrm flipH="1">
-            <a:off x="8145763" y="4581340"/>
-            <a:ext cx="1464162" cy="459504"/>
+            <a:off x="8112074" y="3063861"/>
+            <a:ext cx="1491281" cy="456758"/>
           </a:xfrm>
           <a:prstGeom prst="straightConnector1">
             <a:avLst/>
@@ -8301,7 +8169,7 @@
         </p:nvCxnSpPr>
         <p:spPr>
           <a:xfrm flipH="1">
-            <a:off x="10775216" y="3106776"/>
+            <a:off x="10741527" y="1586551"/>
             <a:ext cx="312458" cy="1308033"/>
           </a:xfrm>
           <a:prstGeom prst="straightConnector1">
@@ -8344,8 +8212,8 @@
         </p:nvSpPr>
         <p:spPr>
           <a:xfrm>
-            <a:off x="10471867" y="2730711"/>
-            <a:ext cx="1425583" cy="338554"/>
+            <a:off x="10438178" y="1210486"/>
+            <a:ext cx="1327030" cy="307777"/>
           </a:xfrm>
           <a:prstGeom prst="rect">
             <a:avLst/>
@@ -8375,7 +8243,7 @@
               <a:defRPr/>
             </a:pPr>
             <a:r>
-              <a:rPr kumimoji="0" lang="en-US" sz="1600" b="0" i="0" u="none" strike="noStrike" kern="1200" cap="none" spc="0" normalizeH="0" baseline="0" noProof="0" dirty="0">
+              <a:rPr kumimoji="0" lang="en-US" sz="1400" b="0" i="0" u="none" strike="noStrike" kern="1200" cap="none" spc="0" normalizeH="0" baseline="0" noProof="0" dirty="0">
                 <a:ln>
                   <a:noFill/>
                 </a:ln>
@@ -8385,11 +8253,102 @@
                 <a:effectLst/>
                 <a:uLnTx/>
                 <a:uFillTx/>
-                <a:latin typeface="Segoe UI Light" panose="020B0502040204020203" pitchFamily="34" charset="0"/>
-                <a:ea typeface="+mn-ea"/>
-                <a:cs typeface="Segoe UI Light" panose="020B0502040204020203" pitchFamily="34" charset="0"/>
+                <a:latin typeface="Segoe UI" panose="020B0502040204020203" pitchFamily="34" charset="0"/>
+                <a:cs typeface="Segoe UI" panose="020B0502040204020203" pitchFamily="34" charset="0"/>
               </a:rPr>
               <a:t>HTTP requests</a:t>
+            </a:r>
+          </a:p>
+        </p:txBody>
+      </p:sp>
+      <p:sp>
+        <p:nvSpPr>
+          <p:cNvPr id="8" name="Rectangle 7">
+            <a:extLst>
+              <a:ext uri="{FF2B5EF4-FFF2-40B4-BE49-F238E27FC236}">
+                <a16:creationId xmlns:a16="http://schemas.microsoft.com/office/drawing/2014/main" id="{4A0EAA98-6B86-4845-AFAC-54D122A10F51}"/>
+              </a:ext>
+            </a:extLst>
+          </p:cNvPr>
+          <p:cNvSpPr/>
+          <p:nvPr/>
+        </p:nvSpPr>
+        <p:spPr>
+          <a:xfrm>
+            <a:off x="8613629" y="2841282"/>
+            <a:ext cx="912429" cy="307777"/>
+          </a:xfrm>
+          <a:prstGeom prst="rect">
+            <a:avLst/>
+          </a:prstGeom>
+        </p:spPr>
+        <p:txBody>
+          <a:bodyPr wrap="none">
+            <a:spAutoFit/>
+          </a:bodyPr>
+          <a:lstStyle/>
+          <a:p>
+            <a:r>
+              <a:rPr lang="en-US" sz="1400" i="1" dirty="0">
+                <a:solidFill>
+                  <a:prstClr val="black"/>
+                </a:solidFill>
+                <a:latin typeface="Segoe UI" panose="020B0502040204020203" pitchFamily="34" charset="0"/>
+                <a:cs typeface="Segoe UI" panose="020B0502040204020203" pitchFamily="34" charset="0"/>
+              </a:rPr>
+              <a:t>Pick one..</a:t>
+            </a:r>
+          </a:p>
+        </p:txBody>
+      </p:sp>
+      <p:sp>
+        <p:nvSpPr>
+          <p:cNvPr id="27" name="Rectangle 26">
+            <a:extLst>
+              <a:ext uri="{FF2B5EF4-FFF2-40B4-BE49-F238E27FC236}">
+                <a16:creationId xmlns:a16="http://schemas.microsoft.com/office/drawing/2014/main" id="{9594D0F1-642B-4361-880A-702C781AEDC8}"/>
+              </a:ext>
+            </a:extLst>
+          </p:cNvPr>
+          <p:cNvSpPr/>
+          <p:nvPr/>
+        </p:nvSpPr>
+        <p:spPr>
+          <a:xfrm>
+            <a:off x="8627953" y="3286441"/>
+            <a:ext cx="993926" cy="523220"/>
+          </a:xfrm>
+          <a:prstGeom prst="rect">
+            <a:avLst/>
+          </a:prstGeom>
+        </p:spPr>
+        <p:txBody>
+          <a:bodyPr wrap="none">
+            <a:spAutoFit/>
+          </a:bodyPr>
+          <a:lstStyle/>
+          <a:p>
+            <a:r>
+              <a:rPr lang="en-US" sz="1400" i="1" dirty="0">
+                <a:solidFill>
+                  <a:prstClr val="black"/>
+                </a:solidFill>
+                <a:latin typeface="Segoe UI" panose="020B0502040204020203" pitchFamily="34" charset="0"/>
+                <a:cs typeface="Segoe UI" panose="020B0502040204020203" pitchFamily="34" charset="0"/>
+              </a:rPr>
+              <a:t>Return </a:t>
+            </a:r>
+          </a:p>
+          <a:p>
+            <a:r>
+              <a:rPr lang="en-US" sz="1400" i="1" dirty="0">
+                <a:solidFill>
+                  <a:prstClr val="black"/>
+                </a:solidFill>
+                <a:latin typeface="Segoe UI" panose="020B0502040204020203" pitchFamily="34" charset="0"/>
+                <a:cs typeface="Segoe UI" panose="020B0502040204020203" pitchFamily="34" charset="0"/>
+              </a:rPr>
+              <a:t>after used.</a:t>
             </a:r>
           </a:p>
         </p:txBody>

</xml_diff>

<commit_message>
Fixed typos and minor updates
</commit_message>
<xml_diff>
--- a/Posts/001-Running-MLNET-Models-in-ASPNETCore/images/Images-MLNET-ASPNETCore.pptx
+++ b/Posts/001-Running-MLNET-Models-in-ASPNETCore/images/Images-MLNET-ASPNETCore.pptx
@@ -5,13 +5,14 @@
     <p:sldMasterId id="2147483648" r:id="rId1"/>
   </p:sldMasterIdLst>
   <p:notesMasterIdLst>
-    <p:notesMasterId r:id="rId6"/>
+    <p:notesMasterId r:id="rId7"/>
   </p:notesMasterIdLst>
   <p:sldIdLst>
     <p:sldId id="256" r:id="rId2"/>
     <p:sldId id="257" r:id="rId3"/>
     <p:sldId id="258" r:id="rId4"/>
     <p:sldId id="259" r:id="rId5"/>
+    <p:sldId id="260" r:id="rId6"/>
   </p:sldIdLst>
   <p:sldSz cx="12192000" cy="6858000"/>
   <p:notesSz cx="6858000" cy="9144000"/>
@@ -8357,6 +8358,82 @@
     <p:extLst>
       <p:ext uri="{BB962C8B-B14F-4D97-AF65-F5344CB8AC3E}">
         <p14:creationId xmlns:p14="http://schemas.microsoft.com/office/powerpoint/2010/main" val="1186556743"/>
+      </p:ext>
+    </p:extLst>
+  </p:cSld>
+  <p:clrMapOvr>
+    <a:masterClrMapping/>
+  </p:clrMapOvr>
+</p:sld>
+</file>
+
+<file path=ppt/slides/slide5.xml><?xml version="1.0" encoding="utf-8"?>
+<p:sld xmlns:a="http://schemas.openxmlformats.org/drawingml/2006/main" xmlns:r="http://schemas.openxmlformats.org/officeDocument/2006/relationships" xmlns:p="http://schemas.openxmlformats.org/presentationml/2006/main">
+  <p:cSld>
+    <p:spTree>
+      <p:nvGrpSpPr>
+        <p:cNvPr id="1" name=""/>
+        <p:cNvGrpSpPr/>
+        <p:nvPr/>
+      </p:nvGrpSpPr>
+      <p:grpSpPr>
+        <a:xfrm>
+          <a:off x="0" y="0"/>
+          <a:ext cx="0" cy="0"/>
+          <a:chOff x="0" y="0"/>
+          <a:chExt cx="0" cy="0"/>
+        </a:xfrm>
+      </p:grpSpPr>
+      <p:sp>
+        <p:nvSpPr>
+          <p:cNvPr id="2" name="Title 1">
+            <a:extLst>
+              <a:ext uri="{FF2B5EF4-FFF2-40B4-BE49-F238E27FC236}">
+                <a16:creationId xmlns:a16="http://schemas.microsoft.com/office/drawing/2014/main" id="{F15F0F6F-63AB-4DF7-94D2-CBAA1D1C0564}"/>
+              </a:ext>
+            </a:extLst>
+          </p:cNvPr>
+          <p:cNvSpPr>
+            <a:spLocks noGrp="1"/>
+          </p:cNvSpPr>
+          <p:nvPr>
+            <p:ph type="title"/>
+          </p:nvPr>
+        </p:nvSpPr>
+        <p:spPr/>
+        <p:txBody>
+          <a:bodyPr>
+            <a:noAutofit/>
+          </a:bodyPr>
+          <a:lstStyle/>
+          <a:p>
+            <a:r>
+              <a:rPr lang="en-US" sz="2800" dirty="0"/>
+              <a:t>Here's a high level end-to-end architecture diagram of the Web API using the </a:t>
+            </a:r>
+            <a:r>
+              <a:rPr lang="en-US" sz="2800" dirty="0" err="1"/>
+              <a:t>MLModelEngine</a:t>
+            </a:r>
+            <a:r>
+              <a:rPr lang="en-US" sz="2800" dirty="0"/>
+              <a:t> with the Object Pool of </a:t>
+            </a:r>
+            <a:r>
+              <a:rPr lang="en-US" sz="2800" dirty="0" err="1"/>
+              <a:t>PredictionEngine</a:t>
+            </a:r>
+            <a:r>
+              <a:rPr lang="en-US" sz="2800" dirty="0"/>
+              <a:t> objects.</a:t>
+            </a:r>
+          </a:p>
+        </p:txBody>
+      </p:sp>
+    </p:spTree>
+    <p:extLst>
+      <p:ext uri="{BB962C8B-B14F-4D97-AF65-F5344CB8AC3E}">
+        <p14:creationId xmlns:p14="http://schemas.microsoft.com/office/powerpoint/2010/main" val="1074744545"/>
       </p:ext>
     </p:extLst>
   </p:cSld>

</xml_diff>

<commit_message>
Updates on images, e2e architecture, etc.
</commit_message>
<xml_diff>
--- a/Posts/001-Running-MLNET-Models-in-ASPNETCore/images/Images-MLNET-ASPNETCore.pptx
+++ b/Posts/001-Running-MLNET-Models-in-ASPNETCore/images/Images-MLNET-ASPNETCore.pptx
@@ -5,14 +5,15 @@
     <p:sldMasterId id="2147483648" r:id="rId1"/>
   </p:sldMasterIdLst>
   <p:notesMasterIdLst>
-    <p:notesMasterId r:id="rId7"/>
+    <p:notesMasterId r:id="rId8"/>
   </p:notesMasterIdLst>
   <p:sldIdLst>
     <p:sldId id="256" r:id="rId2"/>
     <p:sldId id="257" r:id="rId3"/>
     <p:sldId id="258" r:id="rId4"/>
     <p:sldId id="259" r:id="rId5"/>
-    <p:sldId id="260" r:id="rId6"/>
+    <p:sldId id="262" r:id="rId6"/>
+    <p:sldId id="260" r:id="rId7"/>
   </p:sldIdLst>
   <p:sldSz cx="12192000" cy="6858000"/>
   <p:notesSz cx="6858000" cy="9144000"/>
@@ -915,6 +916,150 @@
     <p:extLst>
       <p:ext uri="{BB962C8B-B14F-4D97-AF65-F5344CB8AC3E}">
         <p14:creationId xmlns:p14="http://schemas.microsoft.com/office/powerpoint/2010/main" val="2915567037"/>
+      </p:ext>
+    </p:extLst>
+  </p:cSld>
+  <p:clrMapOvr>
+    <a:masterClrMapping/>
+  </p:clrMapOvr>
+</p:notes>
+</file>
+
+<file path=ppt/notesSlides/notesSlide5.xml><?xml version="1.0" encoding="utf-8"?>
+<p:notes xmlns:a="http://schemas.openxmlformats.org/drawingml/2006/main" xmlns:r="http://schemas.openxmlformats.org/officeDocument/2006/relationships" xmlns:p="http://schemas.openxmlformats.org/presentationml/2006/main">
+  <p:cSld>
+    <p:spTree>
+      <p:nvGrpSpPr>
+        <p:cNvPr id="1" name=""/>
+        <p:cNvGrpSpPr/>
+        <p:nvPr/>
+      </p:nvGrpSpPr>
+      <p:grpSpPr>
+        <a:xfrm>
+          <a:off x="0" y="0"/>
+          <a:ext cx="0" cy="0"/>
+          <a:chOff x="0" y="0"/>
+          <a:chExt cx="0" cy="0"/>
+        </a:xfrm>
+      </p:grpSpPr>
+      <p:sp>
+        <p:nvSpPr>
+          <p:cNvPr id="2" name="Slide Image Placeholder 1"/>
+          <p:cNvSpPr>
+            <a:spLocks noGrp="1" noRot="1" noChangeAspect="1"/>
+          </p:cNvSpPr>
+          <p:nvPr>
+            <p:ph type="sldImg"/>
+          </p:nvPr>
+        </p:nvSpPr>
+        <p:spPr/>
+      </p:sp>
+      <p:sp>
+        <p:nvSpPr>
+          <p:cNvPr id="3" name="Notes Placeholder 2"/>
+          <p:cNvSpPr>
+            <a:spLocks noGrp="1"/>
+          </p:cNvSpPr>
+          <p:nvPr>
+            <p:ph type="body" idx="1"/>
+          </p:nvPr>
+        </p:nvSpPr>
+        <p:spPr/>
+        <p:txBody>
+          <a:bodyPr/>
+          <a:lstStyle/>
+          <a:p>
+            <a:endParaRPr lang="en-US" dirty="0"/>
+          </a:p>
+        </p:txBody>
+      </p:sp>
+      <p:sp>
+        <p:nvSpPr>
+          <p:cNvPr id="4" name="Slide Number Placeholder 3"/>
+          <p:cNvSpPr>
+            <a:spLocks noGrp="1"/>
+          </p:cNvSpPr>
+          <p:nvPr>
+            <p:ph type="sldNum" sz="quarter" idx="5"/>
+          </p:nvPr>
+        </p:nvSpPr>
+        <p:spPr/>
+        <p:txBody>
+          <a:bodyPr/>
+          <a:lstStyle/>
+          <a:p>
+            <a:pPr marL="0" marR="0" lvl="0" indent="0" algn="r" defTabSz="914400" rtl="0" eaLnBrk="1" fontAlgn="auto" latinLnBrk="0" hangingPunct="1">
+              <a:lnSpc>
+                <a:spcPct val="100000"/>
+              </a:lnSpc>
+              <a:spcBef>
+                <a:spcPts val="0"/>
+              </a:spcBef>
+              <a:spcAft>
+                <a:spcPts val="0"/>
+              </a:spcAft>
+              <a:buClrTx/>
+              <a:buSzTx/>
+              <a:buFontTx/>
+              <a:buNone/>
+              <a:tabLst/>
+              <a:defRPr/>
+            </a:pPr>
+            <a:fld id="{1CBB58DA-6D89-467A-B49E-3277B1054FF5}" type="slidenum">
+              <a:rPr kumimoji="0" lang="en-US" sz="1200" b="0" i="0" u="none" strike="noStrike" kern="1200" cap="none" spc="0" normalizeH="0" baseline="0" noProof="0" smtClean="0">
+                <a:ln>
+                  <a:noFill/>
+                </a:ln>
+                <a:solidFill>
+                  <a:prstClr val="black"/>
+                </a:solidFill>
+                <a:effectLst/>
+                <a:uLnTx/>
+                <a:uFillTx/>
+                <a:latin typeface="Calibri" panose="020F0502020204030204"/>
+                <a:ea typeface="+mn-ea"/>
+                <a:cs typeface="+mn-cs"/>
+              </a:rPr>
+              <a:pPr marL="0" marR="0" lvl="0" indent="0" algn="r" defTabSz="914400" rtl="0" eaLnBrk="1" fontAlgn="auto" latinLnBrk="0" hangingPunct="1">
+                <a:lnSpc>
+                  <a:spcPct val="100000"/>
+                </a:lnSpc>
+                <a:spcBef>
+                  <a:spcPts val="0"/>
+                </a:spcBef>
+                <a:spcAft>
+                  <a:spcPts val="0"/>
+                </a:spcAft>
+                <a:buClrTx/>
+                <a:buSzTx/>
+                <a:buFontTx/>
+                <a:buNone/>
+                <a:tabLst/>
+                <a:defRPr/>
+              </a:pPr>
+              <a:t>5</a:t>
+            </a:fld>
+            <a:endParaRPr kumimoji="0" lang="en-US" sz="1200" b="0" i="0" u="none" strike="noStrike" kern="1200" cap="none" spc="0" normalizeH="0" baseline="0" noProof="0">
+              <a:ln>
+                <a:noFill/>
+              </a:ln>
+              <a:solidFill>
+                <a:prstClr val="black"/>
+              </a:solidFill>
+              <a:effectLst/>
+              <a:uLnTx/>
+              <a:uFillTx/>
+              <a:latin typeface="Calibri" panose="020F0502020204030204"/>
+              <a:ea typeface="+mn-ea"/>
+              <a:cs typeface="+mn-cs"/>
+            </a:endParaRPr>
+          </a:p>
+        </p:txBody>
+      </p:sp>
+    </p:spTree>
+    <p:extLst>
+      <p:ext uri="{BB962C8B-B14F-4D97-AF65-F5344CB8AC3E}">
+        <p14:creationId xmlns:p14="http://schemas.microsoft.com/office/powerpoint/2010/main" val="1760796823"/>
       </p:ext>
     </p:extLst>
   </p:cSld>
@@ -5158,62 +5303,6 @@
       </p:sp>
       <p:sp>
         <p:nvSpPr>
-          <p:cNvPr id="19" name="Oval 18">
-            <a:extLst>
-              <a:ext uri="{FF2B5EF4-FFF2-40B4-BE49-F238E27FC236}">
-                <a16:creationId xmlns:a16="http://schemas.microsoft.com/office/drawing/2014/main" id="{163B485C-506A-4086-ADB8-B9DFF815030D}"/>
-              </a:ext>
-            </a:extLst>
-          </p:cNvPr>
-          <p:cNvSpPr/>
-          <p:nvPr/>
-        </p:nvSpPr>
-        <p:spPr>
-          <a:xfrm>
-            <a:off x="4873972" y="2636651"/>
-            <a:ext cx="854665" cy="799525"/>
-          </a:xfrm>
-          <a:prstGeom prst="ellipse">
-            <a:avLst/>
-          </a:prstGeom>
-          <a:noFill/>
-          <a:ln w="19050">
-            <a:solidFill>
-              <a:schemeClr val="tx1"/>
-            </a:solidFill>
-          </a:ln>
-        </p:spPr>
-        <p:style>
-          <a:lnRef idx="2">
-            <a:schemeClr val="accent1">
-              <a:shade val="50000"/>
-            </a:schemeClr>
-          </a:lnRef>
-          <a:fillRef idx="1">
-            <a:schemeClr val="accent1"/>
-          </a:fillRef>
-          <a:effectRef idx="0">
-            <a:schemeClr val="accent1"/>
-          </a:effectRef>
-          <a:fontRef idx="minor">
-            <a:schemeClr val="lt1"/>
-          </a:fontRef>
-        </p:style>
-        <p:txBody>
-          <a:bodyPr rtlCol="0" anchor="ctr"/>
-          <a:lstStyle/>
-          <a:p>
-            <a:pPr algn="ctr"/>
-            <a:endParaRPr lang="en-US" sz="1400" dirty="0">
-              <a:solidFill>
-                <a:schemeClr val="tx1"/>
-              </a:solidFill>
-            </a:endParaRPr>
-          </a:p>
-        </p:txBody>
-      </p:sp>
-      <p:sp>
-        <p:nvSpPr>
           <p:cNvPr id="20" name="Rectangle 19">
             <a:extLst>
               <a:ext uri="{FF2B5EF4-FFF2-40B4-BE49-F238E27FC236}">
@@ -5248,62 +5337,6 @@
       </p:sp>
       <p:sp>
         <p:nvSpPr>
-          <p:cNvPr id="21" name="Oval 20">
-            <a:extLst>
-              <a:ext uri="{FF2B5EF4-FFF2-40B4-BE49-F238E27FC236}">
-                <a16:creationId xmlns:a16="http://schemas.microsoft.com/office/drawing/2014/main" id="{CEF8872E-0DEC-4AEB-BBE6-2AE88FE94929}"/>
-              </a:ext>
-            </a:extLst>
-          </p:cNvPr>
-          <p:cNvSpPr/>
-          <p:nvPr/>
-        </p:nvSpPr>
-        <p:spPr>
-          <a:xfrm>
-            <a:off x="7891930" y="2629475"/>
-            <a:ext cx="854665" cy="799525"/>
-          </a:xfrm>
-          <a:prstGeom prst="ellipse">
-            <a:avLst/>
-          </a:prstGeom>
-          <a:noFill/>
-          <a:ln w="19050">
-            <a:solidFill>
-              <a:schemeClr val="tx1"/>
-            </a:solidFill>
-          </a:ln>
-        </p:spPr>
-        <p:style>
-          <a:lnRef idx="2">
-            <a:schemeClr val="accent1">
-              <a:shade val="50000"/>
-            </a:schemeClr>
-          </a:lnRef>
-          <a:fillRef idx="1">
-            <a:schemeClr val="accent1"/>
-          </a:fillRef>
-          <a:effectRef idx="0">
-            <a:schemeClr val="accent1"/>
-          </a:effectRef>
-          <a:fontRef idx="minor">
-            <a:schemeClr val="lt1"/>
-          </a:fontRef>
-        </p:style>
-        <p:txBody>
-          <a:bodyPr rtlCol="0" anchor="ctr"/>
-          <a:lstStyle/>
-          <a:p>
-            <a:pPr algn="ctr"/>
-            <a:endParaRPr lang="en-US" sz="1400" dirty="0">
-              <a:solidFill>
-                <a:schemeClr val="tx1"/>
-              </a:solidFill>
-            </a:endParaRPr>
-          </a:p>
-        </p:txBody>
-      </p:sp>
-      <p:sp>
-        <p:nvSpPr>
           <p:cNvPr id="22" name="Rectangle 21">
             <a:extLst>
               <a:ext uri="{FF2B5EF4-FFF2-40B4-BE49-F238E27FC236}">
@@ -5338,62 +5371,6 @@
       </p:sp>
       <p:sp>
         <p:nvSpPr>
-          <p:cNvPr id="23" name="Oval 22">
-            <a:extLst>
-              <a:ext uri="{FF2B5EF4-FFF2-40B4-BE49-F238E27FC236}">
-                <a16:creationId xmlns:a16="http://schemas.microsoft.com/office/drawing/2014/main" id="{752A26F6-5DF1-4244-8B95-1A69624CFB86}"/>
-              </a:ext>
-            </a:extLst>
-          </p:cNvPr>
-          <p:cNvSpPr/>
-          <p:nvPr/>
-        </p:nvSpPr>
-        <p:spPr>
-          <a:xfrm>
-            <a:off x="6375696" y="2636651"/>
-            <a:ext cx="854665" cy="799525"/>
-          </a:xfrm>
-          <a:prstGeom prst="ellipse">
-            <a:avLst/>
-          </a:prstGeom>
-          <a:noFill/>
-          <a:ln w="19050">
-            <a:solidFill>
-              <a:schemeClr val="tx1"/>
-            </a:solidFill>
-          </a:ln>
-        </p:spPr>
-        <p:style>
-          <a:lnRef idx="2">
-            <a:schemeClr val="accent1">
-              <a:shade val="50000"/>
-            </a:schemeClr>
-          </a:lnRef>
-          <a:fillRef idx="1">
-            <a:schemeClr val="accent1"/>
-          </a:fillRef>
-          <a:effectRef idx="0">
-            <a:schemeClr val="accent1"/>
-          </a:effectRef>
-          <a:fontRef idx="minor">
-            <a:schemeClr val="lt1"/>
-          </a:fontRef>
-        </p:style>
-        <p:txBody>
-          <a:bodyPr rtlCol="0" anchor="ctr"/>
-          <a:lstStyle/>
-          <a:p>
-            <a:pPr algn="ctr"/>
-            <a:endParaRPr lang="en-US" sz="1400" dirty="0">
-              <a:solidFill>
-                <a:schemeClr val="tx1"/>
-              </a:solidFill>
-            </a:endParaRPr>
-          </a:p>
-        </p:txBody>
-      </p:sp>
-      <p:sp>
-        <p:nvSpPr>
           <p:cNvPr id="24" name="Rectangle 23">
             <a:extLst>
               <a:ext uri="{FF2B5EF4-FFF2-40B4-BE49-F238E27FC236}">
@@ -5436,7 +5413,7 @@
             </a:extLst>
           </p:cNvPr>
           <p:cNvCxnSpPr>
-            <a:stCxn id="19" idx="6"/>
+            <a:cxnSpLocks/>
           </p:cNvCxnSpPr>
           <p:nvPr/>
         </p:nvCxnSpPr>
@@ -5481,7 +5458,6 @@
           </p:cNvPr>
           <p:cNvCxnSpPr>
             <a:cxnSpLocks/>
-            <a:endCxn id="21" idx="2"/>
           </p:cNvCxnSpPr>
           <p:nvPr/>
         </p:nvCxnSpPr>
@@ -5608,6 +5584,162 @@
               </a:rPr>
               <a:t>object</a:t>
             </a:r>
+          </a:p>
+        </p:txBody>
+      </p:sp>
+      <p:sp>
+        <p:nvSpPr>
+          <p:cNvPr id="2" name="Rectangle 1">
+            <a:extLst>
+              <a:ext uri="{FF2B5EF4-FFF2-40B4-BE49-F238E27FC236}">
+                <a16:creationId xmlns:a16="http://schemas.microsoft.com/office/drawing/2014/main" id="{95F5D744-3733-43E1-8BFF-35F194B01FF6}"/>
+              </a:ext>
+            </a:extLst>
+          </p:cNvPr>
+          <p:cNvSpPr/>
+          <p:nvPr/>
+        </p:nvSpPr>
+        <p:spPr>
+          <a:xfrm>
+            <a:off x="4886150" y="2776859"/>
+            <a:ext cx="842487" cy="488054"/>
+          </a:xfrm>
+          <a:prstGeom prst="rect">
+            <a:avLst/>
+          </a:prstGeom>
+          <a:noFill/>
+          <a:ln w="19050">
+            <a:solidFill>
+              <a:schemeClr val="tx1"/>
+            </a:solidFill>
+          </a:ln>
+        </p:spPr>
+        <p:style>
+          <a:lnRef idx="2">
+            <a:schemeClr val="accent1">
+              <a:shade val="50000"/>
+            </a:schemeClr>
+          </a:lnRef>
+          <a:fillRef idx="1">
+            <a:schemeClr val="accent1"/>
+          </a:fillRef>
+          <a:effectRef idx="0">
+            <a:schemeClr val="accent1"/>
+          </a:effectRef>
+          <a:fontRef idx="minor">
+            <a:schemeClr val="lt1"/>
+          </a:fontRef>
+        </p:style>
+        <p:txBody>
+          <a:bodyPr rtlCol="0" anchor="ctr"/>
+          <a:lstStyle/>
+          <a:p>
+            <a:pPr algn="ctr"/>
+            <a:endParaRPr lang="en-US"/>
+          </a:p>
+        </p:txBody>
+      </p:sp>
+      <p:sp>
+        <p:nvSpPr>
+          <p:cNvPr id="17" name="Rectangle 16">
+            <a:extLst>
+              <a:ext uri="{FF2B5EF4-FFF2-40B4-BE49-F238E27FC236}">
+                <a16:creationId xmlns:a16="http://schemas.microsoft.com/office/drawing/2014/main" id="{81B9FDA9-89EB-4553-B8B8-0F2C76F17CB1}"/>
+              </a:ext>
+            </a:extLst>
+          </p:cNvPr>
+          <p:cNvSpPr/>
+          <p:nvPr/>
+        </p:nvSpPr>
+        <p:spPr>
+          <a:xfrm>
+            <a:off x="6372509" y="2776859"/>
+            <a:ext cx="842487" cy="488054"/>
+          </a:xfrm>
+          <a:prstGeom prst="rect">
+            <a:avLst/>
+          </a:prstGeom>
+          <a:noFill/>
+          <a:ln w="19050">
+            <a:solidFill>
+              <a:schemeClr val="tx1"/>
+            </a:solidFill>
+          </a:ln>
+        </p:spPr>
+        <p:style>
+          <a:lnRef idx="2">
+            <a:schemeClr val="accent1">
+              <a:shade val="50000"/>
+            </a:schemeClr>
+          </a:lnRef>
+          <a:fillRef idx="1">
+            <a:schemeClr val="accent1"/>
+          </a:fillRef>
+          <a:effectRef idx="0">
+            <a:schemeClr val="accent1"/>
+          </a:effectRef>
+          <a:fontRef idx="minor">
+            <a:schemeClr val="lt1"/>
+          </a:fontRef>
+        </p:style>
+        <p:txBody>
+          <a:bodyPr rtlCol="0" anchor="ctr"/>
+          <a:lstStyle/>
+          <a:p>
+            <a:pPr algn="ctr"/>
+            <a:endParaRPr lang="en-US"/>
+          </a:p>
+        </p:txBody>
+      </p:sp>
+      <p:sp>
+        <p:nvSpPr>
+          <p:cNvPr id="25" name="Rectangle 24">
+            <a:extLst>
+              <a:ext uri="{FF2B5EF4-FFF2-40B4-BE49-F238E27FC236}">
+                <a16:creationId xmlns:a16="http://schemas.microsoft.com/office/drawing/2014/main" id="{8F9386B6-5A5A-4187-937F-6B06234B7ACE}"/>
+              </a:ext>
+            </a:extLst>
+          </p:cNvPr>
+          <p:cNvSpPr/>
+          <p:nvPr/>
+        </p:nvSpPr>
+        <p:spPr>
+          <a:xfrm>
+            <a:off x="7891930" y="2769952"/>
+            <a:ext cx="842487" cy="488054"/>
+          </a:xfrm>
+          <a:prstGeom prst="rect">
+            <a:avLst/>
+          </a:prstGeom>
+          <a:noFill/>
+          <a:ln w="19050">
+            <a:solidFill>
+              <a:schemeClr val="tx1"/>
+            </a:solidFill>
+          </a:ln>
+        </p:spPr>
+        <p:style>
+          <a:lnRef idx="2">
+            <a:schemeClr val="accent1">
+              <a:shade val="50000"/>
+            </a:schemeClr>
+          </a:lnRef>
+          <a:fillRef idx="1">
+            <a:schemeClr val="accent1"/>
+          </a:fillRef>
+          <a:effectRef idx="0">
+            <a:schemeClr val="accent1"/>
+          </a:effectRef>
+          <a:fontRef idx="minor">
+            <a:schemeClr val="lt1"/>
+          </a:fontRef>
+        </p:style>
+        <p:txBody>
+          <a:bodyPr rtlCol="0" anchor="ctr"/>
+          <a:lstStyle/>
+          <a:p>
+            <a:pPr algn="ctr"/>
+            <a:endParaRPr lang="en-US"/>
           </a:p>
         </p:txBody>
       </p:sp>
@@ -8384,6 +8516,3363 @@
           <a:chExt cx="0" cy="0"/>
         </a:xfrm>
       </p:grpSpPr>
+      <p:pic>
+        <p:nvPicPr>
+          <p:cNvPr id="4" name="Picture 3">
+            <a:extLst>
+              <a:ext uri="{FF2B5EF4-FFF2-40B4-BE49-F238E27FC236}">
+                <a16:creationId xmlns:a16="http://schemas.microsoft.com/office/drawing/2014/main" id="{97BAD49A-1C1C-4219-8542-6C263684C90F}"/>
+              </a:ext>
+            </a:extLst>
+          </p:cNvPr>
+          <p:cNvPicPr>
+            <a:picLocks noChangeAspect="1"/>
+          </p:cNvPicPr>
+          <p:nvPr/>
+        </p:nvPicPr>
+        <p:blipFill>
+          <a:blip r:embed="rId3"/>
+          <a:stretch>
+            <a:fillRect/>
+          </a:stretch>
+        </p:blipFill>
+        <p:spPr>
+          <a:xfrm>
+            <a:off x="593222" y="3023029"/>
+            <a:ext cx="2599456" cy="1290422"/>
+          </a:xfrm>
+          <a:prstGeom prst="rect">
+            <a:avLst/>
+          </a:prstGeom>
+        </p:spPr>
+      </p:pic>
+      <p:sp>
+        <p:nvSpPr>
+          <p:cNvPr id="5" name="Rectangle 4">
+            <a:extLst>
+              <a:ext uri="{FF2B5EF4-FFF2-40B4-BE49-F238E27FC236}">
+                <a16:creationId xmlns:a16="http://schemas.microsoft.com/office/drawing/2014/main" id="{9A5DB836-3671-425D-AB44-4603C3A04DE0}"/>
+              </a:ext>
+            </a:extLst>
+          </p:cNvPr>
+          <p:cNvSpPr/>
+          <p:nvPr/>
+        </p:nvSpPr>
+        <p:spPr>
+          <a:xfrm>
+            <a:off x="644199" y="2653697"/>
+            <a:ext cx="1459054" cy="369332"/>
+          </a:xfrm>
+          <a:prstGeom prst="rect">
+            <a:avLst/>
+          </a:prstGeom>
+        </p:spPr>
+        <p:txBody>
+          <a:bodyPr wrap="none">
+            <a:spAutoFit/>
+          </a:bodyPr>
+          <a:lstStyle/>
+          <a:p>
+            <a:pPr marL="0" marR="0" lvl="0" indent="0" algn="l" defTabSz="914400" rtl="0" eaLnBrk="1" fontAlgn="auto" latinLnBrk="0" hangingPunct="1">
+              <a:lnSpc>
+                <a:spcPct val="100000"/>
+              </a:lnSpc>
+              <a:spcBef>
+                <a:spcPts val="0"/>
+              </a:spcBef>
+              <a:spcAft>
+                <a:spcPts val="0"/>
+              </a:spcAft>
+              <a:buClrTx/>
+              <a:buSzTx/>
+              <a:buFontTx/>
+              <a:buNone/>
+              <a:tabLst/>
+              <a:defRPr/>
+            </a:pPr>
+            <a:r>
+              <a:rPr kumimoji="0" lang="en-US" sz="1800" b="0" i="0" u="none" strike="noStrike" kern="1200" cap="none" spc="0" normalizeH="0" baseline="0" noProof="0" dirty="0">
+                <a:ln>
+                  <a:noFill/>
+                </a:ln>
+                <a:solidFill>
+                  <a:prstClr val="black"/>
+                </a:solidFill>
+                <a:effectLst/>
+                <a:uLnTx/>
+                <a:uFillTx/>
+                <a:latin typeface="Segoe UI" panose="020B0502040204020203" pitchFamily="34" charset="0"/>
+                <a:ea typeface="+mn-ea"/>
+                <a:cs typeface="Segoe UI" panose="020B0502040204020203" pitchFamily="34" charset="0"/>
+              </a:rPr>
+              <a:t>Many clients</a:t>
+            </a:r>
+          </a:p>
+        </p:txBody>
+      </p:sp>
+      <p:sp>
+        <p:nvSpPr>
+          <p:cNvPr id="7" name="Flowchart: Alternate Process 6">
+            <a:extLst>
+              <a:ext uri="{FF2B5EF4-FFF2-40B4-BE49-F238E27FC236}">
+                <a16:creationId xmlns:a16="http://schemas.microsoft.com/office/drawing/2014/main" id="{EA776D38-4F28-4454-A288-86BD47FA1D6B}"/>
+              </a:ext>
+            </a:extLst>
+          </p:cNvPr>
+          <p:cNvSpPr/>
+          <p:nvPr/>
+        </p:nvSpPr>
+        <p:spPr>
+          <a:xfrm>
+            <a:off x="3158326" y="260155"/>
+            <a:ext cx="8515701" cy="6337690"/>
+          </a:xfrm>
+          <a:prstGeom prst="flowChartAlternateProcess">
+            <a:avLst/>
+          </a:prstGeom>
+          <a:solidFill>
+            <a:srgbClr val="F2F2F2"/>
+          </a:solidFill>
+          <a:ln>
+            <a:noFill/>
+          </a:ln>
+        </p:spPr>
+        <p:style>
+          <a:lnRef idx="2">
+            <a:schemeClr val="accent1">
+              <a:shade val="50000"/>
+            </a:schemeClr>
+          </a:lnRef>
+          <a:fillRef idx="1">
+            <a:schemeClr val="accent1"/>
+          </a:fillRef>
+          <a:effectRef idx="0">
+            <a:schemeClr val="accent1"/>
+          </a:effectRef>
+          <a:fontRef idx="minor">
+            <a:schemeClr val="lt1"/>
+          </a:fontRef>
+        </p:style>
+        <p:txBody>
+          <a:bodyPr rtlCol="0" anchor="ctr"/>
+          <a:lstStyle/>
+          <a:p>
+            <a:pPr marL="0" marR="0" lvl="0" indent="0" algn="ctr" defTabSz="914400" rtl="0" eaLnBrk="1" fontAlgn="auto" latinLnBrk="0" hangingPunct="1">
+              <a:lnSpc>
+                <a:spcPct val="100000"/>
+              </a:lnSpc>
+              <a:spcBef>
+                <a:spcPts val="0"/>
+              </a:spcBef>
+              <a:spcAft>
+                <a:spcPts val="0"/>
+              </a:spcAft>
+              <a:buClrTx/>
+              <a:buSzTx/>
+              <a:buFontTx/>
+              <a:buNone/>
+              <a:tabLst/>
+              <a:defRPr/>
+            </a:pPr>
+            <a:endParaRPr kumimoji="0" lang="en-US" sz="1800" b="0" i="0" u="none" strike="noStrike" kern="1200" cap="none" spc="0" normalizeH="0" baseline="0" noProof="0">
+              <a:ln>
+                <a:noFill/>
+              </a:ln>
+              <a:solidFill>
+                <a:prstClr val="white"/>
+              </a:solidFill>
+              <a:effectLst/>
+              <a:uLnTx/>
+              <a:uFillTx/>
+              <a:latin typeface="Calibri" panose="020F0502020204030204"/>
+              <a:ea typeface="+mn-ea"/>
+              <a:cs typeface="+mn-cs"/>
+            </a:endParaRPr>
+          </a:p>
+        </p:txBody>
+      </p:sp>
+      <p:sp>
+        <p:nvSpPr>
+          <p:cNvPr id="8" name="Rectangle 7">
+            <a:extLst>
+              <a:ext uri="{FF2B5EF4-FFF2-40B4-BE49-F238E27FC236}">
+                <a16:creationId xmlns:a16="http://schemas.microsoft.com/office/drawing/2014/main" id="{DA0EA91B-80CE-4500-8AA0-2056B12ACB96}"/>
+              </a:ext>
+            </a:extLst>
+          </p:cNvPr>
+          <p:cNvSpPr/>
+          <p:nvPr/>
+        </p:nvSpPr>
+        <p:spPr>
+          <a:xfrm>
+            <a:off x="5142364" y="326068"/>
+            <a:ext cx="4672109" cy="461665"/>
+          </a:xfrm>
+          <a:prstGeom prst="rect">
+            <a:avLst/>
+          </a:prstGeom>
+        </p:spPr>
+        <p:txBody>
+          <a:bodyPr wrap="square">
+            <a:spAutoFit/>
+          </a:bodyPr>
+          <a:lstStyle/>
+          <a:p>
+            <a:pPr marL="0" marR="0" lvl="0" indent="0" algn="ctr" defTabSz="914400" rtl="0" eaLnBrk="1" fontAlgn="auto" latinLnBrk="0" hangingPunct="1">
+              <a:lnSpc>
+                <a:spcPct val="100000"/>
+              </a:lnSpc>
+              <a:spcBef>
+                <a:spcPts val="0"/>
+              </a:spcBef>
+              <a:spcAft>
+                <a:spcPts val="0"/>
+              </a:spcAft>
+              <a:buClrTx/>
+              <a:buSzTx/>
+              <a:buFontTx/>
+              <a:buNone/>
+              <a:tabLst/>
+              <a:defRPr/>
+            </a:pPr>
+            <a:r>
+              <a:rPr kumimoji="0" lang="en-US" sz="2400" i="0" u="none" strike="noStrike" kern="1200" cap="none" spc="0" normalizeH="0" baseline="0" noProof="0" dirty="0">
+                <a:ln>
+                  <a:noFill/>
+                </a:ln>
+                <a:solidFill>
+                  <a:prstClr val="black"/>
+                </a:solidFill>
+                <a:effectLst/>
+                <a:uLnTx/>
+                <a:uFillTx/>
+                <a:latin typeface="Segoe UI" panose="020B0502040204020203" pitchFamily="34" charset="0"/>
+                <a:ea typeface="+mn-ea"/>
+                <a:cs typeface="Segoe UI" panose="020B0502040204020203" pitchFamily="34" charset="0"/>
+              </a:rPr>
+              <a:t>ASP.NET Core WebAPI / App</a:t>
+            </a:r>
+          </a:p>
+        </p:txBody>
+      </p:sp>
+      <p:sp>
+        <p:nvSpPr>
+          <p:cNvPr id="9" name="Rectangle 8">
+            <a:extLst>
+              <a:ext uri="{FF2B5EF4-FFF2-40B4-BE49-F238E27FC236}">
+                <a16:creationId xmlns:a16="http://schemas.microsoft.com/office/drawing/2014/main" id="{39981B4E-D7AB-4DCE-BB57-122E0DC68F2E}"/>
+              </a:ext>
+            </a:extLst>
+          </p:cNvPr>
+          <p:cNvSpPr/>
+          <p:nvPr/>
+        </p:nvSpPr>
+        <p:spPr>
+          <a:xfrm>
+            <a:off x="3538383" y="2413443"/>
+            <a:ext cx="1200502" cy="256731"/>
+          </a:xfrm>
+          <a:prstGeom prst="rect">
+            <a:avLst/>
+          </a:prstGeom>
+          <a:solidFill>
+            <a:srgbClr val="7F7F7F"/>
+          </a:solidFill>
+          <a:ln>
+            <a:noFill/>
+          </a:ln>
+        </p:spPr>
+        <p:style>
+          <a:lnRef idx="2">
+            <a:schemeClr val="accent1">
+              <a:shade val="50000"/>
+            </a:schemeClr>
+          </a:lnRef>
+          <a:fillRef idx="1">
+            <a:schemeClr val="accent1"/>
+          </a:fillRef>
+          <a:effectRef idx="0">
+            <a:schemeClr val="accent1"/>
+          </a:effectRef>
+          <a:fontRef idx="minor">
+            <a:schemeClr val="lt1"/>
+          </a:fontRef>
+        </p:style>
+        <p:txBody>
+          <a:bodyPr rtlCol="0" anchor="ctr"/>
+          <a:lstStyle/>
+          <a:p>
+            <a:pPr marL="0" marR="0" lvl="0" indent="0" algn="ctr" defTabSz="914400" rtl="0" eaLnBrk="1" fontAlgn="auto" latinLnBrk="0" hangingPunct="1">
+              <a:lnSpc>
+                <a:spcPct val="100000"/>
+              </a:lnSpc>
+              <a:spcBef>
+                <a:spcPts val="0"/>
+              </a:spcBef>
+              <a:spcAft>
+                <a:spcPts val="0"/>
+              </a:spcAft>
+              <a:buClrTx/>
+              <a:buSzTx/>
+              <a:buFontTx/>
+              <a:buNone/>
+              <a:tabLst/>
+              <a:defRPr/>
+            </a:pPr>
+            <a:r>
+              <a:rPr kumimoji="0" lang="en-US" sz="1600" b="0" i="0" u="none" strike="noStrike" kern="1200" cap="none" spc="0" normalizeH="0" baseline="0" noProof="0" dirty="0">
+                <a:ln>
+                  <a:noFill/>
+                </a:ln>
+                <a:solidFill>
+                  <a:prstClr val="white"/>
+                </a:solidFill>
+                <a:effectLst/>
+                <a:uLnTx/>
+                <a:uFillTx/>
+                <a:latin typeface="Segoe UI" panose="020B0502040204020203" pitchFamily="34" charset="0"/>
+                <a:ea typeface="+mn-ea"/>
+                <a:cs typeface="Segoe UI" panose="020B0502040204020203" pitchFamily="34" charset="0"/>
+              </a:rPr>
+              <a:t>Thread 1</a:t>
+            </a:r>
+          </a:p>
+        </p:txBody>
+      </p:sp>
+      <p:sp>
+        <p:nvSpPr>
+          <p:cNvPr id="10" name="Rectangle 9">
+            <a:extLst>
+              <a:ext uri="{FF2B5EF4-FFF2-40B4-BE49-F238E27FC236}">
+                <a16:creationId xmlns:a16="http://schemas.microsoft.com/office/drawing/2014/main" id="{AFFDCEEC-4448-4AB4-94E2-7133209A689B}"/>
+              </a:ext>
+            </a:extLst>
+          </p:cNvPr>
+          <p:cNvSpPr/>
+          <p:nvPr/>
+        </p:nvSpPr>
+        <p:spPr>
+          <a:xfrm>
+            <a:off x="3538383" y="3170193"/>
+            <a:ext cx="1200502" cy="256731"/>
+          </a:xfrm>
+          <a:prstGeom prst="rect">
+            <a:avLst/>
+          </a:prstGeom>
+          <a:solidFill>
+            <a:srgbClr val="7F7F7F"/>
+          </a:solidFill>
+          <a:ln>
+            <a:noFill/>
+          </a:ln>
+        </p:spPr>
+        <p:style>
+          <a:lnRef idx="2">
+            <a:schemeClr val="accent1">
+              <a:shade val="50000"/>
+            </a:schemeClr>
+          </a:lnRef>
+          <a:fillRef idx="1">
+            <a:schemeClr val="accent1"/>
+          </a:fillRef>
+          <a:effectRef idx="0">
+            <a:schemeClr val="accent1"/>
+          </a:effectRef>
+          <a:fontRef idx="minor">
+            <a:schemeClr val="lt1"/>
+          </a:fontRef>
+        </p:style>
+        <p:txBody>
+          <a:bodyPr rtlCol="0" anchor="ctr"/>
+          <a:lstStyle/>
+          <a:p>
+            <a:pPr marL="0" marR="0" lvl="0" indent="0" algn="ctr" defTabSz="914400" rtl="0" eaLnBrk="1" fontAlgn="auto" latinLnBrk="0" hangingPunct="1">
+              <a:lnSpc>
+                <a:spcPct val="100000"/>
+              </a:lnSpc>
+              <a:spcBef>
+                <a:spcPts val="0"/>
+              </a:spcBef>
+              <a:spcAft>
+                <a:spcPts val="0"/>
+              </a:spcAft>
+              <a:buClrTx/>
+              <a:buSzTx/>
+              <a:buFontTx/>
+              <a:buNone/>
+              <a:tabLst/>
+              <a:defRPr/>
+            </a:pPr>
+            <a:r>
+              <a:rPr kumimoji="0" lang="en-US" sz="1600" b="0" i="0" u="none" strike="noStrike" kern="1200" cap="none" spc="0" normalizeH="0" baseline="0" noProof="0" dirty="0">
+                <a:ln>
+                  <a:noFill/>
+                </a:ln>
+                <a:solidFill>
+                  <a:prstClr val="white"/>
+                </a:solidFill>
+                <a:effectLst/>
+                <a:uLnTx/>
+                <a:uFillTx/>
+                <a:latin typeface="Segoe UI" panose="020B0502040204020203" pitchFamily="34" charset="0"/>
+                <a:ea typeface="+mn-ea"/>
+                <a:cs typeface="Segoe UI" panose="020B0502040204020203" pitchFamily="34" charset="0"/>
+              </a:rPr>
+              <a:t>Thread 2</a:t>
+            </a:r>
+          </a:p>
+        </p:txBody>
+      </p:sp>
+      <p:sp>
+        <p:nvSpPr>
+          <p:cNvPr id="11" name="Rectangle 10">
+            <a:extLst>
+              <a:ext uri="{FF2B5EF4-FFF2-40B4-BE49-F238E27FC236}">
+                <a16:creationId xmlns:a16="http://schemas.microsoft.com/office/drawing/2014/main" id="{E63A9CCC-7672-499B-A657-8BA3FACB51B6}"/>
+              </a:ext>
+            </a:extLst>
+          </p:cNvPr>
+          <p:cNvSpPr/>
+          <p:nvPr/>
+        </p:nvSpPr>
+        <p:spPr>
+          <a:xfrm>
+            <a:off x="3538383" y="3943773"/>
+            <a:ext cx="1200502" cy="256731"/>
+          </a:xfrm>
+          <a:prstGeom prst="rect">
+            <a:avLst/>
+          </a:prstGeom>
+          <a:solidFill>
+            <a:srgbClr val="7F7F7F"/>
+          </a:solidFill>
+          <a:ln>
+            <a:noFill/>
+          </a:ln>
+        </p:spPr>
+        <p:style>
+          <a:lnRef idx="2">
+            <a:schemeClr val="accent1">
+              <a:shade val="50000"/>
+            </a:schemeClr>
+          </a:lnRef>
+          <a:fillRef idx="1">
+            <a:schemeClr val="accent1"/>
+          </a:fillRef>
+          <a:effectRef idx="0">
+            <a:schemeClr val="accent1"/>
+          </a:effectRef>
+          <a:fontRef idx="minor">
+            <a:schemeClr val="lt1"/>
+          </a:fontRef>
+        </p:style>
+        <p:txBody>
+          <a:bodyPr rtlCol="0" anchor="ctr"/>
+          <a:lstStyle/>
+          <a:p>
+            <a:pPr marL="0" marR="0" lvl="0" indent="0" algn="ctr" defTabSz="914400" rtl="0" eaLnBrk="1" fontAlgn="auto" latinLnBrk="0" hangingPunct="1">
+              <a:lnSpc>
+                <a:spcPct val="100000"/>
+              </a:lnSpc>
+              <a:spcBef>
+                <a:spcPts val="0"/>
+              </a:spcBef>
+              <a:spcAft>
+                <a:spcPts val="0"/>
+              </a:spcAft>
+              <a:buClrTx/>
+              <a:buSzTx/>
+              <a:buFontTx/>
+              <a:buNone/>
+              <a:tabLst/>
+              <a:defRPr/>
+            </a:pPr>
+            <a:r>
+              <a:rPr kumimoji="0" lang="en-US" sz="1600" b="0" i="0" u="none" strike="noStrike" kern="1200" cap="none" spc="0" normalizeH="0" baseline="0" noProof="0" dirty="0">
+                <a:ln>
+                  <a:noFill/>
+                </a:ln>
+                <a:solidFill>
+                  <a:prstClr val="white"/>
+                </a:solidFill>
+                <a:effectLst/>
+                <a:uLnTx/>
+                <a:uFillTx/>
+                <a:latin typeface="Segoe UI" panose="020B0502040204020203" pitchFamily="34" charset="0"/>
+                <a:ea typeface="+mn-ea"/>
+                <a:cs typeface="Segoe UI" panose="020B0502040204020203" pitchFamily="34" charset="0"/>
+              </a:rPr>
+              <a:t>Thread 3</a:t>
+            </a:r>
+          </a:p>
+        </p:txBody>
+      </p:sp>
+      <p:sp>
+        <p:nvSpPr>
+          <p:cNvPr id="14" name="Rectangle 13">
+            <a:extLst>
+              <a:ext uri="{FF2B5EF4-FFF2-40B4-BE49-F238E27FC236}">
+                <a16:creationId xmlns:a16="http://schemas.microsoft.com/office/drawing/2014/main" id="{5DAA8DBD-2044-4236-966A-B40F6A9EF17F}"/>
+              </a:ext>
+            </a:extLst>
+          </p:cNvPr>
+          <p:cNvSpPr/>
+          <p:nvPr/>
+        </p:nvSpPr>
+        <p:spPr>
+          <a:xfrm>
+            <a:off x="3535213" y="4714201"/>
+            <a:ext cx="1200502" cy="256731"/>
+          </a:xfrm>
+          <a:prstGeom prst="rect">
+            <a:avLst/>
+          </a:prstGeom>
+          <a:solidFill>
+            <a:srgbClr val="7F7F7F"/>
+          </a:solidFill>
+          <a:ln>
+            <a:noFill/>
+          </a:ln>
+        </p:spPr>
+        <p:style>
+          <a:lnRef idx="2">
+            <a:schemeClr val="accent1">
+              <a:shade val="50000"/>
+            </a:schemeClr>
+          </a:lnRef>
+          <a:fillRef idx="1">
+            <a:schemeClr val="accent1"/>
+          </a:fillRef>
+          <a:effectRef idx="0">
+            <a:schemeClr val="accent1"/>
+          </a:effectRef>
+          <a:fontRef idx="minor">
+            <a:schemeClr val="lt1"/>
+          </a:fontRef>
+        </p:style>
+        <p:txBody>
+          <a:bodyPr rtlCol="0" anchor="ctr"/>
+          <a:lstStyle/>
+          <a:p>
+            <a:pPr marL="0" marR="0" lvl="0" indent="0" algn="ctr" defTabSz="914400" rtl="0" eaLnBrk="1" fontAlgn="auto" latinLnBrk="0" hangingPunct="1">
+              <a:lnSpc>
+                <a:spcPct val="100000"/>
+              </a:lnSpc>
+              <a:spcBef>
+                <a:spcPts val="0"/>
+              </a:spcBef>
+              <a:spcAft>
+                <a:spcPts val="0"/>
+              </a:spcAft>
+              <a:buClrTx/>
+              <a:buSzTx/>
+              <a:buFontTx/>
+              <a:buNone/>
+              <a:tabLst/>
+              <a:defRPr/>
+            </a:pPr>
+            <a:r>
+              <a:rPr kumimoji="0" lang="en-US" sz="1600" b="0" i="0" u="none" strike="noStrike" kern="1200" cap="none" spc="0" normalizeH="0" baseline="0" noProof="0" dirty="0">
+                <a:ln>
+                  <a:noFill/>
+                </a:ln>
+                <a:solidFill>
+                  <a:prstClr val="white"/>
+                </a:solidFill>
+                <a:effectLst/>
+                <a:uLnTx/>
+                <a:uFillTx/>
+                <a:latin typeface="Segoe UI" panose="020B0502040204020203" pitchFamily="34" charset="0"/>
+                <a:ea typeface="+mn-ea"/>
+                <a:cs typeface="Segoe UI" panose="020B0502040204020203" pitchFamily="34" charset="0"/>
+              </a:rPr>
+              <a:t>Thread ‘</a:t>
+            </a:r>
+            <a:r>
+              <a:rPr kumimoji="0" lang="en-US" sz="1600" b="1" i="0" u="none" strike="noStrike" kern="1200" cap="none" spc="0" normalizeH="0" baseline="0" noProof="0" dirty="0">
+                <a:ln>
+                  <a:noFill/>
+                </a:ln>
+                <a:solidFill>
+                  <a:prstClr val="white"/>
+                </a:solidFill>
+                <a:effectLst/>
+                <a:uLnTx/>
+                <a:uFillTx/>
+                <a:latin typeface="Segoe UI" panose="020B0502040204020203" pitchFamily="34" charset="0"/>
+                <a:ea typeface="+mn-ea"/>
+                <a:cs typeface="Segoe UI" panose="020B0502040204020203" pitchFamily="34" charset="0"/>
+              </a:rPr>
+              <a:t>n</a:t>
+            </a:r>
+            <a:r>
+              <a:rPr kumimoji="0" lang="en-US" sz="1600" b="0" i="0" u="none" strike="noStrike" kern="1200" cap="none" spc="0" normalizeH="0" baseline="0" noProof="0" dirty="0">
+                <a:ln>
+                  <a:noFill/>
+                </a:ln>
+                <a:solidFill>
+                  <a:prstClr val="white"/>
+                </a:solidFill>
+                <a:effectLst/>
+                <a:uLnTx/>
+                <a:uFillTx/>
+                <a:latin typeface="Segoe UI" panose="020B0502040204020203" pitchFamily="34" charset="0"/>
+                <a:ea typeface="+mn-ea"/>
+                <a:cs typeface="Segoe UI" panose="020B0502040204020203" pitchFamily="34" charset="0"/>
+              </a:rPr>
+              <a:t>’</a:t>
+            </a:r>
+          </a:p>
+        </p:txBody>
+      </p:sp>
+      <p:sp>
+        <p:nvSpPr>
+          <p:cNvPr id="15" name="Rectangle 14">
+            <a:extLst>
+              <a:ext uri="{FF2B5EF4-FFF2-40B4-BE49-F238E27FC236}">
+                <a16:creationId xmlns:a16="http://schemas.microsoft.com/office/drawing/2014/main" id="{8C857205-4E7B-40EF-AB0C-DD31BFBA51F9}"/>
+              </a:ext>
+            </a:extLst>
+          </p:cNvPr>
+          <p:cNvSpPr/>
+          <p:nvPr/>
+        </p:nvSpPr>
+        <p:spPr>
+          <a:xfrm>
+            <a:off x="3613939" y="1784232"/>
+            <a:ext cx="1049390" cy="584775"/>
+          </a:xfrm>
+          <a:prstGeom prst="rect">
+            <a:avLst/>
+          </a:prstGeom>
+        </p:spPr>
+        <p:txBody>
+          <a:bodyPr wrap="none">
+            <a:spAutoFit/>
+          </a:bodyPr>
+          <a:lstStyle/>
+          <a:p>
+            <a:pPr marL="0" marR="0" lvl="0" indent="0" algn="ctr" defTabSz="914400" rtl="0" eaLnBrk="1" fontAlgn="auto" latinLnBrk="0" hangingPunct="1">
+              <a:lnSpc>
+                <a:spcPct val="100000"/>
+              </a:lnSpc>
+              <a:spcBef>
+                <a:spcPts val="0"/>
+              </a:spcBef>
+              <a:spcAft>
+                <a:spcPts val="0"/>
+              </a:spcAft>
+              <a:buClrTx/>
+              <a:buSzTx/>
+              <a:buFontTx/>
+              <a:buNone/>
+              <a:tabLst/>
+              <a:defRPr/>
+            </a:pPr>
+            <a:r>
+              <a:rPr kumimoji="0" lang="en-US" sz="1600" b="0" i="0" u="none" strike="noStrike" kern="1200" cap="none" spc="0" normalizeH="0" baseline="0" noProof="0" dirty="0">
+                <a:ln>
+                  <a:noFill/>
+                </a:ln>
+                <a:solidFill>
+                  <a:prstClr val="black"/>
+                </a:solidFill>
+                <a:effectLst/>
+                <a:uLnTx/>
+                <a:uFillTx/>
+                <a:latin typeface="Segoe UI Light" panose="020B0502040204020203" pitchFamily="34" charset="0"/>
+                <a:ea typeface="+mn-ea"/>
+                <a:cs typeface="Segoe UI Light" panose="020B0502040204020203" pitchFamily="34" charset="0"/>
+              </a:rPr>
+              <a:t>.NET Core</a:t>
+            </a:r>
+          </a:p>
+          <a:p>
+            <a:pPr marL="0" marR="0" lvl="0" indent="0" algn="ctr" defTabSz="914400" rtl="0" eaLnBrk="1" fontAlgn="auto" latinLnBrk="0" hangingPunct="1">
+              <a:lnSpc>
+                <a:spcPct val="100000"/>
+              </a:lnSpc>
+              <a:spcBef>
+                <a:spcPts val="0"/>
+              </a:spcBef>
+              <a:spcAft>
+                <a:spcPts val="0"/>
+              </a:spcAft>
+              <a:buClrTx/>
+              <a:buSzTx/>
+              <a:buFontTx/>
+              <a:buNone/>
+              <a:tabLst/>
+              <a:defRPr/>
+            </a:pPr>
+            <a:r>
+              <a:rPr lang="en-US" sz="1600" dirty="0">
+                <a:solidFill>
+                  <a:prstClr val="black"/>
+                </a:solidFill>
+                <a:latin typeface="Segoe UI Light" panose="020B0502040204020203" pitchFamily="34" charset="0"/>
+                <a:cs typeface="Segoe UI Light" panose="020B0502040204020203" pitchFamily="34" charset="0"/>
+              </a:rPr>
+              <a:t>threads</a:t>
+            </a:r>
+            <a:endParaRPr kumimoji="0" lang="en-US" sz="1600" b="0" i="0" u="none" strike="noStrike" kern="1200" cap="none" spc="0" normalizeH="0" baseline="0" noProof="0" dirty="0">
+              <a:ln>
+                <a:noFill/>
+              </a:ln>
+              <a:solidFill>
+                <a:prstClr val="black"/>
+              </a:solidFill>
+              <a:effectLst/>
+              <a:uLnTx/>
+              <a:uFillTx/>
+              <a:latin typeface="Segoe UI Light" panose="020B0502040204020203" pitchFamily="34" charset="0"/>
+              <a:ea typeface="+mn-ea"/>
+              <a:cs typeface="Segoe UI Light" panose="020B0502040204020203" pitchFamily="34" charset="0"/>
+            </a:endParaRPr>
+          </a:p>
+        </p:txBody>
+      </p:sp>
+      <p:sp>
+        <p:nvSpPr>
+          <p:cNvPr id="16" name="Rectangle 15">
+            <a:extLst>
+              <a:ext uri="{FF2B5EF4-FFF2-40B4-BE49-F238E27FC236}">
+                <a16:creationId xmlns:a16="http://schemas.microsoft.com/office/drawing/2014/main" id="{F4CBD1F5-7D28-4F0D-B292-A0BFBCF7BDED}"/>
+              </a:ext>
+            </a:extLst>
+          </p:cNvPr>
+          <p:cNvSpPr/>
+          <p:nvPr/>
+        </p:nvSpPr>
+        <p:spPr>
+          <a:xfrm>
+            <a:off x="5203080" y="1898846"/>
+            <a:ext cx="1269737" cy="540212"/>
+          </a:xfrm>
+          <a:prstGeom prst="rect">
+            <a:avLst/>
+          </a:prstGeom>
+          <a:solidFill>
+            <a:srgbClr val="FFC000"/>
+          </a:solidFill>
+          <a:ln>
+            <a:noFill/>
+          </a:ln>
+        </p:spPr>
+        <p:style>
+          <a:lnRef idx="2">
+            <a:schemeClr val="accent1">
+              <a:shade val="50000"/>
+            </a:schemeClr>
+          </a:lnRef>
+          <a:fillRef idx="1">
+            <a:schemeClr val="accent1"/>
+          </a:fillRef>
+          <a:effectRef idx="0">
+            <a:schemeClr val="accent1"/>
+          </a:effectRef>
+          <a:fontRef idx="minor">
+            <a:schemeClr val="lt1"/>
+          </a:fontRef>
+        </p:style>
+        <p:txBody>
+          <a:bodyPr rtlCol="0" anchor="ctr"/>
+          <a:lstStyle/>
+          <a:p>
+            <a:pPr marL="0" marR="0" lvl="0" indent="0" algn="ctr" defTabSz="914400" rtl="0" eaLnBrk="1" fontAlgn="auto" latinLnBrk="0" hangingPunct="1">
+              <a:lnSpc>
+                <a:spcPct val="100000"/>
+              </a:lnSpc>
+              <a:spcBef>
+                <a:spcPts val="0"/>
+              </a:spcBef>
+              <a:spcAft>
+                <a:spcPts val="0"/>
+              </a:spcAft>
+              <a:buClrTx/>
+              <a:buSzTx/>
+              <a:buFontTx/>
+              <a:buNone/>
+              <a:tabLst/>
+              <a:defRPr/>
+            </a:pPr>
+            <a:r>
+              <a:rPr kumimoji="0" lang="en-US" sz="1600" b="0" i="0" u="none" strike="noStrike" kern="1200" cap="none" spc="0" normalizeH="0" baseline="0" noProof="0" dirty="0">
+                <a:ln>
+                  <a:noFill/>
+                </a:ln>
+                <a:solidFill>
+                  <a:prstClr val="black"/>
+                </a:solidFill>
+                <a:effectLst/>
+                <a:uLnTx/>
+                <a:uFillTx/>
+                <a:latin typeface="Segoe UI" panose="020B0502040204020203" pitchFamily="34" charset="0"/>
+                <a:ea typeface="+mn-ea"/>
+                <a:cs typeface="Segoe UI" panose="020B0502040204020203" pitchFamily="34" charset="0"/>
+              </a:rPr>
+              <a:t>Controller</a:t>
+            </a:r>
+          </a:p>
+        </p:txBody>
+      </p:sp>
+      <p:cxnSp>
+        <p:nvCxnSpPr>
+          <p:cNvPr id="18" name="Straight Arrow Connector 17">
+            <a:extLst>
+              <a:ext uri="{FF2B5EF4-FFF2-40B4-BE49-F238E27FC236}">
+                <a16:creationId xmlns:a16="http://schemas.microsoft.com/office/drawing/2014/main" id="{9ED74335-499D-4FCD-8A5B-549F4C126C61}"/>
+              </a:ext>
+            </a:extLst>
+          </p:cNvPr>
+          <p:cNvCxnSpPr>
+            <a:cxnSpLocks/>
+          </p:cNvCxnSpPr>
+          <p:nvPr/>
+        </p:nvCxnSpPr>
+        <p:spPr>
+          <a:xfrm>
+            <a:off x="4918166" y="2173902"/>
+            <a:ext cx="274625" cy="0"/>
+          </a:xfrm>
+          <a:prstGeom prst="straightConnector1">
+            <a:avLst/>
+          </a:prstGeom>
+          <a:ln w="12700">
+            <a:solidFill>
+              <a:schemeClr val="tx1"/>
+            </a:solidFill>
+            <a:tailEnd type="triangle"/>
+          </a:ln>
+        </p:spPr>
+        <p:style>
+          <a:lnRef idx="1">
+            <a:schemeClr val="accent1"/>
+          </a:lnRef>
+          <a:fillRef idx="0">
+            <a:schemeClr val="accent1"/>
+          </a:fillRef>
+          <a:effectRef idx="0">
+            <a:schemeClr val="accent1"/>
+          </a:effectRef>
+          <a:fontRef idx="minor">
+            <a:schemeClr val="tx1"/>
+          </a:fontRef>
+        </p:style>
+      </p:cxnSp>
+      <p:cxnSp>
+        <p:nvCxnSpPr>
+          <p:cNvPr id="19" name="Straight Arrow Connector 18">
+            <a:extLst>
+              <a:ext uri="{FF2B5EF4-FFF2-40B4-BE49-F238E27FC236}">
+                <a16:creationId xmlns:a16="http://schemas.microsoft.com/office/drawing/2014/main" id="{F5FBF362-BB0E-453A-99B8-F54471E45CA9}"/>
+              </a:ext>
+            </a:extLst>
+          </p:cNvPr>
+          <p:cNvCxnSpPr>
+            <a:cxnSpLocks/>
+          </p:cNvCxnSpPr>
+          <p:nvPr/>
+        </p:nvCxnSpPr>
+        <p:spPr>
+          <a:xfrm>
+            <a:off x="4916585" y="2923206"/>
+            <a:ext cx="276206" cy="2497"/>
+          </a:xfrm>
+          <a:prstGeom prst="straightConnector1">
+            <a:avLst/>
+          </a:prstGeom>
+          <a:ln w="12700">
+            <a:solidFill>
+              <a:schemeClr val="tx1"/>
+            </a:solidFill>
+            <a:tailEnd type="triangle"/>
+          </a:ln>
+        </p:spPr>
+        <p:style>
+          <a:lnRef idx="1">
+            <a:schemeClr val="accent1"/>
+          </a:lnRef>
+          <a:fillRef idx="0">
+            <a:schemeClr val="accent1"/>
+          </a:fillRef>
+          <a:effectRef idx="0">
+            <a:schemeClr val="accent1"/>
+          </a:effectRef>
+          <a:fontRef idx="minor">
+            <a:schemeClr val="tx1"/>
+          </a:fontRef>
+        </p:style>
+      </p:cxnSp>
+      <p:cxnSp>
+        <p:nvCxnSpPr>
+          <p:cNvPr id="22" name="Straight Arrow Connector 21">
+            <a:extLst>
+              <a:ext uri="{FF2B5EF4-FFF2-40B4-BE49-F238E27FC236}">
+                <a16:creationId xmlns:a16="http://schemas.microsoft.com/office/drawing/2014/main" id="{7DADC543-1F2A-47DD-80EA-1444F0BDA4FE}"/>
+              </a:ext>
+            </a:extLst>
+          </p:cNvPr>
+          <p:cNvCxnSpPr>
+            <a:cxnSpLocks/>
+            <a:endCxn id="36" idx="1"/>
+          </p:cNvCxnSpPr>
+          <p:nvPr/>
+        </p:nvCxnSpPr>
+        <p:spPr>
+          <a:xfrm>
+            <a:off x="4916585" y="3712509"/>
+            <a:ext cx="286495" cy="1405"/>
+          </a:xfrm>
+          <a:prstGeom prst="straightConnector1">
+            <a:avLst/>
+          </a:prstGeom>
+          <a:ln w="12700">
+            <a:solidFill>
+              <a:schemeClr val="tx1"/>
+            </a:solidFill>
+            <a:tailEnd type="triangle"/>
+          </a:ln>
+        </p:spPr>
+        <p:style>
+          <a:lnRef idx="1">
+            <a:schemeClr val="accent1"/>
+          </a:lnRef>
+          <a:fillRef idx="0">
+            <a:schemeClr val="accent1"/>
+          </a:fillRef>
+          <a:effectRef idx="0">
+            <a:schemeClr val="accent1"/>
+          </a:effectRef>
+          <a:fontRef idx="minor">
+            <a:schemeClr val="tx1"/>
+          </a:fontRef>
+        </p:style>
+      </p:cxnSp>
+      <p:cxnSp>
+        <p:nvCxnSpPr>
+          <p:cNvPr id="23" name="Straight Arrow Connector 22">
+            <a:extLst>
+              <a:ext uri="{FF2B5EF4-FFF2-40B4-BE49-F238E27FC236}">
+                <a16:creationId xmlns:a16="http://schemas.microsoft.com/office/drawing/2014/main" id="{BE9B089A-C16D-427D-B815-DDCDE7FC3C07}"/>
+              </a:ext>
+            </a:extLst>
+          </p:cNvPr>
+          <p:cNvCxnSpPr>
+            <a:cxnSpLocks/>
+          </p:cNvCxnSpPr>
+          <p:nvPr/>
+        </p:nvCxnSpPr>
+        <p:spPr>
+          <a:xfrm>
+            <a:off x="4913815" y="4456033"/>
+            <a:ext cx="275469" cy="0"/>
+          </a:xfrm>
+          <a:prstGeom prst="straightConnector1">
+            <a:avLst/>
+          </a:prstGeom>
+          <a:ln w="12700">
+            <a:solidFill>
+              <a:schemeClr val="tx1"/>
+            </a:solidFill>
+            <a:tailEnd type="triangle"/>
+          </a:ln>
+        </p:spPr>
+        <p:style>
+          <a:lnRef idx="1">
+            <a:schemeClr val="accent1"/>
+          </a:lnRef>
+          <a:fillRef idx="0">
+            <a:schemeClr val="accent1"/>
+          </a:fillRef>
+          <a:effectRef idx="0">
+            <a:schemeClr val="accent1"/>
+          </a:effectRef>
+          <a:fontRef idx="minor">
+            <a:schemeClr val="tx1"/>
+          </a:fontRef>
+        </p:style>
+      </p:cxnSp>
+      <p:cxnSp>
+        <p:nvCxnSpPr>
+          <p:cNvPr id="24" name="Straight Arrow Connector 23">
+            <a:extLst>
+              <a:ext uri="{FF2B5EF4-FFF2-40B4-BE49-F238E27FC236}">
+                <a16:creationId xmlns:a16="http://schemas.microsoft.com/office/drawing/2014/main" id="{7B4BEB08-5810-4FB6-8BAB-ECC201935D52}"/>
+              </a:ext>
+            </a:extLst>
+          </p:cNvPr>
+          <p:cNvCxnSpPr>
+            <a:cxnSpLocks/>
+          </p:cNvCxnSpPr>
+          <p:nvPr/>
+        </p:nvCxnSpPr>
+        <p:spPr>
+          <a:xfrm>
+            <a:off x="4902980" y="5212916"/>
+            <a:ext cx="286304" cy="1"/>
+          </a:xfrm>
+          <a:prstGeom prst="straightConnector1">
+            <a:avLst/>
+          </a:prstGeom>
+          <a:ln w="12700">
+            <a:solidFill>
+              <a:schemeClr val="tx1"/>
+            </a:solidFill>
+            <a:tailEnd type="triangle"/>
+          </a:ln>
+        </p:spPr>
+        <p:style>
+          <a:lnRef idx="1">
+            <a:schemeClr val="accent1"/>
+          </a:lnRef>
+          <a:fillRef idx="0">
+            <a:schemeClr val="accent1"/>
+          </a:fillRef>
+          <a:effectRef idx="0">
+            <a:schemeClr val="accent1"/>
+          </a:effectRef>
+          <a:fontRef idx="minor">
+            <a:schemeClr val="tx1"/>
+          </a:fontRef>
+        </p:style>
+      </p:cxnSp>
+      <p:sp>
+        <p:nvSpPr>
+          <p:cNvPr id="35" name="Rectangle 34">
+            <a:extLst>
+              <a:ext uri="{FF2B5EF4-FFF2-40B4-BE49-F238E27FC236}">
+                <a16:creationId xmlns:a16="http://schemas.microsoft.com/office/drawing/2014/main" id="{E35B56FE-AB88-46A7-95DE-9BB28B2DB08E}"/>
+              </a:ext>
+            </a:extLst>
+          </p:cNvPr>
+          <p:cNvSpPr/>
+          <p:nvPr/>
+        </p:nvSpPr>
+        <p:spPr>
+          <a:xfrm>
+            <a:off x="5203080" y="2655596"/>
+            <a:ext cx="1269737" cy="540212"/>
+          </a:xfrm>
+          <a:prstGeom prst="rect">
+            <a:avLst/>
+          </a:prstGeom>
+          <a:solidFill>
+            <a:srgbClr val="FFC000"/>
+          </a:solidFill>
+          <a:ln>
+            <a:noFill/>
+          </a:ln>
+        </p:spPr>
+        <p:style>
+          <a:lnRef idx="2">
+            <a:schemeClr val="accent1">
+              <a:shade val="50000"/>
+            </a:schemeClr>
+          </a:lnRef>
+          <a:fillRef idx="1">
+            <a:schemeClr val="accent1"/>
+          </a:fillRef>
+          <a:effectRef idx="0">
+            <a:schemeClr val="accent1"/>
+          </a:effectRef>
+          <a:fontRef idx="minor">
+            <a:schemeClr val="lt1"/>
+          </a:fontRef>
+        </p:style>
+        <p:txBody>
+          <a:bodyPr rtlCol="0" anchor="ctr"/>
+          <a:lstStyle/>
+          <a:p>
+            <a:pPr lvl="0" algn="ctr"/>
+            <a:r>
+              <a:rPr lang="en-US" sz="1600" dirty="0">
+                <a:solidFill>
+                  <a:prstClr val="black"/>
+                </a:solidFill>
+                <a:latin typeface="Segoe UI" panose="020B0502040204020203" pitchFamily="34" charset="0"/>
+                <a:cs typeface="Segoe UI" panose="020B0502040204020203" pitchFamily="34" charset="0"/>
+              </a:rPr>
+              <a:t>Controller</a:t>
+            </a:r>
+            <a:endParaRPr kumimoji="0" lang="en-US" sz="1600" b="0" i="0" u="none" strike="noStrike" kern="1200" cap="none" spc="0" normalizeH="0" baseline="0" noProof="0" dirty="0">
+              <a:ln>
+                <a:noFill/>
+              </a:ln>
+              <a:solidFill>
+                <a:prstClr val="black"/>
+              </a:solidFill>
+              <a:effectLst/>
+              <a:uLnTx/>
+              <a:uFillTx/>
+              <a:latin typeface="Segoe UI" panose="020B0502040204020203" pitchFamily="34" charset="0"/>
+              <a:ea typeface="+mn-ea"/>
+              <a:cs typeface="Segoe UI" panose="020B0502040204020203" pitchFamily="34" charset="0"/>
+            </a:endParaRPr>
+          </a:p>
+        </p:txBody>
+      </p:sp>
+      <p:sp>
+        <p:nvSpPr>
+          <p:cNvPr id="36" name="Rectangle 35">
+            <a:extLst>
+              <a:ext uri="{FF2B5EF4-FFF2-40B4-BE49-F238E27FC236}">
+                <a16:creationId xmlns:a16="http://schemas.microsoft.com/office/drawing/2014/main" id="{233794BE-1387-4A04-B4FE-A1BB0886A881}"/>
+              </a:ext>
+            </a:extLst>
+          </p:cNvPr>
+          <p:cNvSpPr/>
+          <p:nvPr/>
+        </p:nvSpPr>
+        <p:spPr>
+          <a:xfrm>
+            <a:off x="5203080" y="3443808"/>
+            <a:ext cx="1269737" cy="540212"/>
+          </a:xfrm>
+          <a:prstGeom prst="rect">
+            <a:avLst/>
+          </a:prstGeom>
+          <a:solidFill>
+            <a:srgbClr val="FFC000"/>
+          </a:solidFill>
+          <a:ln>
+            <a:noFill/>
+          </a:ln>
+        </p:spPr>
+        <p:style>
+          <a:lnRef idx="2">
+            <a:schemeClr val="accent1">
+              <a:shade val="50000"/>
+            </a:schemeClr>
+          </a:lnRef>
+          <a:fillRef idx="1">
+            <a:schemeClr val="accent1"/>
+          </a:fillRef>
+          <a:effectRef idx="0">
+            <a:schemeClr val="accent1"/>
+          </a:effectRef>
+          <a:fontRef idx="minor">
+            <a:schemeClr val="lt1"/>
+          </a:fontRef>
+        </p:style>
+        <p:txBody>
+          <a:bodyPr rtlCol="0" anchor="ctr"/>
+          <a:lstStyle/>
+          <a:p>
+            <a:pPr lvl="0" algn="ctr"/>
+            <a:r>
+              <a:rPr lang="en-US" sz="1600" dirty="0">
+                <a:solidFill>
+                  <a:prstClr val="black"/>
+                </a:solidFill>
+                <a:latin typeface="Segoe UI" panose="020B0502040204020203" pitchFamily="34" charset="0"/>
+                <a:cs typeface="Segoe UI" panose="020B0502040204020203" pitchFamily="34" charset="0"/>
+              </a:rPr>
+              <a:t>Controller</a:t>
+            </a:r>
+            <a:endParaRPr kumimoji="0" lang="en-US" sz="1600" b="0" i="0" u="none" strike="noStrike" kern="1200" cap="none" spc="0" normalizeH="0" baseline="0" noProof="0" dirty="0">
+              <a:ln>
+                <a:noFill/>
+              </a:ln>
+              <a:solidFill>
+                <a:prstClr val="black"/>
+              </a:solidFill>
+              <a:effectLst/>
+              <a:uLnTx/>
+              <a:uFillTx/>
+              <a:latin typeface="Segoe UI" panose="020B0502040204020203" pitchFamily="34" charset="0"/>
+              <a:ea typeface="+mn-ea"/>
+              <a:cs typeface="Segoe UI" panose="020B0502040204020203" pitchFamily="34" charset="0"/>
+            </a:endParaRPr>
+          </a:p>
+        </p:txBody>
+      </p:sp>
+      <p:sp>
+        <p:nvSpPr>
+          <p:cNvPr id="37" name="Rectangle 36">
+            <a:extLst>
+              <a:ext uri="{FF2B5EF4-FFF2-40B4-BE49-F238E27FC236}">
+                <a16:creationId xmlns:a16="http://schemas.microsoft.com/office/drawing/2014/main" id="{170C3DB8-1764-4D8D-8A90-5AA68AB24DEE}"/>
+              </a:ext>
+            </a:extLst>
+          </p:cNvPr>
+          <p:cNvSpPr/>
+          <p:nvPr/>
+        </p:nvSpPr>
+        <p:spPr>
+          <a:xfrm>
+            <a:off x="5187895" y="4199154"/>
+            <a:ext cx="1269737" cy="540212"/>
+          </a:xfrm>
+          <a:prstGeom prst="rect">
+            <a:avLst/>
+          </a:prstGeom>
+          <a:solidFill>
+            <a:srgbClr val="FFC000"/>
+          </a:solidFill>
+          <a:ln>
+            <a:noFill/>
+          </a:ln>
+        </p:spPr>
+        <p:style>
+          <a:lnRef idx="2">
+            <a:schemeClr val="accent1">
+              <a:shade val="50000"/>
+            </a:schemeClr>
+          </a:lnRef>
+          <a:fillRef idx="1">
+            <a:schemeClr val="accent1"/>
+          </a:fillRef>
+          <a:effectRef idx="0">
+            <a:schemeClr val="accent1"/>
+          </a:effectRef>
+          <a:fontRef idx="minor">
+            <a:schemeClr val="lt1"/>
+          </a:fontRef>
+        </p:style>
+        <p:txBody>
+          <a:bodyPr rtlCol="0" anchor="ctr"/>
+          <a:lstStyle/>
+          <a:p>
+            <a:pPr lvl="0" algn="ctr"/>
+            <a:r>
+              <a:rPr lang="en-US" sz="1600" dirty="0">
+                <a:solidFill>
+                  <a:prstClr val="black"/>
+                </a:solidFill>
+                <a:latin typeface="Segoe UI" panose="020B0502040204020203" pitchFamily="34" charset="0"/>
+                <a:cs typeface="Segoe UI" panose="020B0502040204020203" pitchFamily="34" charset="0"/>
+              </a:rPr>
+              <a:t>Controller</a:t>
+            </a:r>
+            <a:endParaRPr kumimoji="0" lang="en-US" sz="1600" b="0" i="0" u="none" strike="noStrike" kern="1200" cap="none" spc="0" normalizeH="0" baseline="0" noProof="0" dirty="0">
+              <a:ln>
+                <a:noFill/>
+              </a:ln>
+              <a:solidFill>
+                <a:prstClr val="black"/>
+              </a:solidFill>
+              <a:effectLst/>
+              <a:uLnTx/>
+              <a:uFillTx/>
+              <a:latin typeface="Segoe UI" panose="020B0502040204020203" pitchFamily="34" charset="0"/>
+              <a:ea typeface="+mn-ea"/>
+              <a:cs typeface="Segoe UI" panose="020B0502040204020203" pitchFamily="34" charset="0"/>
+            </a:endParaRPr>
+          </a:p>
+        </p:txBody>
+      </p:sp>
+      <p:sp>
+        <p:nvSpPr>
+          <p:cNvPr id="38" name="Rectangle 37">
+            <a:extLst>
+              <a:ext uri="{FF2B5EF4-FFF2-40B4-BE49-F238E27FC236}">
+                <a16:creationId xmlns:a16="http://schemas.microsoft.com/office/drawing/2014/main" id="{B52E71A3-AB80-4774-BA96-F2CD7C32F0DE}"/>
+              </a:ext>
+            </a:extLst>
+          </p:cNvPr>
+          <p:cNvSpPr/>
+          <p:nvPr/>
+        </p:nvSpPr>
+        <p:spPr>
+          <a:xfrm>
+            <a:off x="5187894" y="4964420"/>
+            <a:ext cx="1269737" cy="540212"/>
+          </a:xfrm>
+          <a:prstGeom prst="rect">
+            <a:avLst/>
+          </a:prstGeom>
+          <a:solidFill>
+            <a:srgbClr val="FFC000"/>
+          </a:solidFill>
+          <a:ln>
+            <a:noFill/>
+          </a:ln>
+        </p:spPr>
+        <p:style>
+          <a:lnRef idx="2">
+            <a:schemeClr val="accent1">
+              <a:shade val="50000"/>
+            </a:schemeClr>
+          </a:lnRef>
+          <a:fillRef idx="1">
+            <a:schemeClr val="accent1"/>
+          </a:fillRef>
+          <a:effectRef idx="0">
+            <a:schemeClr val="accent1"/>
+          </a:effectRef>
+          <a:fontRef idx="minor">
+            <a:schemeClr val="lt1"/>
+          </a:fontRef>
+        </p:style>
+        <p:txBody>
+          <a:bodyPr rtlCol="0" anchor="ctr"/>
+          <a:lstStyle/>
+          <a:p>
+            <a:pPr lvl="0" algn="ctr"/>
+            <a:r>
+              <a:rPr lang="en-US" sz="1600" dirty="0">
+                <a:solidFill>
+                  <a:prstClr val="black"/>
+                </a:solidFill>
+                <a:latin typeface="Segoe UI" panose="020B0502040204020203" pitchFamily="34" charset="0"/>
+                <a:cs typeface="Segoe UI" panose="020B0502040204020203" pitchFamily="34" charset="0"/>
+              </a:rPr>
+              <a:t>Controller</a:t>
+            </a:r>
+            <a:endParaRPr kumimoji="0" lang="en-US" sz="1600" b="0" i="0" u="none" strike="noStrike" kern="1200" cap="none" spc="0" normalizeH="0" baseline="0" noProof="0" dirty="0">
+              <a:ln>
+                <a:noFill/>
+              </a:ln>
+              <a:solidFill>
+                <a:prstClr val="black"/>
+              </a:solidFill>
+              <a:effectLst/>
+              <a:uLnTx/>
+              <a:uFillTx/>
+              <a:latin typeface="Segoe UI" panose="020B0502040204020203" pitchFamily="34" charset="0"/>
+              <a:ea typeface="+mn-ea"/>
+              <a:cs typeface="Segoe UI" panose="020B0502040204020203" pitchFamily="34" charset="0"/>
+            </a:endParaRPr>
+          </a:p>
+        </p:txBody>
+      </p:sp>
+      <p:sp>
+        <p:nvSpPr>
+          <p:cNvPr id="39" name="Rectangle 38">
+            <a:extLst>
+              <a:ext uri="{FF2B5EF4-FFF2-40B4-BE49-F238E27FC236}">
+                <a16:creationId xmlns:a16="http://schemas.microsoft.com/office/drawing/2014/main" id="{9A29300F-E5CC-4C40-B3A7-F917873D9D28}"/>
+              </a:ext>
+            </a:extLst>
+          </p:cNvPr>
+          <p:cNvSpPr/>
+          <p:nvPr/>
+        </p:nvSpPr>
+        <p:spPr>
+          <a:xfrm>
+            <a:off x="7249354" y="1072185"/>
+            <a:ext cx="3646722" cy="5297782"/>
+          </a:xfrm>
+          <a:prstGeom prst="rect">
+            <a:avLst/>
+          </a:prstGeom>
+          <a:solidFill>
+            <a:srgbClr val="FFC000"/>
+          </a:solidFill>
+          <a:ln>
+            <a:noFill/>
+          </a:ln>
+        </p:spPr>
+        <p:style>
+          <a:lnRef idx="2">
+            <a:schemeClr val="accent1">
+              <a:shade val="50000"/>
+            </a:schemeClr>
+          </a:lnRef>
+          <a:fillRef idx="1">
+            <a:schemeClr val="accent1"/>
+          </a:fillRef>
+          <a:effectRef idx="0">
+            <a:schemeClr val="accent1"/>
+          </a:effectRef>
+          <a:fontRef idx="minor">
+            <a:schemeClr val="lt1"/>
+          </a:fontRef>
+        </p:style>
+        <p:txBody>
+          <a:bodyPr rtlCol="0" anchor="ctr"/>
+          <a:lstStyle/>
+          <a:p>
+            <a:pPr marL="0" marR="0" lvl="0" indent="0" algn="ctr" defTabSz="914400" rtl="0" eaLnBrk="1" fontAlgn="auto" latinLnBrk="0" hangingPunct="1">
+              <a:lnSpc>
+                <a:spcPct val="100000"/>
+              </a:lnSpc>
+              <a:spcBef>
+                <a:spcPts val="0"/>
+              </a:spcBef>
+              <a:spcAft>
+                <a:spcPts val="0"/>
+              </a:spcAft>
+              <a:buClrTx/>
+              <a:buSzTx/>
+              <a:buFontTx/>
+              <a:buNone/>
+              <a:tabLst/>
+              <a:defRPr/>
+            </a:pPr>
+            <a:endParaRPr kumimoji="0" lang="en-US" sz="1600" b="0" i="0" u="none" strike="noStrike" kern="1200" cap="none" spc="0" normalizeH="0" baseline="0" noProof="0" dirty="0">
+              <a:ln>
+                <a:noFill/>
+              </a:ln>
+              <a:solidFill>
+                <a:prstClr val="black"/>
+              </a:solidFill>
+              <a:effectLst/>
+              <a:uLnTx/>
+              <a:uFillTx/>
+              <a:latin typeface="Segoe UI" panose="020B0502040204020203" pitchFamily="34" charset="0"/>
+              <a:ea typeface="+mn-ea"/>
+              <a:cs typeface="Segoe UI" panose="020B0502040204020203" pitchFamily="34" charset="0"/>
+            </a:endParaRPr>
+          </a:p>
+        </p:txBody>
+      </p:sp>
+      <p:sp>
+        <p:nvSpPr>
+          <p:cNvPr id="2" name="Rectangle 1">
+            <a:extLst>
+              <a:ext uri="{FF2B5EF4-FFF2-40B4-BE49-F238E27FC236}">
+                <a16:creationId xmlns:a16="http://schemas.microsoft.com/office/drawing/2014/main" id="{B789D49F-1524-499B-9A91-401CCC78DCF0}"/>
+              </a:ext>
+            </a:extLst>
+          </p:cNvPr>
+          <p:cNvSpPr/>
+          <p:nvPr/>
+        </p:nvSpPr>
+        <p:spPr>
+          <a:xfrm>
+            <a:off x="5222825" y="2228200"/>
+            <a:ext cx="1260281" cy="261610"/>
+          </a:xfrm>
+          <a:prstGeom prst="rect">
+            <a:avLst/>
+          </a:prstGeom>
+        </p:spPr>
+        <p:txBody>
+          <a:bodyPr wrap="none">
+            <a:spAutoFit/>
+          </a:bodyPr>
+          <a:lstStyle/>
+          <a:p>
+            <a:r>
+              <a:rPr lang="en-US" sz="1100" dirty="0">
+                <a:solidFill>
+                  <a:prstClr val="black"/>
+                </a:solidFill>
+                <a:latin typeface="Segoe UI Light" panose="020B0502040204020203" pitchFamily="34" charset="0"/>
+                <a:cs typeface="Segoe UI Light" panose="020B0502040204020203" pitchFamily="34" charset="0"/>
+              </a:rPr>
+              <a:t>(Transient lifetime)</a:t>
+            </a:r>
+          </a:p>
+        </p:txBody>
+      </p:sp>
+      <p:sp>
+        <p:nvSpPr>
+          <p:cNvPr id="40" name="Rectangle 39">
+            <a:extLst>
+              <a:ext uri="{FF2B5EF4-FFF2-40B4-BE49-F238E27FC236}">
+                <a16:creationId xmlns:a16="http://schemas.microsoft.com/office/drawing/2014/main" id="{8E5FA7EE-0226-4F46-97A2-578BEBF4E612}"/>
+              </a:ext>
+            </a:extLst>
+          </p:cNvPr>
+          <p:cNvSpPr/>
+          <p:nvPr/>
+        </p:nvSpPr>
+        <p:spPr>
+          <a:xfrm>
+            <a:off x="5222825" y="2967064"/>
+            <a:ext cx="1260281" cy="261610"/>
+          </a:xfrm>
+          <a:prstGeom prst="rect">
+            <a:avLst/>
+          </a:prstGeom>
+        </p:spPr>
+        <p:txBody>
+          <a:bodyPr wrap="none">
+            <a:spAutoFit/>
+          </a:bodyPr>
+          <a:lstStyle/>
+          <a:p>
+            <a:r>
+              <a:rPr lang="en-US" sz="1100" dirty="0">
+                <a:solidFill>
+                  <a:prstClr val="black"/>
+                </a:solidFill>
+                <a:latin typeface="Segoe UI Light" panose="020B0502040204020203" pitchFamily="34" charset="0"/>
+                <a:cs typeface="Segoe UI Light" panose="020B0502040204020203" pitchFamily="34" charset="0"/>
+              </a:rPr>
+              <a:t>(Transient lifetime)</a:t>
+            </a:r>
+          </a:p>
+        </p:txBody>
+      </p:sp>
+      <p:sp>
+        <p:nvSpPr>
+          <p:cNvPr id="41" name="Rectangle 40">
+            <a:extLst>
+              <a:ext uri="{FF2B5EF4-FFF2-40B4-BE49-F238E27FC236}">
+                <a16:creationId xmlns:a16="http://schemas.microsoft.com/office/drawing/2014/main" id="{421D1309-674A-49BB-B5B9-29D65BBBF371}"/>
+              </a:ext>
+            </a:extLst>
+          </p:cNvPr>
+          <p:cNvSpPr/>
+          <p:nvPr/>
+        </p:nvSpPr>
+        <p:spPr>
+          <a:xfrm>
+            <a:off x="5222825" y="3748812"/>
+            <a:ext cx="1260281" cy="261610"/>
+          </a:xfrm>
+          <a:prstGeom prst="rect">
+            <a:avLst/>
+          </a:prstGeom>
+        </p:spPr>
+        <p:txBody>
+          <a:bodyPr wrap="none">
+            <a:spAutoFit/>
+          </a:bodyPr>
+          <a:lstStyle/>
+          <a:p>
+            <a:r>
+              <a:rPr lang="en-US" sz="1100" dirty="0">
+                <a:solidFill>
+                  <a:prstClr val="black"/>
+                </a:solidFill>
+                <a:latin typeface="Segoe UI Light" panose="020B0502040204020203" pitchFamily="34" charset="0"/>
+                <a:cs typeface="Segoe UI Light" panose="020B0502040204020203" pitchFamily="34" charset="0"/>
+              </a:rPr>
+              <a:t>(Transient lifetime)</a:t>
+            </a:r>
+          </a:p>
+        </p:txBody>
+      </p:sp>
+      <p:sp>
+        <p:nvSpPr>
+          <p:cNvPr id="42" name="Rectangle 41">
+            <a:extLst>
+              <a:ext uri="{FF2B5EF4-FFF2-40B4-BE49-F238E27FC236}">
+                <a16:creationId xmlns:a16="http://schemas.microsoft.com/office/drawing/2014/main" id="{CEE270CD-F43D-4E06-9DF9-81AA19B1208C}"/>
+              </a:ext>
+            </a:extLst>
+          </p:cNvPr>
+          <p:cNvSpPr/>
+          <p:nvPr/>
+        </p:nvSpPr>
+        <p:spPr>
+          <a:xfrm>
+            <a:off x="5203080" y="4514078"/>
+            <a:ext cx="1260281" cy="261610"/>
+          </a:xfrm>
+          <a:prstGeom prst="rect">
+            <a:avLst/>
+          </a:prstGeom>
+        </p:spPr>
+        <p:txBody>
+          <a:bodyPr wrap="none">
+            <a:spAutoFit/>
+          </a:bodyPr>
+          <a:lstStyle/>
+          <a:p>
+            <a:r>
+              <a:rPr lang="en-US" sz="1100" dirty="0">
+                <a:solidFill>
+                  <a:prstClr val="black"/>
+                </a:solidFill>
+                <a:latin typeface="Segoe UI Light" panose="020B0502040204020203" pitchFamily="34" charset="0"/>
+                <a:cs typeface="Segoe UI Light" panose="020B0502040204020203" pitchFamily="34" charset="0"/>
+              </a:rPr>
+              <a:t>(Transient lifetime)</a:t>
+            </a:r>
+          </a:p>
+        </p:txBody>
+      </p:sp>
+      <p:sp>
+        <p:nvSpPr>
+          <p:cNvPr id="43" name="Rectangle 42">
+            <a:extLst>
+              <a:ext uri="{FF2B5EF4-FFF2-40B4-BE49-F238E27FC236}">
+                <a16:creationId xmlns:a16="http://schemas.microsoft.com/office/drawing/2014/main" id="{86CAD39E-98F6-4029-B178-2BADFCA322B4}"/>
+              </a:ext>
+            </a:extLst>
+          </p:cNvPr>
+          <p:cNvSpPr/>
+          <p:nvPr/>
+        </p:nvSpPr>
+        <p:spPr>
+          <a:xfrm>
+            <a:off x="5197350" y="5274525"/>
+            <a:ext cx="1260281" cy="261610"/>
+          </a:xfrm>
+          <a:prstGeom prst="rect">
+            <a:avLst/>
+          </a:prstGeom>
+        </p:spPr>
+        <p:txBody>
+          <a:bodyPr wrap="none">
+            <a:spAutoFit/>
+          </a:bodyPr>
+          <a:lstStyle/>
+          <a:p>
+            <a:r>
+              <a:rPr lang="en-US" sz="1100" dirty="0">
+                <a:solidFill>
+                  <a:prstClr val="black"/>
+                </a:solidFill>
+                <a:latin typeface="Segoe UI Light" panose="020B0502040204020203" pitchFamily="34" charset="0"/>
+                <a:cs typeface="Segoe UI Light" panose="020B0502040204020203" pitchFamily="34" charset="0"/>
+              </a:rPr>
+              <a:t>(Transient lifetime)</a:t>
+            </a:r>
+          </a:p>
+        </p:txBody>
+      </p:sp>
+      <p:cxnSp>
+        <p:nvCxnSpPr>
+          <p:cNvPr id="44" name="Straight Arrow Connector 43">
+            <a:extLst>
+              <a:ext uri="{FF2B5EF4-FFF2-40B4-BE49-F238E27FC236}">
+                <a16:creationId xmlns:a16="http://schemas.microsoft.com/office/drawing/2014/main" id="{BA660B7B-04CE-4223-B188-D89EBAAB7890}"/>
+              </a:ext>
+            </a:extLst>
+          </p:cNvPr>
+          <p:cNvCxnSpPr>
+            <a:cxnSpLocks/>
+          </p:cNvCxnSpPr>
+          <p:nvPr/>
+        </p:nvCxnSpPr>
+        <p:spPr>
+          <a:xfrm flipV="1">
+            <a:off x="6468851" y="2188244"/>
+            <a:ext cx="780503" cy="2451"/>
+          </a:xfrm>
+          <a:prstGeom prst="straightConnector1">
+            <a:avLst/>
+          </a:prstGeom>
+          <a:ln w="12700">
+            <a:solidFill>
+              <a:schemeClr val="tx1"/>
+            </a:solidFill>
+            <a:tailEnd type="triangle"/>
+          </a:ln>
+        </p:spPr>
+        <p:style>
+          <a:lnRef idx="1">
+            <a:schemeClr val="accent1"/>
+          </a:lnRef>
+          <a:fillRef idx="0">
+            <a:schemeClr val="accent1"/>
+          </a:fillRef>
+          <a:effectRef idx="0">
+            <a:schemeClr val="accent1"/>
+          </a:effectRef>
+          <a:fontRef idx="minor">
+            <a:schemeClr val="tx1"/>
+          </a:fontRef>
+        </p:style>
+      </p:cxnSp>
+      <p:cxnSp>
+        <p:nvCxnSpPr>
+          <p:cNvPr id="45" name="Straight Arrow Connector 44">
+            <a:extLst>
+              <a:ext uri="{FF2B5EF4-FFF2-40B4-BE49-F238E27FC236}">
+                <a16:creationId xmlns:a16="http://schemas.microsoft.com/office/drawing/2014/main" id="{F82368A9-7499-410F-A1FB-2248A829E98D}"/>
+              </a:ext>
+            </a:extLst>
+          </p:cNvPr>
+          <p:cNvCxnSpPr>
+            <a:cxnSpLocks/>
+            <a:stCxn id="35" idx="3"/>
+          </p:cNvCxnSpPr>
+          <p:nvPr/>
+        </p:nvCxnSpPr>
+        <p:spPr>
+          <a:xfrm flipV="1">
+            <a:off x="6472817" y="2923206"/>
+            <a:ext cx="770807" cy="2496"/>
+          </a:xfrm>
+          <a:prstGeom prst="straightConnector1">
+            <a:avLst/>
+          </a:prstGeom>
+          <a:ln w="12700">
+            <a:solidFill>
+              <a:schemeClr val="tx1"/>
+            </a:solidFill>
+            <a:tailEnd type="triangle"/>
+          </a:ln>
+        </p:spPr>
+        <p:style>
+          <a:lnRef idx="1">
+            <a:schemeClr val="accent1"/>
+          </a:lnRef>
+          <a:fillRef idx="0">
+            <a:schemeClr val="accent1"/>
+          </a:fillRef>
+          <a:effectRef idx="0">
+            <a:schemeClr val="accent1"/>
+          </a:effectRef>
+          <a:fontRef idx="minor">
+            <a:schemeClr val="tx1"/>
+          </a:fontRef>
+        </p:style>
+      </p:cxnSp>
+      <p:cxnSp>
+        <p:nvCxnSpPr>
+          <p:cNvPr id="46" name="Straight Arrow Connector 45">
+            <a:extLst>
+              <a:ext uri="{FF2B5EF4-FFF2-40B4-BE49-F238E27FC236}">
+                <a16:creationId xmlns:a16="http://schemas.microsoft.com/office/drawing/2014/main" id="{235ACB45-1120-481D-8446-BBC8BC29314A}"/>
+              </a:ext>
+            </a:extLst>
+          </p:cNvPr>
+          <p:cNvCxnSpPr>
+            <a:cxnSpLocks/>
+            <a:stCxn id="36" idx="3"/>
+          </p:cNvCxnSpPr>
+          <p:nvPr/>
+        </p:nvCxnSpPr>
+        <p:spPr>
+          <a:xfrm>
+            <a:off x="6472817" y="3713914"/>
+            <a:ext cx="761351" cy="0"/>
+          </a:xfrm>
+          <a:prstGeom prst="straightConnector1">
+            <a:avLst/>
+          </a:prstGeom>
+          <a:ln w="12700">
+            <a:solidFill>
+              <a:schemeClr val="tx1"/>
+            </a:solidFill>
+            <a:tailEnd type="triangle"/>
+          </a:ln>
+        </p:spPr>
+        <p:style>
+          <a:lnRef idx="1">
+            <a:schemeClr val="accent1"/>
+          </a:lnRef>
+          <a:fillRef idx="0">
+            <a:schemeClr val="accent1"/>
+          </a:fillRef>
+          <a:effectRef idx="0">
+            <a:schemeClr val="accent1"/>
+          </a:effectRef>
+          <a:fontRef idx="minor">
+            <a:schemeClr val="tx1"/>
+          </a:fontRef>
+        </p:style>
+      </p:cxnSp>
+      <p:cxnSp>
+        <p:nvCxnSpPr>
+          <p:cNvPr id="47" name="Straight Arrow Connector 46">
+            <a:extLst>
+              <a:ext uri="{FF2B5EF4-FFF2-40B4-BE49-F238E27FC236}">
+                <a16:creationId xmlns:a16="http://schemas.microsoft.com/office/drawing/2014/main" id="{3CE55B61-3B51-49D0-B771-FC026A8FC07C}"/>
+              </a:ext>
+            </a:extLst>
+          </p:cNvPr>
+          <p:cNvCxnSpPr>
+            <a:cxnSpLocks/>
+          </p:cNvCxnSpPr>
+          <p:nvPr/>
+        </p:nvCxnSpPr>
+        <p:spPr>
+          <a:xfrm flipV="1">
+            <a:off x="6454124" y="4477775"/>
+            <a:ext cx="780044" cy="2"/>
+          </a:xfrm>
+          <a:prstGeom prst="straightConnector1">
+            <a:avLst/>
+          </a:prstGeom>
+          <a:ln w="12700">
+            <a:solidFill>
+              <a:schemeClr val="tx1"/>
+            </a:solidFill>
+            <a:tailEnd type="triangle"/>
+          </a:ln>
+        </p:spPr>
+        <p:style>
+          <a:lnRef idx="1">
+            <a:schemeClr val="accent1"/>
+          </a:lnRef>
+          <a:fillRef idx="0">
+            <a:schemeClr val="accent1"/>
+          </a:fillRef>
+          <a:effectRef idx="0">
+            <a:schemeClr val="accent1"/>
+          </a:effectRef>
+          <a:fontRef idx="minor">
+            <a:schemeClr val="tx1"/>
+          </a:fontRef>
+        </p:style>
+      </p:cxnSp>
+      <p:cxnSp>
+        <p:nvCxnSpPr>
+          <p:cNvPr id="48" name="Straight Arrow Connector 47">
+            <a:extLst>
+              <a:ext uri="{FF2B5EF4-FFF2-40B4-BE49-F238E27FC236}">
+                <a16:creationId xmlns:a16="http://schemas.microsoft.com/office/drawing/2014/main" id="{4D1E5D4B-536A-47AE-B012-F42CB746D985}"/>
+              </a:ext>
+            </a:extLst>
+          </p:cNvPr>
+          <p:cNvCxnSpPr>
+            <a:cxnSpLocks/>
+            <a:endCxn id="106" idx="1"/>
+          </p:cNvCxnSpPr>
+          <p:nvPr/>
+        </p:nvCxnSpPr>
+        <p:spPr>
+          <a:xfrm>
+            <a:off x="6454124" y="5234660"/>
+            <a:ext cx="1272168" cy="411209"/>
+          </a:xfrm>
+          <a:prstGeom prst="straightConnector1">
+            <a:avLst/>
+          </a:prstGeom>
+          <a:ln w="12700">
+            <a:solidFill>
+              <a:schemeClr val="tx1"/>
+            </a:solidFill>
+            <a:tailEnd type="triangle"/>
+          </a:ln>
+        </p:spPr>
+        <p:style>
+          <a:lnRef idx="1">
+            <a:schemeClr val="accent1"/>
+          </a:lnRef>
+          <a:fillRef idx="0">
+            <a:schemeClr val="accent1"/>
+          </a:fillRef>
+          <a:effectRef idx="0">
+            <a:schemeClr val="accent1"/>
+          </a:effectRef>
+          <a:fontRef idx="minor">
+            <a:schemeClr val="tx1"/>
+          </a:fontRef>
+        </p:style>
+      </p:cxnSp>
+      <p:sp>
+        <p:nvSpPr>
+          <p:cNvPr id="3" name="Rectangle: Rounded Corners 2">
+            <a:extLst>
+              <a:ext uri="{FF2B5EF4-FFF2-40B4-BE49-F238E27FC236}">
+                <a16:creationId xmlns:a16="http://schemas.microsoft.com/office/drawing/2014/main" id="{3EB6123E-5564-464D-A3DF-A761C0857BA5}"/>
+              </a:ext>
+            </a:extLst>
+          </p:cNvPr>
+          <p:cNvSpPr/>
+          <p:nvPr/>
+        </p:nvSpPr>
+        <p:spPr>
+          <a:xfrm>
+            <a:off x="3390499" y="1782471"/>
+            <a:ext cx="1512481" cy="3893717"/>
+          </a:xfrm>
+          <a:prstGeom prst="roundRect">
+            <a:avLst/>
+          </a:prstGeom>
+          <a:noFill/>
+          <a:ln w="19050">
+            <a:solidFill>
+              <a:schemeClr val="tx1"/>
+            </a:solidFill>
+            <a:prstDash val="lgDash"/>
+          </a:ln>
+        </p:spPr>
+        <p:style>
+          <a:lnRef idx="2">
+            <a:schemeClr val="accent1">
+              <a:shade val="50000"/>
+            </a:schemeClr>
+          </a:lnRef>
+          <a:fillRef idx="1">
+            <a:schemeClr val="accent1"/>
+          </a:fillRef>
+          <a:effectRef idx="0">
+            <a:schemeClr val="accent1"/>
+          </a:effectRef>
+          <a:fontRef idx="minor">
+            <a:schemeClr val="lt1"/>
+          </a:fontRef>
+        </p:style>
+        <p:txBody>
+          <a:bodyPr rtlCol="0" anchor="ctr"/>
+          <a:lstStyle/>
+          <a:p>
+            <a:pPr algn="ctr"/>
+            <a:endParaRPr lang="en-US"/>
+          </a:p>
+        </p:txBody>
+      </p:sp>
+      <p:sp>
+        <p:nvSpPr>
+          <p:cNvPr id="49" name="Rectangle 48">
+            <a:extLst>
+              <a:ext uri="{FF2B5EF4-FFF2-40B4-BE49-F238E27FC236}">
+                <a16:creationId xmlns:a16="http://schemas.microsoft.com/office/drawing/2014/main" id="{1BC180BE-7D1B-40A3-B85A-EA5689825FD0}"/>
+              </a:ext>
+            </a:extLst>
+          </p:cNvPr>
+          <p:cNvSpPr/>
+          <p:nvPr/>
+        </p:nvSpPr>
+        <p:spPr>
+          <a:xfrm>
+            <a:off x="6589913" y="2168953"/>
+            <a:ext cx="747449" cy="276999"/>
+          </a:xfrm>
+          <a:prstGeom prst="rect">
+            <a:avLst/>
+          </a:prstGeom>
+        </p:spPr>
+        <p:txBody>
+          <a:bodyPr wrap="none">
+            <a:spAutoFit/>
+          </a:bodyPr>
+          <a:lstStyle/>
+          <a:p>
+            <a:pPr marL="0" marR="0" lvl="0" indent="0" algn="l" defTabSz="914400" rtl="0" eaLnBrk="1" fontAlgn="auto" latinLnBrk="0" hangingPunct="1">
+              <a:lnSpc>
+                <a:spcPct val="100000"/>
+              </a:lnSpc>
+              <a:spcBef>
+                <a:spcPts val="0"/>
+              </a:spcBef>
+              <a:spcAft>
+                <a:spcPts val="0"/>
+              </a:spcAft>
+              <a:buClrTx/>
+              <a:buSzTx/>
+              <a:buFontTx/>
+              <a:buNone/>
+              <a:tabLst/>
+              <a:defRPr/>
+            </a:pPr>
+            <a:r>
+              <a:rPr kumimoji="0" lang="en-US" sz="1200" b="0" i="0" u="none" strike="noStrike" kern="1200" cap="none" spc="0" normalizeH="0" baseline="0" noProof="0" dirty="0">
+                <a:ln>
+                  <a:noFill/>
+                </a:ln>
+                <a:solidFill>
+                  <a:prstClr val="black"/>
+                </a:solidFill>
+                <a:effectLst/>
+                <a:uLnTx/>
+                <a:uFillTx/>
+                <a:latin typeface="Segoe UI Light" panose="020B0502040204020203" pitchFamily="34" charset="0"/>
+                <a:ea typeface="+mn-ea"/>
+                <a:cs typeface="Segoe UI Light" panose="020B0502040204020203" pitchFamily="34" charset="0"/>
+              </a:rPr>
+              <a:t>.Predict()</a:t>
+            </a:r>
+          </a:p>
+        </p:txBody>
+      </p:sp>
+      <p:sp>
+        <p:nvSpPr>
+          <p:cNvPr id="50" name="Rectangle 49">
+            <a:extLst>
+              <a:ext uri="{FF2B5EF4-FFF2-40B4-BE49-F238E27FC236}">
+                <a16:creationId xmlns:a16="http://schemas.microsoft.com/office/drawing/2014/main" id="{6851496A-53FE-4F3E-8FCA-5237AF36F5C3}"/>
+              </a:ext>
+            </a:extLst>
+          </p:cNvPr>
+          <p:cNvSpPr/>
+          <p:nvPr/>
+        </p:nvSpPr>
+        <p:spPr>
+          <a:xfrm>
+            <a:off x="6559625" y="2893608"/>
+            <a:ext cx="747449" cy="276999"/>
+          </a:xfrm>
+          <a:prstGeom prst="rect">
+            <a:avLst/>
+          </a:prstGeom>
+        </p:spPr>
+        <p:txBody>
+          <a:bodyPr wrap="none">
+            <a:spAutoFit/>
+          </a:bodyPr>
+          <a:lstStyle/>
+          <a:p>
+            <a:pPr marL="0" marR="0" lvl="0" indent="0" algn="l" defTabSz="914400" rtl="0" eaLnBrk="1" fontAlgn="auto" latinLnBrk="0" hangingPunct="1">
+              <a:lnSpc>
+                <a:spcPct val="100000"/>
+              </a:lnSpc>
+              <a:spcBef>
+                <a:spcPts val="0"/>
+              </a:spcBef>
+              <a:spcAft>
+                <a:spcPts val="0"/>
+              </a:spcAft>
+              <a:buClrTx/>
+              <a:buSzTx/>
+              <a:buFontTx/>
+              <a:buNone/>
+              <a:tabLst/>
+              <a:defRPr/>
+            </a:pPr>
+            <a:r>
+              <a:rPr kumimoji="0" lang="en-US" sz="1200" b="0" i="0" u="none" strike="noStrike" kern="1200" cap="none" spc="0" normalizeH="0" baseline="0" noProof="0" dirty="0">
+                <a:ln>
+                  <a:noFill/>
+                </a:ln>
+                <a:solidFill>
+                  <a:prstClr val="black"/>
+                </a:solidFill>
+                <a:effectLst/>
+                <a:uLnTx/>
+                <a:uFillTx/>
+                <a:latin typeface="Segoe UI Light" panose="020B0502040204020203" pitchFamily="34" charset="0"/>
+                <a:ea typeface="+mn-ea"/>
+                <a:cs typeface="Segoe UI Light" panose="020B0502040204020203" pitchFamily="34" charset="0"/>
+              </a:rPr>
+              <a:t>.Predict()</a:t>
+            </a:r>
+          </a:p>
+        </p:txBody>
+      </p:sp>
+      <p:sp>
+        <p:nvSpPr>
+          <p:cNvPr id="68" name="Rectangle 67">
+            <a:extLst>
+              <a:ext uri="{FF2B5EF4-FFF2-40B4-BE49-F238E27FC236}">
+                <a16:creationId xmlns:a16="http://schemas.microsoft.com/office/drawing/2014/main" id="{D71C4662-B34F-4A83-947C-204097E89588}"/>
+              </a:ext>
+            </a:extLst>
+          </p:cNvPr>
+          <p:cNvSpPr/>
+          <p:nvPr/>
+        </p:nvSpPr>
+        <p:spPr>
+          <a:xfrm>
+            <a:off x="6589913" y="3723089"/>
+            <a:ext cx="747449" cy="276999"/>
+          </a:xfrm>
+          <a:prstGeom prst="rect">
+            <a:avLst/>
+          </a:prstGeom>
+        </p:spPr>
+        <p:txBody>
+          <a:bodyPr wrap="none">
+            <a:spAutoFit/>
+          </a:bodyPr>
+          <a:lstStyle/>
+          <a:p>
+            <a:pPr marL="0" marR="0" lvl="0" indent="0" algn="l" defTabSz="914400" rtl="0" eaLnBrk="1" fontAlgn="auto" latinLnBrk="0" hangingPunct="1">
+              <a:lnSpc>
+                <a:spcPct val="100000"/>
+              </a:lnSpc>
+              <a:spcBef>
+                <a:spcPts val="0"/>
+              </a:spcBef>
+              <a:spcAft>
+                <a:spcPts val="0"/>
+              </a:spcAft>
+              <a:buClrTx/>
+              <a:buSzTx/>
+              <a:buFontTx/>
+              <a:buNone/>
+              <a:tabLst/>
+              <a:defRPr/>
+            </a:pPr>
+            <a:r>
+              <a:rPr kumimoji="0" lang="en-US" sz="1200" b="0" i="0" u="none" strike="noStrike" kern="1200" cap="none" spc="0" normalizeH="0" baseline="0" noProof="0" dirty="0">
+                <a:ln>
+                  <a:noFill/>
+                </a:ln>
+                <a:solidFill>
+                  <a:prstClr val="black"/>
+                </a:solidFill>
+                <a:effectLst/>
+                <a:uLnTx/>
+                <a:uFillTx/>
+                <a:latin typeface="Segoe UI Light" panose="020B0502040204020203" pitchFamily="34" charset="0"/>
+                <a:ea typeface="+mn-ea"/>
+                <a:cs typeface="Segoe UI Light" panose="020B0502040204020203" pitchFamily="34" charset="0"/>
+              </a:rPr>
+              <a:t>.Predict()</a:t>
+            </a:r>
+          </a:p>
+        </p:txBody>
+      </p:sp>
+      <p:sp>
+        <p:nvSpPr>
+          <p:cNvPr id="69" name="Rectangle 68">
+            <a:extLst>
+              <a:ext uri="{FF2B5EF4-FFF2-40B4-BE49-F238E27FC236}">
+                <a16:creationId xmlns:a16="http://schemas.microsoft.com/office/drawing/2014/main" id="{749F5F66-4965-41FE-90C6-E907A8577C8B}"/>
+              </a:ext>
+            </a:extLst>
+          </p:cNvPr>
+          <p:cNvSpPr/>
+          <p:nvPr/>
+        </p:nvSpPr>
+        <p:spPr>
+          <a:xfrm>
+            <a:off x="6559625" y="4447744"/>
+            <a:ext cx="747449" cy="276999"/>
+          </a:xfrm>
+          <a:prstGeom prst="rect">
+            <a:avLst/>
+          </a:prstGeom>
+        </p:spPr>
+        <p:txBody>
+          <a:bodyPr wrap="none">
+            <a:spAutoFit/>
+          </a:bodyPr>
+          <a:lstStyle/>
+          <a:p>
+            <a:pPr marL="0" marR="0" lvl="0" indent="0" algn="l" defTabSz="914400" rtl="0" eaLnBrk="1" fontAlgn="auto" latinLnBrk="0" hangingPunct="1">
+              <a:lnSpc>
+                <a:spcPct val="100000"/>
+              </a:lnSpc>
+              <a:spcBef>
+                <a:spcPts val="0"/>
+              </a:spcBef>
+              <a:spcAft>
+                <a:spcPts val="0"/>
+              </a:spcAft>
+              <a:buClrTx/>
+              <a:buSzTx/>
+              <a:buFontTx/>
+              <a:buNone/>
+              <a:tabLst/>
+              <a:defRPr/>
+            </a:pPr>
+            <a:r>
+              <a:rPr kumimoji="0" lang="en-US" sz="1200" b="0" i="0" u="none" strike="noStrike" kern="1200" cap="none" spc="0" normalizeH="0" baseline="0" noProof="0" dirty="0">
+                <a:ln>
+                  <a:noFill/>
+                </a:ln>
+                <a:solidFill>
+                  <a:prstClr val="black"/>
+                </a:solidFill>
+                <a:effectLst/>
+                <a:uLnTx/>
+                <a:uFillTx/>
+                <a:latin typeface="Segoe UI Light" panose="020B0502040204020203" pitchFamily="34" charset="0"/>
+                <a:ea typeface="+mn-ea"/>
+                <a:cs typeface="Segoe UI Light" panose="020B0502040204020203" pitchFamily="34" charset="0"/>
+              </a:rPr>
+              <a:t>.Predict()</a:t>
+            </a:r>
+          </a:p>
+        </p:txBody>
+      </p:sp>
+      <p:sp>
+        <p:nvSpPr>
+          <p:cNvPr id="70" name="Rectangle 69">
+            <a:extLst>
+              <a:ext uri="{FF2B5EF4-FFF2-40B4-BE49-F238E27FC236}">
+                <a16:creationId xmlns:a16="http://schemas.microsoft.com/office/drawing/2014/main" id="{C5B4C0DD-691D-426E-ABD6-322256F960AD}"/>
+              </a:ext>
+            </a:extLst>
+          </p:cNvPr>
+          <p:cNvSpPr/>
+          <p:nvPr/>
+        </p:nvSpPr>
+        <p:spPr>
+          <a:xfrm>
+            <a:off x="6748359" y="5600310"/>
+            <a:ext cx="1064587" cy="307777"/>
+          </a:xfrm>
+          <a:prstGeom prst="rect">
+            <a:avLst/>
+          </a:prstGeom>
+        </p:spPr>
+        <p:txBody>
+          <a:bodyPr wrap="none">
+            <a:spAutoFit/>
+          </a:bodyPr>
+          <a:lstStyle/>
+          <a:p>
+            <a:pPr marL="0" marR="0" lvl="0" indent="0" algn="l" defTabSz="914400" rtl="0" eaLnBrk="1" fontAlgn="auto" latinLnBrk="0" hangingPunct="1">
+              <a:lnSpc>
+                <a:spcPct val="100000"/>
+              </a:lnSpc>
+              <a:spcBef>
+                <a:spcPts val="0"/>
+              </a:spcBef>
+              <a:spcAft>
+                <a:spcPts val="0"/>
+              </a:spcAft>
+              <a:buClrTx/>
+              <a:buSzTx/>
+              <a:buFontTx/>
+              <a:buNone/>
+              <a:tabLst/>
+              <a:defRPr/>
+            </a:pPr>
+            <a:r>
+              <a:rPr kumimoji="0" lang="en-US" sz="1400" b="0" i="0" u="none" strike="noStrike" kern="1200" cap="none" spc="0" normalizeH="0" baseline="0" noProof="0" dirty="0">
+                <a:ln>
+                  <a:noFill/>
+                </a:ln>
+                <a:solidFill>
+                  <a:prstClr val="black"/>
+                </a:solidFill>
+                <a:effectLst/>
+                <a:uLnTx/>
+                <a:uFillTx/>
+                <a:latin typeface="Segoe UI Light" panose="020B0502040204020203" pitchFamily="34" charset="0"/>
+                <a:ea typeface="+mn-ea"/>
+                <a:cs typeface="Segoe UI Light" panose="020B0502040204020203" pitchFamily="34" charset="0"/>
+              </a:rPr>
+              <a:t>.Transform()</a:t>
+            </a:r>
+          </a:p>
+        </p:txBody>
+      </p:sp>
+      <p:sp>
+        <p:nvSpPr>
+          <p:cNvPr id="71" name="Rectangle 70">
+            <a:extLst>
+              <a:ext uri="{FF2B5EF4-FFF2-40B4-BE49-F238E27FC236}">
+                <a16:creationId xmlns:a16="http://schemas.microsoft.com/office/drawing/2014/main" id="{6874BB00-47CE-4155-8F7D-8B03596C8D17}"/>
+              </a:ext>
+            </a:extLst>
+          </p:cNvPr>
+          <p:cNvSpPr/>
+          <p:nvPr/>
+        </p:nvSpPr>
+        <p:spPr>
+          <a:xfrm>
+            <a:off x="7169549" y="1065184"/>
+            <a:ext cx="3908571" cy="400110"/>
+          </a:xfrm>
+          <a:prstGeom prst="rect">
+            <a:avLst/>
+          </a:prstGeom>
+        </p:spPr>
+        <p:txBody>
+          <a:bodyPr wrap="square">
+            <a:spAutoFit/>
+          </a:bodyPr>
+          <a:lstStyle/>
+          <a:p>
+            <a:pPr marL="0" marR="0" lvl="0" indent="0" algn="ctr" defTabSz="914400" rtl="0" eaLnBrk="1" fontAlgn="auto" latinLnBrk="0" hangingPunct="1">
+              <a:lnSpc>
+                <a:spcPct val="100000"/>
+              </a:lnSpc>
+              <a:spcBef>
+                <a:spcPts val="0"/>
+              </a:spcBef>
+              <a:spcAft>
+                <a:spcPts val="0"/>
+              </a:spcAft>
+              <a:buClrTx/>
+              <a:buSzTx/>
+              <a:buFontTx/>
+              <a:buNone/>
+              <a:tabLst/>
+              <a:defRPr/>
+            </a:pPr>
+            <a:r>
+              <a:rPr kumimoji="0" lang="en-US" sz="2000" b="1" i="0" u="none" strike="noStrike" kern="1200" cap="none" spc="0" normalizeH="0" baseline="0" noProof="0" dirty="0">
+                <a:ln>
+                  <a:noFill/>
+                </a:ln>
+                <a:solidFill>
+                  <a:prstClr val="black"/>
+                </a:solidFill>
+                <a:effectLst/>
+                <a:uLnTx/>
+                <a:uFillTx/>
+                <a:latin typeface="Segoe UI" panose="020B0502040204020203" pitchFamily="34" charset="0"/>
+                <a:ea typeface="+mn-ea"/>
+                <a:cs typeface="Segoe UI" panose="020B0502040204020203" pitchFamily="34" charset="0"/>
+              </a:rPr>
+              <a:t>MLModelEngine</a:t>
+            </a:r>
+            <a:r>
+              <a:rPr kumimoji="0" lang="en-US" sz="2000" i="0" u="none" strike="noStrike" kern="1200" cap="none" spc="0" normalizeH="0" baseline="0" noProof="0" dirty="0">
+                <a:ln>
+                  <a:noFill/>
+                </a:ln>
+                <a:solidFill>
+                  <a:prstClr val="black"/>
+                </a:solidFill>
+                <a:effectLst/>
+                <a:uLnTx/>
+                <a:uFillTx/>
+                <a:latin typeface="Segoe UI" panose="020B0502040204020203" pitchFamily="34" charset="0"/>
+                <a:ea typeface="+mn-ea"/>
+                <a:cs typeface="Segoe UI" panose="020B0502040204020203" pitchFamily="34" charset="0"/>
+              </a:rPr>
+              <a:t> object</a:t>
+            </a:r>
+          </a:p>
+        </p:txBody>
+      </p:sp>
+      <p:sp>
+        <p:nvSpPr>
+          <p:cNvPr id="72" name="Rectangle 71">
+            <a:extLst>
+              <a:ext uri="{FF2B5EF4-FFF2-40B4-BE49-F238E27FC236}">
+                <a16:creationId xmlns:a16="http://schemas.microsoft.com/office/drawing/2014/main" id="{6513ED1B-EAB9-48D0-9593-0C37EB449D26}"/>
+              </a:ext>
+            </a:extLst>
+          </p:cNvPr>
+          <p:cNvSpPr/>
+          <p:nvPr/>
+        </p:nvSpPr>
+        <p:spPr>
+          <a:xfrm>
+            <a:off x="8132216" y="1354766"/>
+            <a:ext cx="1983235" cy="369332"/>
+          </a:xfrm>
+          <a:prstGeom prst="rect">
+            <a:avLst/>
+          </a:prstGeom>
+        </p:spPr>
+        <p:txBody>
+          <a:bodyPr wrap="none">
+            <a:spAutoFit/>
+          </a:bodyPr>
+          <a:lstStyle/>
+          <a:p>
+            <a:r>
+              <a:rPr lang="en-US" dirty="0">
+                <a:solidFill>
+                  <a:prstClr val="black"/>
+                </a:solidFill>
+                <a:latin typeface="Segoe UI Light" panose="020B0502040204020203" pitchFamily="34" charset="0"/>
+                <a:cs typeface="Segoe UI Light" panose="020B0502040204020203" pitchFamily="34" charset="0"/>
+              </a:rPr>
+              <a:t>(Singleton lifetime)</a:t>
+            </a:r>
+          </a:p>
+        </p:txBody>
+      </p:sp>
+      <p:sp>
+        <p:nvSpPr>
+          <p:cNvPr id="73" name="Rectangle 72">
+            <a:extLst>
+              <a:ext uri="{FF2B5EF4-FFF2-40B4-BE49-F238E27FC236}">
+                <a16:creationId xmlns:a16="http://schemas.microsoft.com/office/drawing/2014/main" id="{3B49F770-E82C-403C-AE01-5CF5CFB6F22D}"/>
+              </a:ext>
+            </a:extLst>
+          </p:cNvPr>
+          <p:cNvSpPr/>
+          <p:nvPr/>
+        </p:nvSpPr>
+        <p:spPr>
+          <a:xfrm>
+            <a:off x="8244251" y="3191900"/>
+            <a:ext cx="1413984" cy="400814"/>
+          </a:xfrm>
+          <a:prstGeom prst="rect">
+            <a:avLst/>
+          </a:prstGeom>
+          <a:noFill/>
+          <a:ln>
+            <a:solidFill>
+              <a:schemeClr val="tx1"/>
+            </a:solidFill>
+          </a:ln>
+        </p:spPr>
+        <p:style>
+          <a:lnRef idx="2">
+            <a:schemeClr val="accent1">
+              <a:shade val="50000"/>
+            </a:schemeClr>
+          </a:lnRef>
+          <a:fillRef idx="1">
+            <a:schemeClr val="accent1"/>
+          </a:fillRef>
+          <a:effectRef idx="0">
+            <a:schemeClr val="accent1"/>
+          </a:effectRef>
+          <a:fontRef idx="minor">
+            <a:schemeClr val="lt1"/>
+          </a:fontRef>
+        </p:style>
+        <p:txBody>
+          <a:bodyPr rtlCol="0" anchor="ctr"/>
+          <a:lstStyle/>
+          <a:p>
+            <a:pPr marL="0" marR="0" lvl="0" indent="0" algn="ctr" defTabSz="914400" rtl="0" eaLnBrk="1" fontAlgn="auto" latinLnBrk="0" hangingPunct="1">
+              <a:lnSpc>
+                <a:spcPct val="100000"/>
+              </a:lnSpc>
+              <a:spcBef>
+                <a:spcPts val="0"/>
+              </a:spcBef>
+              <a:spcAft>
+                <a:spcPts val="0"/>
+              </a:spcAft>
+              <a:buClrTx/>
+              <a:buSzTx/>
+              <a:buFontTx/>
+              <a:buNone/>
+              <a:tabLst/>
+              <a:defRPr/>
+            </a:pPr>
+            <a:r>
+              <a:rPr kumimoji="0" lang="en-US" sz="1200" b="0" i="0" u="none" strike="noStrike" kern="1200" cap="none" spc="0" normalizeH="0" baseline="0" noProof="0" dirty="0">
+                <a:ln>
+                  <a:noFill/>
+                </a:ln>
+                <a:solidFill>
+                  <a:prstClr val="black"/>
+                </a:solidFill>
+                <a:effectLst/>
+                <a:uLnTx/>
+                <a:uFillTx/>
+                <a:latin typeface="Segoe UI" panose="020B0502040204020203" pitchFamily="34" charset="0"/>
+                <a:cs typeface="Segoe UI" panose="020B0502040204020203" pitchFamily="34" charset="0"/>
+              </a:rPr>
+              <a:t>PredictionEngine</a:t>
+            </a:r>
+          </a:p>
+        </p:txBody>
+      </p:sp>
+      <p:sp>
+        <p:nvSpPr>
+          <p:cNvPr id="74" name="Rectangle 73">
+            <a:extLst>
+              <a:ext uri="{FF2B5EF4-FFF2-40B4-BE49-F238E27FC236}">
+                <a16:creationId xmlns:a16="http://schemas.microsoft.com/office/drawing/2014/main" id="{A0964B55-FA13-4A32-A165-06B0E0E89FAF}"/>
+              </a:ext>
+            </a:extLst>
+          </p:cNvPr>
+          <p:cNvSpPr/>
+          <p:nvPr/>
+        </p:nvSpPr>
+        <p:spPr>
+          <a:xfrm>
+            <a:off x="7733004" y="2032688"/>
+            <a:ext cx="2674804" cy="2917105"/>
+          </a:xfrm>
+          <a:prstGeom prst="rect">
+            <a:avLst/>
+          </a:prstGeom>
+          <a:noFill/>
+          <a:ln>
+            <a:solidFill>
+              <a:schemeClr val="tx1"/>
+            </a:solidFill>
+          </a:ln>
+        </p:spPr>
+        <p:style>
+          <a:lnRef idx="2">
+            <a:schemeClr val="accent1">
+              <a:shade val="50000"/>
+            </a:schemeClr>
+          </a:lnRef>
+          <a:fillRef idx="1">
+            <a:schemeClr val="accent1"/>
+          </a:fillRef>
+          <a:effectRef idx="0">
+            <a:schemeClr val="accent1"/>
+          </a:effectRef>
+          <a:fontRef idx="minor">
+            <a:schemeClr val="lt1"/>
+          </a:fontRef>
+        </p:style>
+        <p:txBody>
+          <a:bodyPr rtlCol="0" anchor="ctr"/>
+          <a:lstStyle/>
+          <a:p>
+            <a:pPr marL="0" marR="0" lvl="0" indent="0" algn="ctr" defTabSz="914400" rtl="0" eaLnBrk="1" fontAlgn="auto" latinLnBrk="0" hangingPunct="1">
+              <a:lnSpc>
+                <a:spcPct val="100000"/>
+              </a:lnSpc>
+              <a:spcBef>
+                <a:spcPts val="0"/>
+              </a:spcBef>
+              <a:spcAft>
+                <a:spcPts val="0"/>
+              </a:spcAft>
+              <a:buClrTx/>
+              <a:buSzTx/>
+              <a:buFontTx/>
+              <a:buNone/>
+              <a:tabLst/>
+              <a:defRPr/>
+            </a:pPr>
+            <a:endParaRPr kumimoji="0" lang="en-US" sz="1600" b="0" i="0" u="none" strike="noStrike" kern="1200" cap="none" spc="0" normalizeH="0" baseline="0" noProof="0">
+              <a:ln>
+                <a:noFill/>
+              </a:ln>
+              <a:solidFill>
+                <a:prstClr val="white"/>
+              </a:solidFill>
+              <a:effectLst/>
+              <a:uLnTx/>
+              <a:uFillTx/>
+              <a:latin typeface="Segoe UI" panose="020B0502040204020203" pitchFamily="34" charset="0"/>
+              <a:cs typeface="Segoe UI" panose="020B0502040204020203" pitchFamily="34" charset="0"/>
+            </a:endParaRPr>
+          </a:p>
+        </p:txBody>
+      </p:sp>
+      <p:sp>
+        <p:nvSpPr>
+          <p:cNvPr id="75" name="Rectangle 74">
+            <a:extLst>
+              <a:ext uri="{FF2B5EF4-FFF2-40B4-BE49-F238E27FC236}">
+                <a16:creationId xmlns:a16="http://schemas.microsoft.com/office/drawing/2014/main" id="{DAEDC425-6E1D-4AE8-A8EB-78C24DB4BEBF}"/>
+              </a:ext>
+            </a:extLst>
+          </p:cNvPr>
+          <p:cNvSpPr/>
+          <p:nvPr/>
+        </p:nvSpPr>
+        <p:spPr>
+          <a:xfrm>
+            <a:off x="8244251" y="3651405"/>
+            <a:ext cx="1413984" cy="400814"/>
+          </a:xfrm>
+          <a:prstGeom prst="rect">
+            <a:avLst/>
+          </a:prstGeom>
+          <a:noFill/>
+          <a:ln>
+            <a:solidFill>
+              <a:schemeClr val="tx1"/>
+            </a:solidFill>
+          </a:ln>
+        </p:spPr>
+        <p:style>
+          <a:lnRef idx="2">
+            <a:schemeClr val="accent1">
+              <a:shade val="50000"/>
+            </a:schemeClr>
+          </a:lnRef>
+          <a:fillRef idx="1">
+            <a:schemeClr val="accent1"/>
+          </a:fillRef>
+          <a:effectRef idx="0">
+            <a:schemeClr val="accent1"/>
+          </a:effectRef>
+          <a:fontRef idx="minor">
+            <a:schemeClr val="lt1"/>
+          </a:fontRef>
+        </p:style>
+        <p:txBody>
+          <a:bodyPr rtlCol="0" anchor="ctr"/>
+          <a:lstStyle/>
+          <a:p>
+            <a:pPr marL="0" marR="0" lvl="0" indent="0" algn="ctr" defTabSz="914400" rtl="0" eaLnBrk="1" fontAlgn="auto" latinLnBrk="0" hangingPunct="1">
+              <a:lnSpc>
+                <a:spcPct val="100000"/>
+              </a:lnSpc>
+              <a:spcBef>
+                <a:spcPts val="0"/>
+              </a:spcBef>
+              <a:spcAft>
+                <a:spcPts val="0"/>
+              </a:spcAft>
+              <a:buClrTx/>
+              <a:buSzTx/>
+              <a:buFontTx/>
+              <a:buNone/>
+              <a:tabLst/>
+              <a:defRPr/>
+            </a:pPr>
+            <a:r>
+              <a:rPr kumimoji="0" lang="en-US" sz="1200" b="0" i="0" u="none" strike="noStrike" kern="1200" cap="none" spc="0" normalizeH="0" baseline="0" noProof="0" dirty="0">
+                <a:ln>
+                  <a:noFill/>
+                </a:ln>
+                <a:solidFill>
+                  <a:prstClr val="black"/>
+                </a:solidFill>
+                <a:effectLst/>
+                <a:uLnTx/>
+                <a:uFillTx/>
+                <a:latin typeface="Segoe UI" panose="020B0502040204020203" pitchFamily="34" charset="0"/>
+                <a:cs typeface="Segoe UI" panose="020B0502040204020203" pitchFamily="34" charset="0"/>
+              </a:rPr>
+              <a:t>PredictionEngine</a:t>
+            </a:r>
+          </a:p>
+        </p:txBody>
+      </p:sp>
+      <p:sp>
+        <p:nvSpPr>
+          <p:cNvPr id="76" name="Rectangle 75">
+            <a:extLst>
+              <a:ext uri="{FF2B5EF4-FFF2-40B4-BE49-F238E27FC236}">
+                <a16:creationId xmlns:a16="http://schemas.microsoft.com/office/drawing/2014/main" id="{ACA2FABA-700E-4B39-AAE9-11C2AC74F9A1}"/>
+              </a:ext>
+            </a:extLst>
+          </p:cNvPr>
+          <p:cNvSpPr/>
+          <p:nvPr/>
+        </p:nvSpPr>
+        <p:spPr>
+          <a:xfrm>
+            <a:off x="8244251" y="2731161"/>
+            <a:ext cx="1413984" cy="400814"/>
+          </a:xfrm>
+          <a:prstGeom prst="rect">
+            <a:avLst/>
+          </a:prstGeom>
+          <a:noFill/>
+          <a:ln>
+            <a:solidFill>
+              <a:schemeClr val="tx1"/>
+            </a:solidFill>
+          </a:ln>
+        </p:spPr>
+        <p:style>
+          <a:lnRef idx="2">
+            <a:schemeClr val="accent1">
+              <a:shade val="50000"/>
+            </a:schemeClr>
+          </a:lnRef>
+          <a:fillRef idx="1">
+            <a:schemeClr val="accent1"/>
+          </a:fillRef>
+          <a:effectRef idx="0">
+            <a:schemeClr val="accent1"/>
+          </a:effectRef>
+          <a:fontRef idx="minor">
+            <a:schemeClr val="lt1"/>
+          </a:fontRef>
+        </p:style>
+        <p:txBody>
+          <a:bodyPr rtlCol="0" anchor="ctr"/>
+          <a:lstStyle/>
+          <a:p>
+            <a:pPr marL="0" marR="0" lvl="0" indent="0" algn="ctr" defTabSz="914400" rtl="0" eaLnBrk="1" fontAlgn="auto" latinLnBrk="0" hangingPunct="1">
+              <a:lnSpc>
+                <a:spcPct val="100000"/>
+              </a:lnSpc>
+              <a:spcBef>
+                <a:spcPts val="0"/>
+              </a:spcBef>
+              <a:spcAft>
+                <a:spcPts val="0"/>
+              </a:spcAft>
+              <a:buClrTx/>
+              <a:buSzTx/>
+              <a:buFontTx/>
+              <a:buNone/>
+              <a:tabLst/>
+              <a:defRPr/>
+            </a:pPr>
+            <a:r>
+              <a:rPr kumimoji="0" lang="en-US" sz="1200" b="0" i="0" u="none" strike="noStrike" kern="1200" cap="none" spc="0" normalizeH="0" baseline="0" noProof="0" dirty="0">
+                <a:ln>
+                  <a:noFill/>
+                </a:ln>
+                <a:solidFill>
+                  <a:prstClr val="black"/>
+                </a:solidFill>
+                <a:effectLst/>
+                <a:uLnTx/>
+                <a:uFillTx/>
+                <a:latin typeface="Segoe UI" panose="020B0502040204020203" pitchFamily="34" charset="0"/>
+                <a:cs typeface="Segoe UI" panose="020B0502040204020203" pitchFamily="34" charset="0"/>
+              </a:rPr>
+              <a:t>PredictionEngine</a:t>
+            </a:r>
+          </a:p>
+        </p:txBody>
+      </p:sp>
+      <p:sp>
+        <p:nvSpPr>
+          <p:cNvPr id="77" name="Rectangle 76">
+            <a:extLst>
+              <a:ext uri="{FF2B5EF4-FFF2-40B4-BE49-F238E27FC236}">
+                <a16:creationId xmlns:a16="http://schemas.microsoft.com/office/drawing/2014/main" id="{822D9C64-7226-40A5-B3CA-2F34CFE39193}"/>
+              </a:ext>
+            </a:extLst>
+          </p:cNvPr>
+          <p:cNvSpPr/>
+          <p:nvPr/>
+        </p:nvSpPr>
+        <p:spPr>
+          <a:xfrm>
+            <a:off x="8244251" y="4113044"/>
+            <a:ext cx="1413984" cy="400814"/>
+          </a:xfrm>
+          <a:prstGeom prst="rect">
+            <a:avLst/>
+          </a:prstGeom>
+          <a:noFill/>
+          <a:ln>
+            <a:solidFill>
+              <a:schemeClr val="tx1"/>
+            </a:solidFill>
+          </a:ln>
+        </p:spPr>
+        <p:style>
+          <a:lnRef idx="2">
+            <a:schemeClr val="accent1">
+              <a:shade val="50000"/>
+            </a:schemeClr>
+          </a:lnRef>
+          <a:fillRef idx="1">
+            <a:schemeClr val="accent1"/>
+          </a:fillRef>
+          <a:effectRef idx="0">
+            <a:schemeClr val="accent1"/>
+          </a:effectRef>
+          <a:fontRef idx="minor">
+            <a:schemeClr val="lt1"/>
+          </a:fontRef>
+        </p:style>
+        <p:txBody>
+          <a:bodyPr rtlCol="0" anchor="ctr"/>
+          <a:lstStyle/>
+          <a:p>
+            <a:pPr marL="0" marR="0" lvl="0" indent="0" algn="ctr" defTabSz="914400" rtl="0" eaLnBrk="1" fontAlgn="auto" latinLnBrk="0" hangingPunct="1">
+              <a:lnSpc>
+                <a:spcPct val="100000"/>
+              </a:lnSpc>
+              <a:spcBef>
+                <a:spcPts val="0"/>
+              </a:spcBef>
+              <a:spcAft>
+                <a:spcPts val="0"/>
+              </a:spcAft>
+              <a:buClrTx/>
+              <a:buSzTx/>
+              <a:buFontTx/>
+              <a:buNone/>
+              <a:tabLst/>
+              <a:defRPr/>
+            </a:pPr>
+            <a:r>
+              <a:rPr kumimoji="0" lang="en-US" sz="1200" b="0" i="0" u="none" strike="noStrike" kern="1200" cap="none" spc="0" normalizeH="0" baseline="0" noProof="0" dirty="0">
+                <a:ln>
+                  <a:noFill/>
+                </a:ln>
+                <a:solidFill>
+                  <a:prstClr val="black"/>
+                </a:solidFill>
+                <a:effectLst/>
+                <a:uLnTx/>
+                <a:uFillTx/>
+                <a:latin typeface="Segoe UI" panose="020B0502040204020203" pitchFamily="34" charset="0"/>
+                <a:cs typeface="Segoe UI" panose="020B0502040204020203" pitchFamily="34" charset="0"/>
+              </a:rPr>
+              <a:t>PredictionEngine</a:t>
+            </a:r>
+          </a:p>
+        </p:txBody>
+      </p:sp>
+      <p:sp>
+        <p:nvSpPr>
+          <p:cNvPr id="78" name="Rectangle 77">
+            <a:extLst>
+              <a:ext uri="{FF2B5EF4-FFF2-40B4-BE49-F238E27FC236}">
+                <a16:creationId xmlns:a16="http://schemas.microsoft.com/office/drawing/2014/main" id="{98EB9B9A-3166-4F96-AEBA-26C316923424}"/>
+              </a:ext>
+            </a:extLst>
+          </p:cNvPr>
+          <p:cNvSpPr/>
+          <p:nvPr/>
+        </p:nvSpPr>
+        <p:spPr>
+          <a:xfrm>
+            <a:off x="8723461" y="4448845"/>
+            <a:ext cx="418704" cy="400110"/>
+          </a:xfrm>
+          <a:prstGeom prst="rect">
+            <a:avLst/>
+          </a:prstGeom>
+        </p:spPr>
+        <p:txBody>
+          <a:bodyPr wrap="none">
+            <a:spAutoFit/>
+          </a:bodyPr>
+          <a:lstStyle/>
+          <a:p>
+            <a:pPr marL="0" marR="0" lvl="0" indent="0" algn="l" defTabSz="914400" rtl="0" eaLnBrk="1" fontAlgn="auto" latinLnBrk="0" hangingPunct="1">
+              <a:lnSpc>
+                <a:spcPct val="100000"/>
+              </a:lnSpc>
+              <a:spcBef>
+                <a:spcPts val="0"/>
+              </a:spcBef>
+              <a:spcAft>
+                <a:spcPts val="0"/>
+              </a:spcAft>
+              <a:buClrTx/>
+              <a:buSzTx/>
+              <a:buFontTx/>
+              <a:buNone/>
+              <a:tabLst/>
+              <a:defRPr/>
+            </a:pPr>
+            <a:r>
+              <a:rPr kumimoji="0" lang="en-US" sz="2000" b="1" i="0" u="none" strike="noStrike" kern="1200" cap="none" spc="0" normalizeH="0" baseline="0" noProof="0" dirty="0">
+                <a:ln>
+                  <a:noFill/>
+                </a:ln>
+                <a:solidFill>
+                  <a:prstClr val="black"/>
+                </a:solidFill>
+                <a:effectLst/>
+                <a:uLnTx/>
+                <a:uFillTx/>
+                <a:latin typeface="Segoe UI" panose="020B0502040204020203" pitchFamily="34" charset="0"/>
+                <a:cs typeface="Segoe UI" panose="020B0502040204020203" pitchFamily="34" charset="0"/>
+              </a:rPr>
+              <a:t>…</a:t>
+            </a:r>
+          </a:p>
+        </p:txBody>
+      </p:sp>
+      <p:sp>
+        <p:nvSpPr>
+          <p:cNvPr id="79" name="Rectangle 78">
+            <a:extLst>
+              <a:ext uri="{FF2B5EF4-FFF2-40B4-BE49-F238E27FC236}">
+                <a16:creationId xmlns:a16="http://schemas.microsoft.com/office/drawing/2014/main" id="{B0410031-F9C4-49E6-A9D5-1B93DA01D649}"/>
+              </a:ext>
+            </a:extLst>
+          </p:cNvPr>
+          <p:cNvSpPr/>
+          <p:nvPr/>
+        </p:nvSpPr>
+        <p:spPr>
+          <a:xfrm>
+            <a:off x="7881991" y="2018589"/>
+            <a:ext cx="2374624" cy="523220"/>
+          </a:xfrm>
+          <a:prstGeom prst="rect">
+            <a:avLst/>
+          </a:prstGeom>
+        </p:spPr>
+        <p:txBody>
+          <a:bodyPr wrap="none">
+            <a:spAutoFit/>
+          </a:bodyPr>
+          <a:lstStyle/>
+          <a:p>
+            <a:pPr marL="0" marR="0" lvl="0" indent="0" algn="l" defTabSz="914400" rtl="0" eaLnBrk="1" fontAlgn="auto" latinLnBrk="0" hangingPunct="1">
+              <a:lnSpc>
+                <a:spcPct val="100000"/>
+              </a:lnSpc>
+              <a:spcBef>
+                <a:spcPts val="0"/>
+              </a:spcBef>
+              <a:spcAft>
+                <a:spcPts val="0"/>
+              </a:spcAft>
+              <a:buClrTx/>
+              <a:buSzTx/>
+              <a:buFontTx/>
+              <a:buNone/>
+              <a:tabLst/>
+              <a:defRPr/>
+            </a:pPr>
+            <a:r>
+              <a:rPr kumimoji="0" lang="en-US" sz="1600" b="0" i="0" u="none" strike="noStrike" kern="1200" cap="none" spc="0" normalizeH="0" baseline="0" noProof="0" dirty="0">
+                <a:ln>
+                  <a:noFill/>
+                </a:ln>
+                <a:solidFill>
+                  <a:prstClr val="black"/>
+                </a:solidFill>
+                <a:effectLst/>
+                <a:uLnTx/>
+                <a:uFillTx/>
+                <a:latin typeface="Segoe UI" panose="020B0502040204020203" pitchFamily="34" charset="0"/>
+                <a:cs typeface="Segoe UI" panose="020B0502040204020203" pitchFamily="34" charset="0"/>
+              </a:rPr>
+              <a:t>_objectPool</a:t>
+            </a:r>
+          </a:p>
+          <a:p>
+            <a:pPr lvl="0">
+              <a:defRPr/>
+            </a:pPr>
+            <a:r>
+              <a:rPr lang="en-US" sz="1200" dirty="0">
+                <a:solidFill>
+                  <a:prstClr val="black"/>
+                </a:solidFill>
+                <a:latin typeface="Segoe UI" panose="020B0502040204020203" pitchFamily="34" charset="0"/>
+                <a:cs typeface="Segoe UI" panose="020B0502040204020203" pitchFamily="34" charset="0"/>
+              </a:rPr>
+              <a:t>(ObjectPool&lt;PredictionEngine&gt;)</a:t>
+            </a:r>
+            <a:endParaRPr kumimoji="0" lang="en-US" sz="1200" b="0" i="0" u="none" strike="noStrike" kern="1200" cap="none" spc="0" normalizeH="0" baseline="0" noProof="0" dirty="0">
+              <a:ln>
+                <a:noFill/>
+              </a:ln>
+              <a:solidFill>
+                <a:prstClr val="black"/>
+              </a:solidFill>
+              <a:effectLst/>
+              <a:uLnTx/>
+              <a:uFillTx/>
+              <a:latin typeface="Segoe UI" panose="020B0502040204020203" pitchFamily="34" charset="0"/>
+              <a:cs typeface="Segoe UI" panose="020B0502040204020203" pitchFamily="34" charset="0"/>
+            </a:endParaRPr>
+          </a:p>
+        </p:txBody>
+      </p:sp>
+      <p:cxnSp>
+        <p:nvCxnSpPr>
+          <p:cNvPr id="83" name="Straight Arrow Connector 82">
+            <a:extLst>
+              <a:ext uri="{FF2B5EF4-FFF2-40B4-BE49-F238E27FC236}">
+                <a16:creationId xmlns:a16="http://schemas.microsoft.com/office/drawing/2014/main" id="{458408BE-F476-48F2-932F-5A31FB82436E}"/>
+              </a:ext>
+            </a:extLst>
+          </p:cNvPr>
+          <p:cNvCxnSpPr>
+            <a:cxnSpLocks/>
+            <a:endCxn id="76" idx="1"/>
+          </p:cNvCxnSpPr>
+          <p:nvPr/>
+        </p:nvCxnSpPr>
+        <p:spPr>
+          <a:xfrm>
+            <a:off x="7249352" y="2184627"/>
+            <a:ext cx="994899" cy="746941"/>
+          </a:xfrm>
+          <a:prstGeom prst="straightConnector1">
+            <a:avLst/>
+          </a:prstGeom>
+          <a:ln w="12700">
+            <a:solidFill>
+              <a:schemeClr val="tx1"/>
+            </a:solidFill>
+            <a:tailEnd type="triangle"/>
+          </a:ln>
+        </p:spPr>
+        <p:style>
+          <a:lnRef idx="1">
+            <a:schemeClr val="accent1"/>
+          </a:lnRef>
+          <a:fillRef idx="0">
+            <a:schemeClr val="accent1"/>
+          </a:fillRef>
+          <a:effectRef idx="0">
+            <a:schemeClr val="accent1"/>
+          </a:effectRef>
+          <a:fontRef idx="minor">
+            <a:schemeClr val="tx1"/>
+          </a:fontRef>
+        </p:style>
+      </p:cxnSp>
+      <p:cxnSp>
+        <p:nvCxnSpPr>
+          <p:cNvPr id="86" name="Straight Arrow Connector 85">
+            <a:extLst>
+              <a:ext uri="{FF2B5EF4-FFF2-40B4-BE49-F238E27FC236}">
+                <a16:creationId xmlns:a16="http://schemas.microsoft.com/office/drawing/2014/main" id="{75FFDB26-8F1F-4659-A8DA-02B9FEA58724}"/>
+              </a:ext>
+            </a:extLst>
+          </p:cNvPr>
+          <p:cNvCxnSpPr>
+            <a:cxnSpLocks/>
+            <a:endCxn id="73" idx="1"/>
+          </p:cNvCxnSpPr>
+          <p:nvPr/>
+        </p:nvCxnSpPr>
+        <p:spPr>
+          <a:xfrm>
+            <a:off x="7243624" y="2911342"/>
+            <a:ext cx="1000627" cy="480965"/>
+          </a:xfrm>
+          <a:prstGeom prst="straightConnector1">
+            <a:avLst/>
+          </a:prstGeom>
+          <a:ln w="12700">
+            <a:solidFill>
+              <a:schemeClr val="tx1"/>
+            </a:solidFill>
+            <a:tailEnd type="triangle"/>
+          </a:ln>
+        </p:spPr>
+        <p:style>
+          <a:lnRef idx="1">
+            <a:schemeClr val="accent1"/>
+          </a:lnRef>
+          <a:fillRef idx="0">
+            <a:schemeClr val="accent1"/>
+          </a:fillRef>
+          <a:effectRef idx="0">
+            <a:schemeClr val="accent1"/>
+          </a:effectRef>
+          <a:fontRef idx="minor">
+            <a:schemeClr val="tx1"/>
+          </a:fontRef>
+        </p:style>
+      </p:cxnSp>
+      <p:cxnSp>
+        <p:nvCxnSpPr>
+          <p:cNvPr id="89" name="Straight Arrow Connector 88">
+            <a:extLst>
+              <a:ext uri="{FF2B5EF4-FFF2-40B4-BE49-F238E27FC236}">
+                <a16:creationId xmlns:a16="http://schemas.microsoft.com/office/drawing/2014/main" id="{5B8DC1AB-410D-4E34-8771-31EAFC88CE03}"/>
+              </a:ext>
+            </a:extLst>
+          </p:cNvPr>
+          <p:cNvCxnSpPr>
+            <a:cxnSpLocks/>
+            <a:endCxn id="75" idx="1"/>
+          </p:cNvCxnSpPr>
+          <p:nvPr/>
+        </p:nvCxnSpPr>
+        <p:spPr>
+          <a:xfrm>
+            <a:off x="7234168" y="3702223"/>
+            <a:ext cx="1010083" cy="149589"/>
+          </a:xfrm>
+          <a:prstGeom prst="straightConnector1">
+            <a:avLst/>
+          </a:prstGeom>
+          <a:ln w="12700">
+            <a:solidFill>
+              <a:schemeClr val="tx1"/>
+            </a:solidFill>
+            <a:tailEnd type="triangle"/>
+          </a:ln>
+        </p:spPr>
+        <p:style>
+          <a:lnRef idx="1">
+            <a:schemeClr val="accent1"/>
+          </a:lnRef>
+          <a:fillRef idx="0">
+            <a:schemeClr val="accent1"/>
+          </a:fillRef>
+          <a:effectRef idx="0">
+            <a:schemeClr val="accent1"/>
+          </a:effectRef>
+          <a:fontRef idx="minor">
+            <a:schemeClr val="tx1"/>
+          </a:fontRef>
+        </p:style>
+      </p:cxnSp>
+      <p:cxnSp>
+        <p:nvCxnSpPr>
+          <p:cNvPr id="96" name="Straight Arrow Connector 95">
+            <a:extLst>
+              <a:ext uri="{FF2B5EF4-FFF2-40B4-BE49-F238E27FC236}">
+                <a16:creationId xmlns:a16="http://schemas.microsoft.com/office/drawing/2014/main" id="{B632D95E-E97C-4F21-8A7B-BF2701B38A7B}"/>
+              </a:ext>
+            </a:extLst>
+          </p:cNvPr>
+          <p:cNvCxnSpPr>
+            <a:cxnSpLocks/>
+            <a:endCxn id="77" idx="1"/>
+          </p:cNvCxnSpPr>
+          <p:nvPr/>
+        </p:nvCxnSpPr>
+        <p:spPr>
+          <a:xfrm flipV="1">
+            <a:off x="7255082" y="4313451"/>
+            <a:ext cx="989169" cy="164324"/>
+          </a:xfrm>
+          <a:prstGeom prst="straightConnector1">
+            <a:avLst/>
+          </a:prstGeom>
+          <a:ln w="12700">
+            <a:solidFill>
+              <a:schemeClr val="tx1"/>
+            </a:solidFill>
+            <a:tailEnd type="triangle"/>
+          </a:ln>
+        </p:spPr>
+        <p:style>
+          <a:lnRef idx="1">
+            <a:schemeClr val="accent1"/>
+          </a:lnRef>
+          <a:fillRef idx="0">
+            <a:schemeClr val="accent1"/>
+          </a:fillRef>
+          <a:effectRef idx="0">
+            <a:schemeClr val="accent1"/>
+          </a:effectRef>
+          <a:fontRef idx="minor">
+            <a:schemeClr val="tx1"/>
+          </a:fontRef>
+        </p:style>
+      </p:cxnSp>
+      <p:sp>
+        <p:nvSpPr>
+          <p:cNvPr id="105" name="Rectangle 104">
+            <a:extLst>
+              <a:ext uri="{FF2B5EF4-FFF2-40B4-BE49-F238E27FC236}">
+                <a16:creationId xmlns:a16="http://schemas.microsoft.com/office/drawing/2014/main" id="{160A4833-80EE-4EB3-81DF-CCB4E3BFD84D}"/>
+              </a:ext>
+            </a:extLst>
+          </p:cNvPr>
+          <p:cNvSpPr/>
+          <p:nvPr/>
+        </p:nvSpPr>
+        <p:spPr>
+          <a:xfrm>
+            <a:off x="9123836" y="5292056"/>
+            <a:ext cx="1283972" cy="707626"/>
+          </a:xfrm>
+          <a:prstGeom prst="rect">
+            <a:avLst/>
+          </a:prstGeom>
+          <a:noFill/>
+          <a:ln>
+            <a:solidFill>
+              <a:schemeClr val="tx1"/>
+            </a:solidFill>
+          </a:ln>
+        </p:spPr>
+        <p:style>
+          <a:lnRef idx="2">
+            <a:schemeClr val="accent1">
+              <a:shade val="50000"/>
+            </a:schemeClr>
+          </a:lnRef>
+          <a:fillRef idx="1">
+            <a:schemeClr val="accent1"/>
+          </a:fillRef>
+          <a:effectRef idx="0">
+            <a:schemeClr val="accent1"/>
+          </a:effectRef>
+          <a:fontRef idx="minor">
+            <a:schemeClr val="lt1"/>
+          </a:fontRef>
+        </p:style>
+        <p:txBody>
+          <a:bodyPr rtlCol="0" anchor="ctr"/>
+          <a:lstStyle/>
+          <a:p>
+            <a:pPr marL="0" marR="0" lvl="0" indent="0" algn="ctr" defTabSz="914400" rtl="0" eaLnBrk="1" fontAlgn="auto" latinLnBrk="0" hangingPunct="1">
+              <a:lnSpc>
+                <a:spcPct val="100000"/>
+              </a:lnSpc>
+              <a:spcBef>
+                <a:spcPts val="0"/>
+              </a:spcBef>
+              <a:spcAft>
+                <a:spcPts val="0"/>
+              </a:spcAft>
+              <a:buClrTx/>
+              <a:buSzTx/>
+              <a:buFontTx/>
+              <a:buNone/>
+              <a:tabLst/>
+              <a:defRPr/>
+            </a:pPr>
+            <a:r>
+              <a:rPr kumimoji="0" lang="en-US" sz="1600" b="0" i="0" u="none" strike="noStrike" kern="1200" cap="none" spc="0" normalizeH="0" baseline="0" noProof="0" dirty="0">
+                <a:ln>
+                  <a:noFill/>
+                </a:ln>
+                <a:solidFill>
+                  <a:prstClr val="black"/>
+                </a:solidFill>
+                <a:effectLst/>
+                <a:uLnTx/>
+                <a:uFillTx/>
+                <a:latin typeface="Segoe UI" panose="020B0502040204020203" pitchFamily="34" charset="0"/>
+                <a:cs typeface="Segoe UI" panose="020B0502040204020203" pitchFamily="34" charset="0"/>
+              </a:rPr>
+              <a:t>_mlContext</a:t>
+            </a:r>
+          </a:p>
+          <a:p>
+            <a:pPr lvl="0" algn="ctr">
+              <a:defRPr/>
+            </a:pPr>
+            <a:r>
+              <a:rPr lang="en-US" sz="1400" dirty="0">
+                <a:solidFill>
+                  <a:prstClr val="black"/>
+                </a:solidFill>
+                <a:latin typeface="Segoe UI" panose="020B0502040204020203" pitchFamily="34" charset="0"/>
+                <a:cs typeface="Segoe UI" panose="020B0502040204020203" pitchFamily="34" charset="0"/>
+              </a:rPr>
+              <a:t>(MLContext)</a:t>
+            </a:r>
+            <a:endParaRPr kumimoji="0" lang="en-US" sz="1400" b="0" i="0" u="none" strike="noStrike" kern="1200" cap="none" spc="0" normalizeH="0" baseline="0" noProof="0" dirty="0">
+              <a:ln>
+                <a:noFill/>
+              </a:ln>
+              <a:solidFill>
+                <a:prstClr val="black"/>
+              </a:solidFill>
+              <a:effectLst/>
+              <a:uLnTx/>
+              <a:uFillTx/>
+              <a:latin typeface="Segoe UI" panose="020B0502040204020203" pitchFamily="34" charset="0"/>
+              <a:cs typeface="Segoe UI" panose="020B0502040204020203" pitchFamily="34" charset="0"/>
+            </a:endParaRPr>
+          </a:p>
+        </p:txBody>
+      </p:sp>
+      <p:sp>
+        <p:nvSpPr>
+          <p:cNvPr id="106" name="Rectangle 105">
+            <a:extLst>
+              <a:ext uri="{FF2B5EF4-FFF2-40B4-BE49-F238E27FC236}">
+                <a16:creationId xmlns:a16="http://schemas.microsoft.com/office/drawing/2014/main" id="{FF0BC2FA-B9F7-4A22-BD51-532CF775FD5F}"/>
+              </a:ext>
+            </a:extLst>
+          </p:cNvPr>
+          <p:cNvSpPr/>
+          <p:nvPr/>
+        </p:nvSpPr>
+        <p:spPr>
+          <a:xfrm>
+            <a:off x="7726292" y="5292056"/>
+            <a:ext cx="1283973" cy="707626"/>
+          </a:xfrm>
+          <a:prstGeom prst="rect">
+            <a:avLst/>
+          </a:prstGeom>
+          <a:noFill/>
+          <a:ln>
+            <a:solidFill>
+              <a:schemeClr val="tx1"/>
+            </a:solidFill>
+          </a:ln>
+        </p:spPr>
+        <p:style>
+          <a:lnRef idx="2">
+            <a:schemeClr val="accent1">
+              <a:shade val="50000"/>
+            </a:schemeClr>
+          </a:lnRef>
+          <a:fillRef idx="1">
+            <a:schemeClr val="accent1"/>
+          </a:fillRef>
+          <a:effectRef idx="0">
+            <a:schemeClr val="accent1"/>
+          </a:effectRef>
+          <a:fontRef idx="minor">
+            <a:schemeClr val="lt1"/>
+          </a:fontRef>
+        </p:style>
+        <p:txBody>
+          <a:bodyPr rtlCol="0" anchor="ctr"/>
+          <a:lstStyle/>
+          <a:p>
+            <a:pPr marL="0" marR="0" lvl="0" indent="0" algn="ctr" defTabSz="914400" rtl="0" eaLnBrk="1" fontAlgn="auto" latinLnBrk="0" hangingPunct="1">
+              <a:lnSpc>
+                <a:spcPct val="100000"/>
+              </a:lnSpc>
+              <a:spcBef>
+                <a:spcPts val="0"/>
+              </a:spcBef>
+              <a:spcAft>
+                <a:spcPts val="0"/>
+              </a:spcAft>
+              <a:buClrTx/>
+              <a:buSzTx/>
+              <a:buFontTx/>
+              <a:buNone/>
+              <a:tabLst/>
+              <a:defRPr/>
+            </a:pPr>
+            <a:r>
+              <a:rPr kumimoji="0" lang="en-US" sz="1600" b="0" i="0" u="none" strike="noStrike" kern="1200" cap="none" spc="0" normalizeH="0" baseline="0" noProof="0" dirty="0">
+                <a:ln>
+                  <a:noFill/>
+                </a:ln>
+                <a:solidFill>
+                  <a:prstClr val="black"/>
+                </a:solidFill>
+                <a:effectLst/>
+                <a:uLnTx/>
+                <a:uFillTx/>
+                <a:latin typeface="Segoe UI" panose="020B0502040204020203" pitchFamily="34" charset="0"/>
+                <a:cs typeface="Segoe UI" panose="020B0502040204020203" pitchFamily="34" charset="0"/>
+              </a:rPr>
+              <a:t>MLModel</a:t>
+            </a:r>
+          </a:p>
+          <a:p>
+            <a:pPr lvl="0" algn="ctr">
+              <a:defRPr/>
+            </a:pPr>
+            <a:r>
+              <a:rPr lang="en-US" sz="1400" dirty="0">
+                <a:solidFill>
+                  <a:prstClr val="black"/>
+                </a:solidFill>
+                <a:latin typeface="Segoe UI" panose="020B0502040204020203" pitchFamily="34" charset="0"/>
+                <a:cs typeface="Segoe UI" panose="020B0502040204020203" pitchFamily="34" charset="0"/>
+              </a:rPr>
+              <a:t>(ITransformer)</a:t>
+            </a:r>
+            <a:endParaRPr kumimoji="0" lang="en-US" sz="1600" b="0" i="0" u="none" strike="noStrike" kern="1200" cap="none" spc="0" normalizeH="0" baseline="0" noProof="0" dirty="0">
+              <a:ln>
+                <a:noFill/>
+              </a:ln>
+              <a:solidFill>
+                <a:prstClr val="black"/>
+              </a:solidFill>
+              <a:effectLst/>
+              <a:uLnTx/>
+              <a:uFillTx/>
+              <a:latin typeface="Segoe UI" panose="020B0502040204020203" pitchFamily="34" charset="0"/>
+              <a:cs typeface="Segoe UI" panose="020B0502040204020203" pitchFamily="34" charset="0"/>
+            </a:endParaRPr>
+          </a:p>
+        </p:txBody>
+      </p:sp>
+      <p:sp>
+        <p:nvSpPr>
+          <p:cNvPr id="126" name="Rectangle 125">
+            <a:extLst>
+              <a:ext uri="{FF2B5EF4-FFF2-40B4-BE49-F238E27FC236}">
+                <a16:creationId xmlns:a16="http://schemas.microsoft.com/office/drawing/2014/main" id="{DE23C2F5-8451-46E4-BFBA-D2F5733393CC}"/>
+              </a:ext>
+            </a:extLst>
+          </p:cNvPr>
+          <p:cNvSpPr/>
+          <p:nvPr/>
+        </p:nvSpPr>
+        <p:spPr>
+          <a:xfrm>
+            <a:off x="4898156" y="1359522"/>
+            <a:ext cx="1870127" cy="338554"/>
+          </a:xfrm>
+          <a:prstGeom prst="rect">
+            <a:avLst/>
+          </a:prstGeom>
+        </p:spPr>
+        <p:txBody>
+          <a:bodyPr wrap="none">
+            <a:spAutoFit/>
+          </a:bodyPr>
+          <a:lstStyle/>
+          <a:p>
+            <a:r>
+              <a:rPr lang="en-US" sz="1600" dirty="0">
+                <a:solidFill>
+                  <a:prstClr val="black"/>
+                </a:solidFill>
+                <a:latin typeface="Segoe UI Light" panose="020B0502040204020203" pitchFamily="34" charset="0"/>
+                <a:cs typeface="Segoe UI Light" panose="020B0502040204020203" pitchFamily="34" charset="0"/>
+              </a:rPr>
+              <a:t>Controller instances</a:t>
+            </a:r>
+          </a:p>
+        </p:txBody>
+      </p:sp>
+    </p:spTree>
+    <p:extLst>
+      <p:ext uri="{BB962C8B-B14F-4D97-AF65-F5344CB8AC3E}">
+        <p14:creationId xmlns:p14="http://schemas.microsoft.com/office/powerpoint/2010/main" val="1134848420"/>
+      </p:ext>
+    </p:extLst>
+  </p:cSld>
+  <p:clrMapOvr>
+    <a:masterClrMapping/>
+  </p:clrMapOvr>
+</p:sld>
+</file>
+
+<file path=ppt/slides/slide6.xml><?xml version="1.0" encoding="utf-8"?>
+<p:sld xmlns:a="http://schemas.openxmlformats.org/drawingml/2006/main" xmlns:r="http://schemas.openxmlformats.org/officeDocument/2006/relationships" xmlns:p="http://schemas.openxmlformats.org/presentationml/2006/main">
+  <p:cSld>
+    <p:spTree>
+      <p:nvGrpSpPr>
+        <p:cNvPr id="1" name=""/>
+        <p:cNvGrpSpPr/>
+        <p:nvPr/>
+      </p:nvGrpSpPr>
+      <p:grpSpPr>
+        <a:xfrm>
+          <a:off x="0" y="0"/>
+          <a:ext cx="0" cy="0"/>
+          <a:chOff x="0" y="0"/>
+          <a:chExt cx="0" cy="0"/>
+        </a:xfrm>
+      </p:grpSpPr>
       <p:sp>
         <p:nvSpPr>
           <p:cNvPr id="2" name="Title 1">
@@ -8409,15 +11898,7 @@
           <a:p>
             <a:r>
               <a:rPr lang="en-US" sz="2800" dirty="0"/>
-              <a:t>Here's a high level end-to-end architecture diagram of the Web API using the </a:t>
-            </a:r>
-            <a:r>
-              <a:rPr lang="en-US" sz="2800" dirty="0" err="1"/>
-              <a:t>MLModelEngine</a:t>
-            </a:r>
-            <a:r>
-              <a:rPr lang="en-US" sz="2800" dirty="0"/>
-              <a:t> with the Object Pool of </a:t>
+              <a:t>Here's a high level end-to-end architecture diagram of the Web API using the MLModelEngine with the Object Pool of </a:t>
             </a:r>
             <a:r>
               <a:rPr lang="en-US" sz="2800" dirty="0" err="1"/>

</xml_diff>